<commit_message>
Add images for buttons
</commit_message>
<xml_diff>
--- a/Prototype/Icon.pptx
+++ b/Prototype/Icon.pptx
@@ -2,13 +2,13 @@
 <file path=ppt/presentation.xml><?xml version="1.0" encoding="utf-8"?>
 <p:presentation xmlns:a="http://schemas.openxmlformats.org/drawingml/2006/main" xmlns:r="http://schemas.openxmlformats.org/officeDocument/2006/relationships" xmlns:p="http://schemas.openxmlformats.org/presentationml/2006/main" saveSubsetFonts="1">
   <p:sldMasterIdLst>
-    <p:sldMasterId id="2147483648" r:id="rId4"/>
+    <p:sldMasterId id="2147483648" r:id="rId8"/>
   </p:sldMasterIdLst>
   <p:sldIdLst>
-    <p:sldId id="256" r:id="rId5"/>
-    <p:sldId id="258" r:id="rId6"/>
-    <p:sldId id="259" r:id="rId7"/>
-    <p:sldId id="257" r:id="rId8"/>
+    <p:sldId id="256" r:id="rId9"/>
+    <p:sldId id="258" r:id="rId10"/>
+    <p:sldId id="259" r:id="rId11"/>
+    <p:sldId id="257" r:id="rId12"/>
   </p:sldIdLst>
   <p:sldSz cx="12192000" cy="6858000"/>
   <p:notesSz cx="6858000" cy="9144000"/>
@@ -262,7 +262,7 @@
           <a:p>
             <a:fld id="{245C2C28-0D12-4EC8-9616-6109F8E9BCEB}" type="datetimeFigureOut">
               <a:rPr lang="en-US" smtClean="0"/>
-              <a:t>10/3/2018</a:t>
+              <a:t>10/13/2018</a:t>
             </a:fld>
             <a:endParaRPr lang="en-US"/>
           </a:p>
@@ -460,7 +460,7 @@
           <a:p>
             <a:fld id="{245C2C28-0D12-4EC8-9616-6109F8E9BCEB}" type="datetimeFigureOut">
               <a:rPr lang="en-US" smtClean="0"/>
-              <a:t>10/3/2018</a:t>
+              <a:t>10/13/2018</a:t>
             </a:fld>
             <a:endParaRPr lang="en-US"/>
           </a:p>
@@ -668,7 +668,7 @@
           <a:p>
             <a:fld id="{245C2C28-0D12-4EC8-9616-6109F8E9BCEB}" type="datetimeFigureOut">
               <a:rPr lang="en-US" smtClean="0"/>
-              <a:t>10/3/2018</a:t>
+              <a:t>10/13/2018</a:t>
             </a:fld>
             <a:endParaRPr lang="en-US"/>
           </a:p>
@@ -866,7 +866,7 @@
           <a:p>
             <a:fld id="{245C2C28-0D12-4EC8-9616-6109F8E9BCEB}" type="datetimeFigureOut">
               <a:rPr lang="en-US" smtClean="0"/>
-              <a:t>10/3/2018</a:t>
+              <a:t>10/13/2018</a:t>
             </a:fld>
             <a:endParaRPr lang="en-US"/>
           </a:p>
@@ -1141,7 +1141,7 @@
           <a:p>
             <a:fld id="{245C2C28-0D12-4EC8-9616-6109F8E9BCEB}" type="datetimeFigureOut">
               <a:rPr lang="en-US" smtClean="0"/>
-              <a:t>10/3/2018</a:t>
+              <a:t>10/13/2018</a:t>
             </a:fld>
             <a:endParaRPr lang="en-US"/>
           </a:p>
@@ -1406,7 +1406,7 @@
           <a:p>
             <a:fld id="{245C2C28-0D12-4EC8-9616-6109F8E9BCEB}" type="datetimeFigureOut">
               <a:rPr lang="en-US" smtClean="0"/>
-              <a:t>10/3/2018</a:t>
+              <a:t>10/13/2018</a:t>
             </a:fld>
             <a:endParaRPr lang="en-US"/>
           </a:p>
@@ -1818,7 +1818,7 @@
           <a:p>
             <a:fld id="{245C2C28-0D12-4EC8-9616-6109F8E9BCEB}" type="datetimeFigureOut">
               <a:rPr lang="en-US" smtClean="0"/>
-              <a:t>10/3/2018</a:t>
+              <a:t>10/13/2018</a:t>
             </a:fld>
             <a:endParaRPr lang="en-US"/>
           </a:p>
@@ -1959,7 +1959,7 @@
           <a:p>
             <a:fld id="{245C2C28-0D12-4EC8-9616-6109F8E9BCEB}" type="datetimeFigureOut">
               <a:rPr lang="en-US" smtClean="0"/>
-              <a:t>10/3/2018</a:t>
+              <a:t>10/13/2018</a:t>
             </a:fld>
             <a:endParaRPr lang="en-US"/>
           </a:p>
@@ -2072,7 +2072,7 @@
           <a:p>
             <a:fld id="{245C2C28-0D12-4EC8-9616-6109F8E9BCEB}" type="datetimeFigureOut">
               <a:rPr lang="en-US" smtClean="0"/>
-              <a:t>10/3/2018</a:t>
+              <a:t>10/13/2018</a:t>
             </a:fld>
             <a:endParaRPr lang="en-US"/>
           </a:p>
@@ -2383,7 +2383,7 @@
           <a:p>
             <a:fld id="{245C2C28-0D12-4EC8-9616-6109F8E9BCEB}" type="datetimeFigureOut">
               <a:rPr lang="en-US" smtClean="0"/>
-              <a:t>10/3/2018</a:t>
+              <a:t>10/13/2018</a:t>
             </a:fld>
             <a:endParaRPr lang="en-US"/>
           </a:p>
@@ -2671,7 +2671,7 @@
           <a:p>
             <a:fld id="{245C2C28-0D12-4EC8-9616-6109F8E9BCEB}" type="datetimeFigureOut">
               <a:rPr lang="en-US" smtClean="0"/>
-              <a:t>10/3/2018</a:t>
+              <a:t>10/13/2018</a:t>
             </a:fld>
             <a:endParaRPr lang="en-US"/>
           </a:p>
@@ -2912,7 +2912,7 @@
           <a:p>
             <a:fld id="{245C2C28-0D12-4EC8-9616-6109F8E9BCEB}" type="datetimeFigureOut">
               <a:rPr lang="en-US" smtClean="0"/>
-              <a:t>10/3/2018</a:t>
+              <a:t>10/13/2018</a:t>
             </a:fld>
             <a:endParaRPr lang="en-US"/>
           </a:p>
@@ -3815,7 +3815,7 @@
           </p:nvPr>
         </p:nvPicPr>
         <p:blipFill>
-          <a:blip r:embed="rId5">
+          <a:blip r:embed="rId9">
             <a:extLst>
               <a:ext uri="{28A0092B-C50C-407E-A947-70E740481C1C}">
                 <a14:useLocalDpi xmlns:a14="http://schemas.microsoft.com/office/drawing/2010/main" val="0"/>
@@ -3922,12 +3922,12 @@
             </p:cNvPicPr>
             <p:nvPr>
               <p:custDataLst>
-                <p:custData r:id="rId3"/>
+                <p:custData r:id="rId7"/>
               </p:custDataLst>
             </p:nvPr>
           </p:nvPicPr>
           <p:blipFill>
-            <a:blip r:embed="rId5">
+            <a:blip r:embed="rId9">
               <a:extLst>
                 <a:ext uri="{28A0092B-C50C-407E-A947-70E740481C1C}">
                   <a14:useLocalDpi xmlns:a14="http://schemas.microsoft.com/office/drawing/2010/main" val="0"/>
@@ -4020,7 +4020,7 @@
           </p:nvPr>
         </p:nvPicPr>
         <p:blipFill rotWithShape="1">
-          <a:blip r:embed="rId6">
+          <a:blip r:embed="rId10">
             <a:extLst>
               <a:ext uri="{28A0092B-C50C-407E-A947-70E740481C1C}">
                 <a14:useLocalDpi xmlns:a14="http://schemas.microsoft.com/office/drawing/2010/main" val="0"/>
@@ -4034,6 +4034,166 @@
           <a:xfrm>
             <a:off x="1035503" y="1787418"/>
             <a:ext cx="276225" cy="285750"/>
+          </a:xfrm>
+          <a:prstGeom prst="rect">
+            <a:avLst/>
+          </a:prstGeom>
+        </p:spPr>
+      </p:pic>
+      <p:pic>
+        <p:nvPicPr>
+          <p:cNvPr id="8" name="Picture 7">
+            <a:extLst>
+              <a:ext uri="{FF2B5EF4-FFF2-40B4-BE49-F238E27FC236}">
+                <a16:creationId xmlns:a16="http://schemas.microsoft.com/office/drawing/2014/main" id="{D762D232-0492-4AEB-BB2C-B00A755B904C}"/>
+              </a:ext>
+            </a:extLst>
+          </p:cNvPr>
+          <p:cNvPicPr preferRelativeResize="0">
+            <a:picLocks/>
+          </p:cNvPicPr>
+          <p:nvPr>
+            <p:custDataLst>
+              <p:custData r:id="rId3"/>
+            </p:custDataLst>
+          </p:nvPr>
+        </p:nvPicPr>
+        <p:blipFill>
+          <a:blip r:embed="rId11">
+            <a:extLst>
+              <a:ext uri="{28A0092B-C50C-407E-A947-70E740481C1C}">
+                <a14:useLocalDpi xmlns:a14="http://schemas.microsoft.com/office/drawing/2010/main" val="0"/>
+              </a:ext>
+            </a:extLst>
+          </a:blip>
+          <a:stretch>
+            <a:fillRect/>
+          </a:stretch>
+        </p:blipFill>
+        <p:spPr>
+          <a:xfrm>
+            <a:off x="875589" y="1254526"/>
+            <a:ext cx="566101" cy="566101"/>
+          </a:xfrm>
+          <a:prstGeom prst="rect">
+            <a:avLst/>
+          </a:prstGeom>
+        </p:spPr>
+      </p:pic>
+      <p:pic>
+        <p:nvPicPr>
+          <p:cNvPr id="9" name="Picture 8">
+            <a:extLst>
+              <a:ext uri="{FF2B5EF4-FFF2-40B4-BE49-F238E27FC236}">
+                <a16:creationId xmlns:a16="http://schemas.microsoft.com/office/drawing/2014/main" id="{512647F8-512A-460E-AB25-A05A10D364C4}"/>
+              </a:ext>
+            </a:extLst>
+          </p:cNvPr>
+          <p:cNvPicPr preferRelativeResize="0">
+            <a:picLocks/>
+          </p:cNvPicPr>
+          <p:nvPr>
+            <p:custDataLst>
+              <p:custData r:id="rId4"/>
+            </p:custDataLst>
+          </p:nvPr>
+        </p:nvPicPr>
+        <p:blipFill>
+          <a:blip r:embed="rId12">
+            <a:extLst>
+              <a:ext uri="{28A0092B-C50C-407E-A947-70E740481C1C}">
+                <a14:useLocalDpi xmlns:a14="http://schemas.microsoft.com/office/drawing/2010/main" val="0"/>
+              </a:ext>
+            </a:extLst>
+          </a:blip>
+          <a:stretch>
+            <a:fillRect/>
+          </a:stretch>
+        </p:blipFill>
+        <p:spPr>
+          <a:xfrm>
+            <a:off x="917970" y="920989"/>
+            <a:ext cx="522429" cy="470829"/>
+          </a:xfrm>
+          <a:prstGeom prst="rect">
+            <a:avLst/>
+          </a:prstGeom>
+        </p:spPr>
+      </p:pic>
+      <p:pic>
+        <p:nvPicPr>
+          <p:cNvPr id="10" name="Picture 9">
+            <a:extLst>
+              <a:ext uri="{FF2B5EF4-FFF2-40B4-BE49-F238E27FC236}">
+                <a16:creationId xmlns:a16="http://schemas.microsoft.com/office/drawing/2014/main" id="{554AA7BD-F926-4024-95C9-21E2280F8B5B}"/>
+              </a:ext>
+            </a:extLst>
+          </p:cNvPr>
+          <p:cNvPicPr preferRelativeResize="0">
+            <a:picLocks/>
+          </p:cNvPicPr>
+          <p:nvPr>
+            <p:custDataLst>
+              <p:custData r:id="rId5"/>
+            </p:custDataLst>
+          </p:nvPr>
+        </p:nvPicPr>
+        <p:blipFill>
+          <a:blip r:embed="rId13">
+            <a:extLst>
+              <a:ext uri="{28A0092B-C50C-407E-A947-70E740481C1C}">
+                <a14:useLocalDpi xmlns:a14="http://schemas.microsoft.com/office/drawing/2010/main" val="0"/>
+              </a:ext>
+            </a:extLst>
+          </a:blip>
+          <a:stretch>
+            <a:fillRect/>
+          </a:stretch>
+        </p:blipFill>
+        <p:spPr>
+          <a:xfrm>
+            <a:off x="917970" y="2764412"/>
+            <a:ext cx="522429" cy="522429"/>
+          </a:xfrm>
+          <a:prstGeom prst="rect">
+            <a:avLst/>
+          </a:prstGeom>
+        </p:spPr>
+      </p:pic>
+      <p:pic>
+        <p:nvPicPr>
+          <p:cNvPr id="11" name="Picture 10">
+            <a:extLst>
+              <a:ext uri="{FF2B5EF4-FFF2-40B4-BE49-F238E27FC236}">
+                <a16:creationId xmlns:a16="http://schemas.microsoft.com/office/drawing/2014/main" id="{4DA9E312-0E5E-4F00-A346-F1D7DFD0DE28}"/>
+              </a:ext>
+            </a:extLst>
+          </p:cNvPr>
+          <p:cNvPicPr preferRelativeResize="0">
+            <a:picLocks/>
+          </p:cNvPicPr>
+          <p:nvPr>
+            <p:custDataLst>
+              <p:custData r:id="rId6"/>
+            </p:custDataLst>
+          </p:nvPr>
+        </p:nvPicPr>
+        <p:blipFill>
+          <a:blip r:embed="rId14">
+            <a:extLst>
+              <a:ext uri="{28A0092B-C50C-407E-A947-70E740481C1C}">
+                <a14:useLocalDpi xmlns:a14="http://schemas.microsoft.com/office/drawing/2010/main" val="0"/>
+              </a:ext>
+            </a:extLst>
+          </a:blip>
+          <a:stretch>
+            <a:fillRect/>
+          </a:stretch>
+        </p:blipFill>
+        <p:spPr>
+          <a:xfrm>
+            <a:off x="933384" y="530076"/>
+            <a:ext cx="450510" cy="450510"/>
           </a:xfrm>
           <a:prstGeom prst="rect">
             <a:avLst/>
@@ -6326,7 +6486,7 @@
 
 <file path=customXml/item1.xml><?xml version="1.0" encoding="utf-8"?>
 <Control xmlns="http://schemas.microsoft.com/VisualStudio/2011/storyboarding/control">
-  <Id Name="System.Storyboarding.WindowsAppIcons.Play" Revision="1" Stencil="System.Storyboarding.WindowsAppIcons" StencilVersion="0.1"/>
+  <Id Name="System.Storyboarding.WindowsAppIcons.Edit" Revision="1" Stencil="System.Storyboarding.WindowsAppIcons" StencilVersion="0.1"/>
 </Control>
 </file>
 
@@ -6338,12 +6498,36 @@
 
 <file path=customXml/item3.xml><?xml version="1.0" encoding="utf-8"?>
 <Control xmlns="http://schemas.microsoft.com/VisualStudio/2011/storyboarding/control">
-  <Id Name="System.Storyboarding.WindowsAppIcons.Edit" Revision="1" Stencil="System.Storyboarding.WindowsAppIcons" StencilVersion="0.1"/>
+  <Id Name="System.Storyboarding.WindowsAppIcons.Play" Revision="1" Stencil="System.Storyboarding.WindowsAppIcons" StencilVersion="0.1"/>
+</Control>
+</file>
+
+<file path=customXml/item4.xml><?xml version="1.0" encoding="utf-8"?>
+<Control xmlns="http://schemas.microsoft.com/VisualStudio/2011/storyboarding/control">
+  <Id Name="System.Storyboarding.WindowsPhoneIcons.Cancel" Revision="1" Stencil="System.Storyboarding.WindowsPhoneIcons" StencilVersion="0.1"/>
+</Control>
+</file>
+
+<file path=customXml/item5.xml><?xml version="1.0" encoding="utf-8"?>
+<Control xmlns="http://schemas.microsoft.com/VisualStudio/2011/storyboarding/control">
+  <Id Name="System.Storyboarding.WindowsPhoneIcons.Add" Revision="1" Stencil="System.Storyboarding.WindowsPhoneIcons" StencilVersion="0.1"/>
+</Control>
+</file>
+
+<file path=customXml/item6.xml><?xml version="1.0" encoding="utf-8"?>
+<Control xmlns="http://schemas.microsoft.com/VisualStudio/2011/storyboarding/control">
+  <Id Name="System.Storyboarding.WindowsPhoneIcons.Refresh" Revision="1" Stencil="System.Storyboarding.WindowsPhoneIcons" StencilVersion="0.1"/>
+</Control>
+</file>
+
+<file path=customXml/item7.xml><?xml version="1.0" encoding="utf-8"?>
+<Control xmlns="http://schemas.microsoft.com/VisualStudio/2011/storyboarding/control">
+  <Id Name="System.Storyboarding.WindowsPhoneIcons.Minus" Revision="1" Stencil="System.Storyboarding.WindowsPhoneIcons" StencilVersion="0.1"/>
 </Control>
 </file>
 
 <file path=customXml/itemProps1.xml><?xml version="1.0" encoding="utf-8"?>
-<ds:datastoreItem xmlns:ds="http://schemas.openxmlformats.org/officeDocument/2006/customXml" ds:itemID="{5B8607FE-59BB-43C3-BBC9-D002A93B2860}">
+<ds:datastoreItem xmlns:ds="http://schemas.openxmlformats.org/officeDocument/2006/customXml" ds:itemID="{61361C12-AEB1-4243-8694-E22DB7BB0B58}">
   <ds:schemaRefs>
     <ds:schemaRef ds:uri="http://schemas.microsoft.com/VisualStudio/2011/storyboarding/control"/>
   </ds:schemaRefs>
@@ -6359,7 +6543,39 @@
 </file>
 
 <file path=customXml/itemProps3.xml><?xml version="1.0" encoding="utf-8"?>
-<ds:datastoreItem xmlns:ds="http://schemas.openxmlformats.org/officeDocument/2006/customXml" ds:itemID="{61361C12-AEB1-4243-8694-E22DB7BB0B58}">
+<ds:datastoreItem xmlns:ds="http://schemas.openxmlformats.org/officeDocument/2006/customXml" ds:itemID="{5B8607FE-59BB-43C3-BBC9-D002A93B2860}">
+  <ds:schemaRefs>
+    <ds:schemaRef ds:uri="http://schemas.microsoft.com/VisualStudio/2011/storyboarding/control"/>
+  </ds:schemaRefs>
+</ds:datastoreItem>
+</file>
+
+<file path=customXml/itemProps4.xml><?xml version="1.0" encoding="utf-8"?>
+<ds:datastoreItem xmlns:ds="http://schemas.openxmlformats.org/officeDocument/2006/customXml" ds:itemID="{0F4FBE72-4778-4A80-9A59-1EAA7879E88B}">
+  <ds:schemaRefs>
+    <ds:schemaRef ds:uri="http://schemas.microsoft.com/VisualStudio/2011/storyboarding/control"/>
+  </ds:schemaRefs>
+</ds:datastoreItem>
+</file>
+
+<file path=customXml/itemProps5.xml><?xml version="1.0" encoding="utf-8"?>
+<ds:datastoreItem xmlns:ds="http://schemas.openxmlformats.org/officeDocument/2006/customXml" ds:itemID="{182A85CA-4E58-49C8-8C48-758766C210A9}">
+  <ds:schemaRefs>
+    <ds:schemaRef ds:uri="http://schemas.microsoft.com/VisualStudio/2011/storyboarding/control"/>
+  </ds:schemaRefs>
+</ds:datastoreItem>
+</file>
+
+<file path=customXml/itemProps6.xml><?xml version="1.0" encoding="utf-8"?>
+<ds:datastoreItem xmlns:ds="http://schemas.openxmlformats.org/officeDocument/2006/customXml" ds:itemID="{F50EEE5E-70AE-4092-8CFF-7CEEF7A1A3DA}">
+  <ds:schemaRefs>
+    <ds:schemaRef ds:uri="http://schemas.microsoft.com/VisualStudio/2011/storyboarding/control"/>
+  </ds:schemaRefs>
+</ds:datastoreItem>
+</file>
+
+<file path=customXml/itemProps7.xml><?xml version="1.0" encoding="utf-8"?>
+<ds:datastoreItem xmlns:ds="http://schemas.openxmlformats.org/officeDocument/2006/customXml" ds:itemID="{0CAA02FD-32C9-42E8-98BE-0EAAD29173F4}">
   <ds:schemaRefs>
     <ds:schemaRef ds:uri="http://schemas.microsoft.com/VisualStudio/2011/storyboarding/control"/>
   </ds:schemaRefs>

</xml_diff>

<commit_message>
Switch songs from song info page
</commit_message>
<xml_diff>
--- a/Prototype/Icon.pptx
+++ b/Prototype/Icon.pptx
@@ -271,7 +271,7 @@
           <a:p>
             <a:fld id="{245C2C28-0D12-4EC8-9616-6109F8E9BCEB}" type="datetimeFigureOut">
               <a:rPr lang="en-US" smtClean="0"/>
-              <a:t>4/11/2019</a:t>
+              <a:t>4/26/2019</a:t>
             </a:fld>
             <a:endParaRPr lang="en-US"/>
           </a:p>
@@ -469,7 +469,7 @@
           <a:p>
             <a:fld id="{245C2C28-0D12-4EC8-9616-6109F8E9BCEB}" type="datetimeFigureOut">
               <a:rPr lang="en-US" smtClean="0"/>
-              <a:t>4/11/2019</a:t>
+              <a:t>4/26/2019</a:t>
             </a:fld>
             <a:endParaRPr lang="en-US"/>
           </a:p>
@@ -677,7 +677,7 @@
           <a:p>
             <a:fld id="{245C2C28-0D12-4EC8-9616-6109F8E9BCEB}" type="datetimeFigureOut">
               <a:rPr lang="en-US" smtClean="0"/>
-              <a:t>4/11/2019</a:t>
+              <a:t>4/26/2019</a:t>
             </a:fld>
             <a:endParaRPr lang="en-US"/>
           </a:p>
@@ -875,7 +875,7 @@
           <a:p>
             <a:fld id="{245C2C28-0D12-4EC8-9616-6109F8E9BCEB}" type="datetimeFigureOut">
               <a:rPr lang="en-US" smtClean="0"/>
-              <a:t>4/11/2019</a:t>
+              <a:t>4/26/2019</a:t>
             </a:fld>
             <a:endParaRPr lang="en-US"/>
           </a:p>
@@ -1150,7 +1150,7 @@
           <a:p>
             <a:fld id="{245C2C28-0D12-4EC8-9616-6109F8E9BCEB}" type="datetimeFigureOut">
               <a:rPr lang="en-US" smtClean="0"/>
-              <a:t>4/11/2019</a:t>
+              <a:t>4/26/2019</a:t>
             </a:fld>
             <a:endParaRPr lang="en-US"/>
           </a:p>
@@ -1415,7 +1415,7 @@
           <a:p>
             <a:fld id="{245C2C28-0D12-4EC8-9616-6109F8E9BCEB}" type="datetimeFigureOut">
               <a:rPr lang="en-US" smtClean="0"/>
-              <a:t>4/11/2019</a:t>
+              <a:t>4/26/2019</a:t>
             </a:fld>
             <a:endParaRPr lang="en-US"/>
           </a:p>
@@ -1827,7 +1827,7 @@
           <a:p>
             <a:fld id="{245C2C28-0D12-4EC8-9616-6109F8E9BCEB}" type="datetimeFigureOut">
               <a:rPr lang="en-US" smtClean="0"/>
-              <a:t>4/11/2019</a:t>
+              <a:t>4/26/2019</a:t>
             </a:fld>
             <a:endParaRPr lang="en-US"/>
           </a:p>
@@ -1968,7 +1968,7 @@
           <a:p>
             <a:fld id="{245C2C28-0D12-4EC8-9616-6109F8E9BCEB}" type="datetimeFigureOut">
               <a:rPr lang="en-US" smtClean="0"/>
-              <a:t>4/11/2019</a:t>
+              <a:t>4/26/2019</a:t>
             </a:fld>
             <a:endParaRPr lang="en-US"/>
           </a:p>
@@ -2081,7 +2081,7 @@
           <a:p>
             <a:fld id="{245C2C28-0D12-4EC8-9616-6109F8E9BCEB}" type="datetimeFigureOut">
               <a:rPr lang="en-US" smtClean="0"/>
-              <a:t>4/11/2019</a:t>
+              <a:t>4/26/2019</a:t>
             </a:fld>
             <a:endParaRPr lang="en-US"/>
           </a:p>
@@ -2392,7 +2392,7 @@
           <a:p>
             <a:fld id="{245C2C28-0D12-4EC8-9616-6109F8E9BCEB}" type="datetimeFigureOut">
               <a:rPr lang="en-US" smtClean="0"/>
-              <a:t>4/11/2019</a:t>
+              <a:t>4/26/2019</a:t>
             </a:fld>
             <a:endParaRPr lang="en-US"/>
           </a:p>
@@ -2680,7 +2680,7 @@
           <a:p>
             <a:fld id="{245C2C28-0D12-4EC8-9616-6109F8E9BCEB}" type="datetimeFigureOut">
               <a:rPr lang="en-US" smtClean="0"/>
-              <a:t>4/11/2019</a:t>
+              <a:t>4/26/2019</a:t>
             </a:fld>
             <a:endParaRPr lang="en-US"/>
           </a:p>
@@ -2921,7 +2921,7 @@
           <a:p>
             <a:fld id="{245C2C28-0D12-4EC8-9616-6109F8E9BCEB}" type="datetimeFigureOut">
               <a:rPr lang="en-US" smtClean="0"/>
-              <a:t>4/11/2019</a:t>
+              <a:t>4/26/2019</a:t>
             </a:fld>
             <a:endParaRPr lang="en-US"/>
           </a:p>
@@ -9862,6 +9862,45 @@
           </a:extLst>
         </p:spPr>
       </p:pic>
+      <p:pic>
+        <p:nvPicPr>
+          <p:cNvPr id="19" name="Graphic 18" descr="Line arrow: Straight">
+            <a:extLst>
+              <a:ext uri="{FF2B5EF4-FFF2-40B4-BE49-F238E27FC236}">
+                <a16:creationId xmlns:a16="http://schemas.microsoft.com/office/drawing/2014/main" id="{B92C5E26-4765-4A0D-9B71-B0A8357CA9C1}"/>
+              </a:ext>
+            </a:extLst>
+          </p:cNvPr>
+          <p:cNvPicPr>
+            <a:picLocks noChangeAspect="1"/>
+          </p:cNvPicPr>
+          <p:nvPr/>
+        </p:nvPicPr>
+        <p:blipFill>
+          <a:blip r:embed="rId23">
+            <a:extLst>
+              <a:ext uri="{28A0092B-C50C-407E-A947-70E740481C1C}">
+                <a14:useLocalDpi xmlns:a14="http://schemas.microsoft.com/office/drawing/2010/main" val="0"/>
+              </a:ext>
+              <a:ext uri="{96DAC541-7B7A-43D3-8B79-37D633B846F1}">
+                <asvg:svgBlip xmlns:asvg="http://schemas.microsoft.com/office/drawing/2016/SVG/main" r:embed="rId24"/>
+              </a:ext>
+            </a:extLst>
+          </a:blip>
+          <a:stretch>
+            <a:fillRect/>
+          </a:stretch>
+        </p:blipFill>
+        <p:spPr>
+          <a:xfrm>
+            <a:off x="2708631" y="3978085"/>
+            <a:ext cx="914400" cy="914400"/>
+          </a:xfrm>
+          <a:prstGeom prst="rect">
+            <a:avLst/>
+          </a:prstGeom>
+        </p:spPr>
+      </p:pic>
     </p:spTree>
     <p:extLst>
       <p:ext uri="{BB962C8B-B14F-4D97-AF65-F5344CB8AC3E}">
@@ -13053,7 +13092,7 @@
 
 <file path=customXml/item1.xml><?xml version="1.0" encoding="utf-8"?>
 <Control xmlns="http://schemas.microsoft.com/VisualStudio/2011/storyboarding/control">
-  <Id Name="System.Storyboarding.WindowsAppIcons.Edit" Revision="1" Stencil="System.Storyboarding.WindowsAppIcons" StencilVersion="0.1"/>
+  <Id Name="System.Storyboarding.WindowsPhoneIcons.Rewind" Revision="1" Stencil="System.Storyboarding.WindowsPhoneIcons" StencilVersion="0.1"/>
 </Control>
 </file>
 
@@ -13065,13 +13104,13 @@
 
 <file path=customXml/item11.xml><?xml version="1.0" encoding="utf-8"?>
 <Control xmlns="http://schemas.microsoft.com/VisualStudio/2011/storyboarding/control">
-  <Id Name="System.Storyboarding.WindowsPhoneIcons.Rewind" Revision="1" Stencil="System.Storyboarding.WindowsPhoneIcons" StencilVersion="0.1"/>
+  <Id Name="System.Storyboarding.WindowsPhoneIcons.Cancel" Revision="1" Stencil="System.Storyboarding.WindowsPhoneIcons" StencilVersion="0.1"/>
 </Control>
 </file>
 
 <file path=customXml/item12.xml><?xml version="1.0" encoding="utf-8"?>
 <Control xmlns="http://schemas.microsoft.com/VisualStudio/2011/storyboarding/control">
-  <Id Name="System.Storyboarding.WindowsAppIcons.Play" Revision="1" Stencil="System.Storyboarding.WindowsAppIcons" StencilVersion="0.1"/>
+  <Id Name="System.Storyboarding.WindowsPhoneIcons.Add" Revision="1" Stencil="System.Storyboarding.WindowsPhoneIcons" StencilVersion="0.1"/>
 </Control>
 </file>
 
@@ -13083,7 +13122,7 @@
 
 <file path=customXml/item14.xml><?xml version="1.0" encoding="utf-8"?>
 <Control xmlns="http://schemas.microsoft.com/VisualStudio/2011/storyboarding/control">
-  <Id Name="System.Storyboarding.WindowsAppIcons.Play" Revision="1" Stencil="System.Storyboarding.WindowsAppIcons" StencilVersion="0.1"/>
+  <Id Name="System.Storyboarding.WindowsAppIcons.Donotwant" Revision="1" Stencil="System.Storyboarding.WindowsAppIcons" StencilVersion="0.1"/>
 </Control>
 </file>
 
@@ -13095,25 +13134,25 @@
 
 <file path=customXml/item16.xml><?xml version="1.0" encoding="utf-8"?>
 <Control xmlns="http://schemas.microsoft.com/VisualStudio/2011/storyboarding/control">
-  <Id Name="System.Storyboarding.WindowsAppIcons.Edit" Revision="1" Stencil="System.Storyboarding.WindowsAppIcons" StencilVersion="0.1"/>
+  <Id Name="e75cd7fd-d454-43ac-a2bd-cf0ac4f48652" RevisionId="8831f7ae-9100-4ae6-a512-25e5a2ad6d46" Stencil="172d6d98-e5c9-42e9-a209-79f7a94bbd38" StencilRevisionId="00000000-0000-0000-0000-000000000000" StencilVersion="0.0"/>
 </Control>
 </file>
 
 <file path=customXml/item17.xml><?xml version="1.0" encoding="utf-8"?>
+<Control xmlns="http://schemas.microsoft.com/VisualStudio/2011/storyboarding/control">
+  <Id Name="System.Storyboarding.WindowsPhoneIcons.Cancel" Revision="1" Stencil="System.Storyboarding.WindowsPhoneIcons" StencilVersion="0.1"/>
+</Control>
+</file>
+
+<file path=customXml/item18.xml><?xml version="1.0" encoding="utf-8"?>
 <Control xmlns="http://schemas.microsoft.com/VisualStudio/2011/storyboarding/control">
   <Id Name="System.Storyboarding.WindowsAppIcons.Play" Revision="1" Stencil="System.Storyboarding.WindowsAppIcons" StencilVersion="0.1"/>
 </Control>
 </file>
 
-<file path=customXml/item18.xml><?xml version="1.0" encoding="utf-8"?>
-<Control xmlns="http://schemas.microsoft.com/VisualStudio/2011/storyboarding/control">
-  <Id Name="System.Storyboarding.WindowsPhoneIcons.Cancel" Revision="1" Stencil="System.Storyboarding.WindowsPhoneIcons" StencilVersion="0.1"/>
-</Control>
-</file>
-
 <file path=customXml/item19.xml><?xml version="1.0" encoding="utf-8"?>
 <Control xmlns="http://schemas.microsoft.com/VisualStudio/2011/storyboarding/control">
-  <Id Name="System.Storyboarding.WindowsAppIcons.Edit" Revision="1" Stencil="System.Storyboarding.WindowsAppIcons" StencilVersion="0.1"/>
+  <Id Name="System.Storyboarding.WindowsAppIcons.Retweet" Revision="1" Stencil="System.Storyboarding.WindowsAppIcons" StencilVersion="0.1"/>
 </Control>
 </file>
 
@@ -13125,7 +13164,7 @@
 
 <file path=customXml/item20.xml><?xml version="1.0" encoding="utf-8"?>
 <Control xmlns="http://schemas.microsoft.com/VisualStudio/2011/storyboarding/control">
-  <Id Name="System.Storyboarding.WindowsAppIcons.Edit" Revision="1" Stencil="System.Storyboarding.WindowsAppIcons" StencilVersion="0.1"/>
+  <Id Name="System.Storyboarding.WindowsAppIcons.Play" Revision="1" Stencil="System.Storyboarding.WindowsAppIcons" StencilVersion="0.1"/>
 </Control>
 </file>
 
@@ -13137,133 +13176,133 @@
 
 <file path=customXml/item22.xml><?xml version="1.0" encoding="utf-8"?>
 <Control xmlns="http://schemas.microsoft.com/VisualStudio/2011/storyboarding/control">
+  <Id Name="4b4d62c4-0b58-49c3-9bd5-0f2c494cd34e" RevisionId="df283dbf-c6b0-49ce-bc2c-3341a4271bd3" Stencil="172d6d98-e5c9-42e9-a209-79f7a94bbd38" StencilRevisionId="00000000-0000-0000-0000-000000000000" StencilVersion="0.0"/>
+</Control>
+</file>
+
+<file path=customXml/item23.xml><?xml version="1.0" encoding="utf-8"?>
+<Control xmlns="http://schemas.microsoft.com/VisualStudio/2011/storyboarding/control">
+  <Id Name="System.Storyboarding.WindowsAppIcons.Edit" Revision="1" Stencil="System.Storyboarding.WindowsAppIcons" StencilVersion="0.1"/>
+</Control>
+</file>
+
+<file path=customXml/item24.xml><?xml version="1.0" encoding="utf-8"?>
+<Control xmlns="http://schemas.microsoft.com/VisualStudio/2011/storyboarding/control">
+  <Id Name="System.Storyboarding.WindowsAppIcons.Plus" Revision="1" Stencil="System.Storyboarding.WindowsAppIcons" StencilVersion="0.1"/>
+</Control>
+</file>
+
+<file path=customXml/item25.xml><?xml version="1.0" encoding="utf-8"?>
+<Control xmlns="http://schemas.microsoft.com/VisualStudio/2011/storyboarding/control">
+  <Id Name="System.Storyboarding.WindowsAppIcons.Edit" Revision="1" Stencil="System.Storyboarding.WindowsAppIcons" StencilVersion="0.1"/>
+</Control>
+</file>
+
+<file path=customXml/item26.xml><?xml version="1.0" encoding="utf-8"?>
+<Control xmlns="http://schemas.microsoft.com/VisualStudio/2011/storyboarding/control">
+  <Id Name="System.Storyboarding.Icons.Volume" Revision="1" Stencil="System.Storyboarding.Icons" StencilVersion="0.1"/>
+</Control>
+</file>
+
+<file path=customXml/item27.xml><?xml version="1.0" encoding="utf-8"?>
+<Control xmlns="http://schemas.microsoft.com/VisualStudio/2011/storyboarding/control">
+  <Id Name="System.Storyboarding.WindowsPhoneIcons.Add" Revision="1" Stencil="System.Storyboarding.WindowsPhoneIcons" StencilVersion="0.1"/>
+</Control>
+</file>
+
+<file path=customXml/item28.xml><?xml version="1.0" encoding="utf-8"?>
+<Control xmlns="http://schemas.microsoft.com/VisualStudio/2011/storyboarding/control">
+  <Id Name="System.Storyboarding.WindowsAppIcons.Edit" Revision="1" Stencil="System.Storyboarding.WindowsAppIcons" StencilVersion="0.1"/>
+</Control>
+</file>
+
+<file path=customXml/item29.xml><?xml version="1.0" encoding="utf-8"?>
+<Control xmlns="http://schemas.microsoft.com/VisualStudio/2011/storyboarding/control">
   <Id Name="System.Storyboarding.WindowsPhoneIcons.Cancel" Revision="1" Stencil="System.Storyboarding.WindowsPhoneIcons" StencilVersion="0.1"/>
 </Control>
 </file>
 
-<file path=customXml/item23.xml><?xml version="1.0" encoding="utf-8"?>
+<file path=customXml/item3.xml><?xml version="1.0" encoding="utf-8"?>
+<Control xmlns="http://schemas.microsoft.com/VisualStudio/2011/storyboarding/control">
+  <Id Name="System.Storyboarding.WindowsPhoneIcons.Minus" Revision="1" Stencil="System.Storyboarding.WindowsPhoneIcons" StencilVersion="0.1"/>
+</Control>
+</file>
+
+<file path=customXml/item30.xml><?xml version="1.0" encoding="utf-8"?>
+<Control xmlns="http://schemas.microsoft.com/VisualStudio/2011/storyboarding/control">
+  <Id Name="System.Storyboarding.WindowsAppIcons.Edit" Revision="1" Stencil="System.Storyboarding.WindowsAppIcons" StencilVersion="0.1"/>
+</Control>
+</file>
+
+<file path=customXml/item31.xml><?xml version="1.0" encoding="utf-8"?>
+<Control xmlns="http://schemas.microsoft.com/VisualStudio/2011/storyboarding/control">
+  <Id Name="System.Storyboarding.Icons.Volume" Revision="1" Stencil="System.Storyboarding.Icons" StencilVersion="0.1"/>
+</Control>
+</file>
+
+<file path=customXml/item32.xml><?xml version="1.0" encoding="utf-8"?>
+<Control xmlns="http://schemas.microsoft.com/VisualStudio/2011/storyboarding/control">
+  <Id Name="System.Storyboarding.WindowsAppIcons.Edit" Revision="1" Stencil="System.Storyboarding.WindowsAppIcons" StencilVersion="0.1"/>
+</Control>
+</file>
+
+<file path=customXml/item33.xml><?xml version="1.0" encoding="utf-8"?>
+<Control xmlns="http://schemas.microsoft.com/VisualStudio/2011/storyboarding/control">
+  <Id Name="32035d07-bc66-4a79-8001-2507012193e3" RevisionId="7f6cc906-8fab-4878-8f41-90bcdc4e860e" Stencil="172d6d98-e5c9-42e9-a209-79f7a94bbd38" StencilRevisionId="00000000-0000-0000-0000-000000000000" StencilVersion="0.0"/>
+</Control>
+</file>
+
+<file path=customXml/item34.xml><?xml version="1.0" encoding="utf-8"?>
+<Control xmlns="http://schemas.microsoft.com/VisualStudio/2011/storyboarding/control">
+  <Id Name="System.Storyboarding.WindowsAppIcons.Play" Revision="1" Stencil="System.Storyboarding.WindowsAppIcons" StencilVersion="0.1"/>
+</Control>
+</file>
+
+<file path=customXml/item35.xml><?xml version="1.0" encoding="utf-8"?>
 <Control xmlns="http://schemas.microsoft.com/VisualStudio/2011/storyboarding/control">
   <Id Name="System.Storyboarding.WindowsPhoneIcons.Refresh" Revision="1" Stencil="System.Storyboarding.WindowsPhoneIcons" StencilVersion="0.1"/>
 </Control>
 </file>
 
-<file path=customXml/item24.xml><?xml version="1.0" encoding="utf-8"?>
+<file path=customXml/item36.xml><?xml version="1.0" encoding="utf-8"?>
+<Control xmlns="http://schemas.microsoft.com/VisualStudio/2011/storyboarding/control">
+  <Id Name="32035d07-bc66-4a79-8001-2507012193e3" RevisionId="7f6cc906-8fab-4878-8f41-90bcdc4e860e" Stencil="172d6d98-e5c9-42e9-a209-79f7a94bbd38" StencilRevisionId="00000000-0000-0000-0000-000000000000" StencilVersion="0.0"/>
+</Control>
+</file>
+
+<file path=customXml/item37.xml><?xml version="1.0" encoding="utf-8"?>
 <Control xmlns="http://schemas.microsoft.com/VisualStudio/2011/storyboarding/control">
   <Id Name="System.Storyboarding.WindowsAppIcons.Minus" Revision="1" Stencil="System.Storyboarding.WindowsAppIcons" StencilVersion="0.1"/>
 </Control>
 </file>
 
-<file path=customXml/item25.xml><?xml version="1.0" encoding="utf-8"?>
+<file path=customXml/item38.xml><?xml version="1.0" encoding="utf-8"?>
+<Control xmlns="http://schemas.microsoft.com/VisualStudio/2011/storyboarding/control">
+  <Id Name="System.Storyboarding.WindowsAppIcons.Edit" Revision="1" Stencil="System.Storyboarding.WindowsAppIcons" StencilVersion="0.1"/>
+</Control>
+</file>
+
+<file path=customXml/item39.xml><?xml version="1.0" encoding="utf-8"?>
+<Control xmlns="http://schemas.microsoft.com/VisualStudio/2011/storyboarding/control">
+  <Id Name="System.Storyboarding.WindowsAppIcons.Plus" Revision="1" Stencil="System.Storyboarding.WindowsAppIcons" StencilVersion="0.1"/>
+</Control>
+</file>
+
+<file path=customXml/item4.xml><?xml version="1.0" encoding="utf-8"?>
 <Control xmlns="http://schemas.microsoft.com/VisualStudio/2011/storyboarding/control">
   <Id Name="4b4d62c4-0b58-49c3-9bd5-0f2c494cd34e" RevisionId="df283dbf-c6b0-49ce-bc2c-3341a4271bd3" Stencil="172d6d98-e5c9-42e9-a209-79f7a94bbd38" StencilRevisionId="00000000-0000-0000-0000-000000000000" StencilVersion="0.0"/>
 </Control>
 </file>
 
-<file path=customXml/item26.xml><?xml version="1.0" encoding="utf-8"?>
-<Control xmlns="http://schemas.microsoft.com/VisualStudio/2011/storyboarding/control">
-  <Id Name="System.Storyboarding.WindowsPhoneIcons.Cancel" Revision="1" Stencil="System.Storyboarding.WindowsPhoneIcons" StencilVersion="0.1"/>
-</Control>
-</file>
-
-<file path=customXml/item27.xml><?xml version="1.0" encoding="utf-8"?>
+<file path=customXml/item40.xml><?xml version="1.0" encoding="utf-8"?>
 <Control xmlns="http://schemas.microsoft.com/VisualStudio/2011/storyboarding/control">
   <Id Name="System.Storyboarding.WindowsAppIcons.Play" Revision="1" Stencil="System.Storyboarding.WindowsAppIcons" StencilVersion="0.1"/>
 </Control>
 </file>
 
-<file path=customXml/item28.xml><?xml version="1.0" encoding="utf-8"?>
-<Control xmlns="http://schemas.microsoft.com/VisualStudio/2011/storyboarding/control">
-  <Id Name="32035d07-bc66-4a79-8001-2507012193e3" RevisionId="7f6cc906-8fab-4878-8f41-90bcdc4e860e" Stencil="172d6d98-e5c9-42e9-a209-79f7a94bbd38" StencilRevisionId="00000000-0000-0000-0000-000000000000" StencilVersion="0.0"/>
-</Control>
-</file>
-
-<file path=customXml/item29.xml><?xml version="1.0" encoding="utf-8"?>
-<Control xmlns="http://schemas.microsoft.com/VisualStudio/2011/storyboarding/control">
-  <Id Name="System.Storyboarding.WindowsAppIcons.Edit" Revision="1" Stencil="System.Storyboarding.WindowsAppIcons" StencilVersion="0.1"/>
-</Control>
-</file>
-
-<file path=customXml/item3.xml><?xml version="1.0" encoding="utf-8"?>
-<Control xmlns="http://schemas.microsoft.com/VisualStudio/2011/storyboarding/control">
-  <Id Name="System.Storyboarding.WindowsAppIcons.Retweet" Revision="1" Stencil="System.Storyboarding.WindowsAppIcons" StencilVersion="0.1"/>
-</Control>
-</file>
-
-<file path=customXml/item30.xml><?xml version="1.0" encoding="utf-8"?>
-<Control xmlns="http://schemas.microsoft.com/VisualStudio/2011/storyboarding/control">
-  <Id Name="System.Storyboarding.WindowsPhoneIcons.Cancel" Revision="1" Stencil="System.Storyboarding.WindowsPhoneIcons" StencilVersion="0.1"/>
-</Control>
-</file>
-
-<file path=customXml/item31.xml><?xml version="1.0" encoding="utf-8"?>
+<file path=customXml/item41.xml><?xml version="1.0" encoding="utf-8"?>
 <Control xmlns="http://schemas.microsoft.com/VisualStudio/2011/storyboarding/control">
   <Id Name="System.Storyboarding.WindowsAppIcons.Play" Revision="1" Stencil="System.Storyboarding.WindowsAppIcons" StencilVersion="0.1"/>
-</Control>
-</file>
-
-<file path=customXml/item32.xml><?xml version="1.0" encoding="utf-8"?>
-<Control xmlns="http://schemas.microsoft.com/VisualStudio/2011/storyboarding/control">
-  <Id Name="System.Storyboarding.WindowsPhoneIcons.Cancel" Revision="1" Stencil="System.Storyboarding.WindowsPhoneIcons" StencilVersion="0.1"/>
-</Control>
-</file>
-
-<file path=customXml/item33.xml><?xml version="1.0" encoding="utf-8"?>
-<Control xmlns="http://schemas.microsoft.com/VisualStudio/2011/storyboarding/control">
-  <Id Name="System.Storyboarding.WindowsAppIcons.Edit" Revision="1" Stencil="System.Storyboarding.WindowsAppIcons" StencilVersion="0.1"/>
-</Control>
-</file>
-
-<file path=customXml/item34.xml><?xml version="1.0" encoding="utf-8"?>
-<Control xmlns="http://schemas.microsoft.com/VisualStudio/2011/storyboarding/control">
-  <Id Name="System.Storyboarding.WindowsPhoneIcons.FastForward" Revision="1" Stencil="System.Storyboarding.WindowsPhoneIcons" StencilVersion="0.1"/>
-</Control>
-</file>
-
-<file path=customXml/item35.xml><?xml version="1.0" encoding="utf-8"?>
-<Control xmlns="http://schemas.microsoft.com/VisualStudio/2011/storyboarding/control">
-  <Id Name="System.Storyboarding.WindowsPhoneIcons.Add" Revision="1" Stencil="System.Storyboarding.WindowsPhoneIcons" StencilVersion="0.1"/>
-</Control>
-</file>
-
-<file path=customXml/item36.xml><?xml version="1.0" encoding="utf-8"?>
-<Control xmlns="http://schemas.microsoft.com/VisualStudio/2011/storyboarding/control">
-  <Id Name="System.Storyboarding.WindowsAppIcons.Minus" Revision="1" Stencil="System.Storyboarding.WindowsAppIcons" StencilVersion="0.1"/>
-</Control>
-</file>
-
-<file path=customXml/item37.xml><?xml version="1.0" encoding="utf-8"?>
-<Control xmlns="http://schemas.microsoft.com/VisualStudio/2011/storyboarding/control">
-  <Id Name="System.Storyboarding.WindowsPhoneIcons.Minus" Revision="1" Stencil="System.Storyboarding.WindowsPhoneIcons" StencilVersion="0.1"/>
-</Control>
-</file>
-
-<file path=customXml/item38.xml><?xml version="1.0" encoding="utf-8"?>
-<Control xmlns="http://schemas.microsoft.com/VisualStudio/2011/storyboarding/control">
-  <Id Name="System.Storyboarding.WindowsAppIcons.Plus" Revision="1" Stencil="System.Storyboarding.WindowsAppIcons" StencilVersion="0.1"/>
-</Control>
-</file>
-
-<file path=customXml/item39.xml><?xml version="1.0" encoding="utf-8"?>
-<Control xmlns="http://schemas.microsoft.com/VisualStudio/2011/storyboarding/control">
-  <Id Name="System.Storyboarding.WindowsAppIcons.Edit" Revision="1" Stencil="System.Storyboarding.WindowsAppIcons" StencilVersion="0.1"/>
-</Control>
-</file>
-
-<file path=customXml/item4.xml><?xml version="1.0" encoding="utf-8"?>
-<Control xmlns="http://schemas.microsoft.com/VisualStudio/2011/storyboarding/control">
-  <Id Name="System.Storyboarding.WindowsAppIcons.Play" Revision="1" Stencil="System.Storyboarding.WindowsAppIcons" StencilVersion="0.1"/>
-</Control>
-</file>
-
-<file path=customXml/item40.xml><?xml version="1.0" encoding="utf-8"?>
-<Control xmlns="http://schemas.microsoft.com/VisualStudio/2011/storyboarding/control">
-  <Id Name="System.Storyboarding.WindowsPhoneIcons.Cancel" Revision="1" Stencil="System.Storyboarding.WindowsPhoneIcons" StencilVersion="0.1"/>
-</Control>
-</file>
-
-<file path=customXml/item41.xml><?xml version="1.0" encoding="utf-8"?>
-<Control xmlns="http://schemas.microsoft.com/VisualStudio/2011/storyboarding/control">
-  <Id Name="System.Storyboarding.WindowsPhoneIcons.Cancel" Revision="1" Stencil="System.Storyboarding.WindowsPhoneIcons" StencilVersion="0.1"/>
 </Control>
 </file>
 
@@ -13275,49 +13314,49 @@
 
 <file path=customXml/item43.xml><?xml version="1.0" encoding="utf-8"?>
 <Control xmlns="http://schemas.microsoft.com/VisualStudio/2011/storyboarding/control">
+  <Id Name="System.Storyboarding.WindowsAppIcons.Edit" Revision="1" Stencil="System.Storyboarding.WindowsAppIcons" StencilVersion="0.1"/>
+</Control>
+</file>
+
+<file path=customXml/item44.xml><?xml version="1.0" encoding="utf-8"?>
+<Control xmlns="http://schemas.microsoft.com/VisualStudio/2011/storyboarding/control">
+  <Id Name="System.Storyboarding.WindowsAppIcons.Edit" Revision="1" Stencil="System.Storyboarding.WindowsAppIcons" StencilVersion="0.1"/>
+</Control>
+</file>
+
+<file path=customXml/item45.xml><?xml version="1.0" encoding="utf-8"?>
+<Control xmlns="http://schemas.microsoft.com/VisualStudio/2011/storyboarding/control">
+  <Id Name="System.Storyboarding.WindowsAppIcons.Down" Revision="1" Stencil="System.Storyboarding.WindowsAppIcons" StencilVersion="0.1"/>
+</Control>
+</file>
+
+<file path=customXml/item46.xml><?xml version="1.0" encoding="utf-8"?>
+<Control xmlns="http://schemas.microsoft.com/VisualStudio/2011/storyboarding/control">
   <Id Name="System.Storyboarding.WindowsAppIcons.Play" Revision="1" Stencil="System.Storyboarding.WindowsAppIcons" StencilVersion="0.1"/>
 </Control>
 </file>
 
-<file path=customXml/item44.xml><?xml version="1.0" encoding="utf-8"?>
+<file path=customXml/item47.xml><?xml version="1.0" encoding="utf-8"?>
+<Control xmlns="http://schemas.microsoft.com/VisualStudio/2011/storyboarding/control">
+  <Id Name="System.Storyboarding.WindowsAppIcons.Edit" Revision="1" Stencil="System.Storyboarding.WindowsAppIcons" StencilVersion="0.1"/>
+</Control>
+</file>
+
+<file path=customXml/item48.xml><?xml version="1.0" encoding="utf-8"?>
+<Control xmlns="http://schemas.microsoft.com/VisualStudio/2011/storyboarding/control">
+  <Id Name="System.Storyboarding.WindowsAppIcons.Play" Revision="1" Stencil="System.Storyboarding.WindowsAppIcons" StencilVersion="0.1"/>
+</Control>
+</file>
+
+<file path=customXml/item49.xml><?xml version="1.0" encoding="utf-8"?>
 <Control xmlns="http://schemas.microsoft.com/VisualStudio/2011/storyboarding/control">
   <Id Name="System.Storyboarding.WindowsPhoneIcons.Cancel" Revision="1" Stencil="System.Storyboarding.WindowsPhoneIcons" StencilVersion="0.1"/>
 </Control>
 </file>
 
-<file path=customXml/item45.xml><?xml version="1.0" encoding="utf-8"?>
-<Control xmlns="http://schemas.microsoft.com/VisualStudio/2011/storyboarding/control">
-  <Id Name="System.Storyboarding.WindowsAppIcons.Edit" Revision="1" Stencil="System.Storyboarding.WindowsAppIcons" StencilVersion="0.1"/>
-</Control>
-</file>
-
-<file path=customXml/item46.xml><?xml version="1.0" encoding="utf-8"?>
-<Control xmlns="http://schemas.microsoft.com/VisualStudio/2011/storyboarding/control">
-  <Id Name="System.Storyboarding.WindowsAppIcons.Edit" Revision="1" Stencil="System.Storyboarding.WindowsAppIcons" StencilVersion="0.1"/>
-</Control>
-</file>
-
-<file path=customXml/item47.xml><?xml version="1.0" encoding="utf-8"?>
-<Control xmlns="http://schemas.microsoft.com/VisualStudio/2011/storyboarding/control">
-  <Id Name="System.Storyboarding.WindowsPhoneIcons.Rewind" Revision="1" Stencil="System.Storyboarding.WindowsPhoneIcons" StencilVersion="0.1"/>
-</Control>
-</file>
-
-<file path=customXml/item48.xml><?xml version="1.0" encoding="utf-8"?>
-<Control xmlns="http://schemas.microsoft.com/VisualStudio/2011/storyboarding/control">
-  <Id Name="System.Storyboarding.WindowsAppIcons.Donotwant" Revision="1" Stencil="System.Storyboarding.WindowsAppIcons" StencilVersion="0.1"/>
-</Control>
-</file>
-
-<file path=customXml/item49.xml><?xml version="1.0" encoding="utf-8"?>
-<Control xmlns="http://schemas.microsoft.com/VisualStudio/2011/storyboarding/control">
-  <Id Name="System.Storyboarding.WindowsAppIcons.Edit" Revision="1" Stencil="System.Storyboarding.WindowsAppIcons" StencilVersion="0.1"/>
-</Control>
-</file>
-
 <file path=customXml/item5.xml><?xml version="1.0" encoding="utf-8"?>
 <Control xmlns="http://schemas.microsoft.com/VisualStudio/2011/storyboarding/control">
-  <Id Name="System.Storyboarding.Icons.Volume" Revision="1" Stencil="System.Storyboarding.Icons" StencilVersion="0.1"/>
+  <Id Name="System.Storyboarding.WindowsAppIcons.Clock" Revision="1" Stencil="System.Storyboarding.WindowsAppIcons" StencilVersion="0.1"/>
 </Control>
 </file>
 
@@ -13329,7 +13368,7 @@
 
 <file path=customXml/item51.xml><?xml version="1.0" encoding="utf-8"?>
 <Control xmlns="http://schemas.microsoft.com/VisualStudio/2011/storyboarding/control">
-  <Id Name="System.Storyboarding.WindowsAppIcons.Play" Revision="1" Stencil="System.Storyboarding.WindowsAppIcons" StencilVersion="0.1"/>
+  <Id Name="System.Storyboarding.WindowsPhoneIcons.FastForward" Revision="1" Stencil="System.Storyboarding.WindowsPhoneIcons" StencilVersion="0.1"/>
 </Control>
 </file>
 
@@ -13341,13 +13380,13 @@
 
 <file path=customXml/item53.xml><?xml version="1.0" encoding="utf-8"?>
 <Control xmlns="http://schemas.microsoft.com/VisualStudio/2011/storyboarding/control">
-  <Id Name="4b4d62c4-0b58-49c3-9bd5-0f2c494cd34e" RevisionId="df283dbf-c6b0-49ce-bc2c-3341a4271bd3" Stencil="172d6d98-e5c9-42e9-a209-79f7a94bbd38" StencilRevisionId="00000000-0000-0000-0000-000000000000" StencilVersion="0.0"/>
+  <Id Name="System.Storyboarding.WindowsPhoneIcons.Cancel" Revision="1" Stencil="System.Storyboarding.WindowsPhoneIcons" StencilVersion="0.1"/>
 </Control>
 </file>
 
 <file path=customXml/item54.xml><?xml version="1.0" encoding="utf-8"?>
 <Control xmlns="http://schemas.microsoft.com/VisualStudio/2011/storyboarding/control">
-  <Id Name="System.Storyboarding.WindowsAppIcons.Edit" Revision="1" Stencil="System.Storyboarding.WindowsAppIcons" StencilVersion="0.1"/>
+  <Id Name="System.Storyboarding.WindowsAppIcons.Clock" Revision="1" Stencil="System.Storyboarding.WindowsAppIcons" StencilVersion="0.1"/>
 </Control>
 </file>
 
@@ -13359,37 +13398,37 @@
 
 <file path=customXml/item56.xml><?xml version="1.0" encoding="utf-8"?>
 <Control xmlns="http://schemas.microsoft.com/VisualStudio/2011/storyboarding/control">
-  <Id Name="System.Storyboarding.WindowsAppIcons.Play" Revision="1" Stencil="System.Storyboarding.WindowsAppIcons" StencilVersion="0.1"/>
+  <Id Name="System.Storyboarding.WindowsAppIcons.Edit" Revision="1" Stencil="System.Storyboarding.WindowsAppIcons" StencilVersion="0.1"/>
 </Control>
 </file>
 
 <file path=customXml/item57.xml><?xml version="1.0" encoding="utf-8"?>
 <Control xmlns="http://schemas.microsoft.com/VisualStudio/2011/storyboarding/control">
-  <Id Name="System.Storyboarding.WindowsAppIcons.Plus" Revision="1" Stencil="System.Storyboarding.WindowsAppIcons" StencilVersion="0.1"/>
+  <Id Name="System.Storyboarding.WindowsAppIcons.Minus" Revision="1" Stencil="System.Storyboarding.WindowsAppIcons" StencilVersion="0.1"/>
 </Control>
 </file>
 
 <file path=customXml/item58.xml><?xml version="1.0" encoding="utf-8"?>
 <Control xmlns="http://schemas.microsoft.com/VisualStudio/2011/storyboarding/control">
-  <Id Name="System.Storyboarding.WindowsAppIcons.Clock" Revision="1" Stencil="System.Storyboarding.WindowsAppIcons" StencilVersion="0.1"/>
+  <Id Name="System.Storyboarding.WindowsPhoneIcons.Cancel" Revision="1" Stencil="System.Storyboarding.WindowsPhoneIcons" StencilVersion="0.1"/>
 </Control>
 </file>
 
 <file path=customXml/item59.xml><?xml version="1.0" encoding="utf-8"?>
+<Control xmlns="http://schemas.microsoft.com/VisualStudio/2011/storyboarding/control">
+  <Id Name="System.Storyboarding.WindowsAppIcons.Edit" Revision="1" Stencil="System.Storyboarding.WindowsAppIcons" StencilVersion="0.1"/>
+</Control>
+</file>
+
+<file path=customXml/item6.xml><?xml version="1.0" encoding="utf-8"?>
 <Control xmlns="http://schemas.microsoft.com/VisualStudio/2011/storyboarding/control">
   <Id Name="System.Storyboarding.Icons.Volume" Revision="1" Stencil="System.Storyboarding.Icons" StencilVersion="0.1"/>
 </Control>
 </file>
 
-<file path=customXml/item6.xml><?xml version="1.0" encoding="utf-8"?>
-<Control xmlns="http://schemas.microsoft.com/VisualStudio/2011/storyboarding/control">
-  <Id Name="32035d07-bc66-4a79-8001-2507012193e3" RevisionId="7f6cc906-8fab-4878-8f41-90bcdc4e860e" Stencil="172d6d98-e5c9-42e9-a209-79f7a94bbd38" StencilRevisionId="00000000-0000-0000-0000-000000000000" StencilVersion="0.0"/>
-</Control>
-</file>
-
 <file path=customXml/item60.xml><?xml version="1.0" encoding="utf-8"?>
 <Control xmlns="http://schemas.microsoft.com/VisualStudio/2011/storyboarding/control">
-  <Id Name="System.Storyboarding.WindowsAppIcons.Edit" Revision="1" Stencil="System.Storyboarding.WindowsAppIcons" StencilVersion="0.1"/>
+  <Id Name="System.Storyboarding.WindowsPhoneIcons.Add" Revision="1" Stencil="System.Storyboarding.WindowsPhoneIcons" StencilVersion="0.1"/>
 </Control>
 </file>
 
@@ -13401,7 +13440,7 @@
 
 <file path=customXml/item62.xml><?xml version="1.0" encoding="utf-8"?>
 <Control xmlns="http://schemas.microsoft.com/VisualStudio/2011/storyboarding/control">
-  <Id Name="System.Storyboarding.Icons.Volume" Revision="1" Stencil="System.Storyboarding.Icons" StencilVersion="0.1"/>
+  <Id Name="System.Storyboarding.WindowsPhoneIcons.Cancel" Revision="1" Stencil="System.Storyboarding.WindowsPhoneIcons" StencilVersion="0.1"/>
 </Control>
 </file>
 
@@ -13413,53 +13452,253 @@
 
 <file path=customXml/item64.xml><?xml version="1.0" encoding="utf-8"?>
 <Control xmlns="http://schemas.microsoft.com/VisualStudio/2011/storyboarding/control">
-  <Id Name="e75cd7fd-d454-43ac-a2bd-cf0ac4f48652" RevisionId="8831f7ae-9100-4ae6-a512-25e5a2ad6d46" Stencil="172d6d98-e5c9-42e9-a209-79f7a94bbd38" StencilRevisionId="00000000-0000-0000-0000-000000000000" StencilVersion="0.0"/>
+  <Id Name="System.Storyboarding.WindowsPhoneIcons.Cancel" Revision="1" Stencil="System.Storyboarding.WindowsPhoneIcons" StencilVersion="0.1"/>
 </Control>
 </file>
 
 <file path=customXml/item65.xml><?xml version="1.0" encoding="utf-8"?>
 <Control xmlns="http://schemas.microsoft.com/VisualStudio/2011/storyboarding/control">
-  <Id Name="System.Storyboarding.WindowsAppIcons.Down" Revision="1" Stencil="System.Storyboarding.WindowsAppIcons" StencilVersion="0.1"/>
+  <Id Name="System.Storyboarding.WindowsPhoneIcons.Rewind" Revision="1" Stencil="System.Storyboarding.WindowsPhoneIcons" StencilVersion="0.1"/>
 </Control>
 </file>
 
 <file path=customXml/item66.xml><?xml version="1.0" encoding="utf-8"?>
 <Control xmlns="http://schemas.microsoft.com/VisualStudio/2011/storyboarding/control">
-  <Id Name="System.Storyboarding.WindowsPhoneIcons.Add" Revision="1" Stencil="System.Storyboarding.WindowsPhoneIcons" StencilVersion="0.1"/>
+  <Id Name="System.Storyboarding.WindowsAppIcons.Play" Revision="1" Stencil="System.Storyboarding.WindowsAppIcons" StencilVersion="0.1"/>
 </Control>
 </file>
 
 <file path=customXml/item67.xml><?xml version="1.0" encoding="utf-8"?>
-<Control xmlns="http://schemas.microsoft.com/VisualStudio/2011/storyboarding/control">
-  <Id Name="System.Storyboarding.WindowsPhoneIcons.Add" Revision="1" Stencil="System.Storyboarding.WindowsPhoneIcons" StencilVersion="0.1"/>
-</Control>
-</file>
-
-<file path=customXml/item68.xml><?xml version="1.0" encoding="utf-8"?>
 <Control xmlns="http://schemas.microsoft.com/VisualStudio/2011/storyboarding/control">
   <Id Name="System.Storyboarding.Icons.FolderOpen" Revision="1" Stencil="System.Storyboarding.Icons" StencilVersion="0.1"/>
 </Control>
 </file>
 
+<file path=customXml/item68.xml><?xml version="1.0" encoding="utf-8"?>
+<Control xmlns="http://schemas.microsoft.com/VisualStudio/2011/storyboarding/control">
+  <Id Name="System.Storyboarding.WindowsAppIcons.Edit" Revision="1" Stencil="System.Storyboarding.WindowsAppIcons" StencilVersion="0.1"/>
+</Control>
+</file>
+
 <file path=customXml/item7.xml><?xml version="1.0" encoding="utf-8"?>
 <Control xmlns="http://schemas.microsoft.com/VisualStudio/2011/storyboarding/control">
-  <Id Name="System.Storyboarding.WindowsAppIcons.Clock" Revision="1" Stencil="System.Storyboarding.WindowsAppIcons" StencilVersion="0.1"/>
+  <Id Name="System.Storyboarding.WindowsAppIcons.Edit" Revision="1" Stencil="System.Storyboarding.WindowsAppIcons" StencilVersion="0.1"/>
 </Control>
 </file>
 
 <file path=customXml/item8.xml><?xml version="1.0" encoding="utf-8"?>
+<Control xmlns="http://schemas.microsoft.com/VisualStudio/2011/storyboarding/control">
+  <Id Name="System.Storyboarding.WindowsAppIcons.Play" Revision="1" Stencil="System.Storyboarding.WindowsAppIcons" StencilVersion="0.1"/>
+</Control>
+</file>
+
+<file path=customXml/item9.xml><?xml version="1.0" encoding="utf-8"?>
 <Control xmlns="http://schemas.microsoft.com/VisualStudio/2011/storyboarding/control">
   <Id Name="System.Storyboarding.WindowsPhoneIcons.Cancel" Revision="1" Stencil="System.Storyboarding.WindowsPhoneIcons" StencilVersion="0.1"/>
 </Control>
 </file>
 
-<file path=customXml/item9.xml><?xml version="1.0" encoding="utf-8"?>
-<Control xmlns="http://schemas.microsoft.com/VisualStudio/2011/storyboarding/control">
-  <Id Name="System.Storyboarding.WindowsAppIcons.Edit" Revision="1" Stencil="System.Storyboarding.WindowsAppIcons" StencilVersion="0.1"/>
-</Control>
-</file>
-
 <file path=customXml/itemProps1.xml><?xml version="1.0" encoding="utf-8"?>
+<ds:datastoreItem xmlns:ds="http://schemas.openxmlformats.org/officeDocument/2006/customXml" ds:itemID="{541D200C-886D-4393-A468-D257F7CE4C2E}">
+  <ds:schemaRefs>
+    <ds:schemaRef ds:uri="http://schemas.microsoft.com/VisualStudio/2011/storyboarding/control"/>
+  </ds:schemaRefs>
+</ds:datastoreItem>
+</file>
+
+<file path=customXml/itemProps10.xml><?xml version="1.0" encoding="utf-8"?>
+<ds:datastoreItem xmlns:ds="http://schemas.openxmlformats.org/officeDocument/2006/customXml" ds:itemID="{1D5DC517-E715-4F56-B43C-13839AE337F0}">
+  <ds:schemaRefs>
+    <ds:schemaRef ds:uri="http://schemas.microsoft.com/VisualStudio/2011/storyboarding/control"/>
+  </ds:schemaRefs>
+</ds:datastoreItem>
+</file>
+
+<file path=customXml/itemProps11.xml><?xml version="1.0" encoding="utf-8"?>
+<ds:datastoreItem xmlns:ds="http://schemas.openxmlformats.org/officeDocument/2006/customXml" ds:itemID="{69819B4B-C652-4029-9D6F-1F30F2207B1C}">
+  <ds:schemaRefs>
+    <ds:schemaRef ds:uri="http://schemas.microsoft.com/VisualStudio/2011/storyboarding/control"/>
+  </ds:schemaRefs>
+</ds:datastoreItem>
+</file>
+
+<file path=customXml/itemProps12.xml><?xml version="1.0" encoding="utf-8"?>
+<ds:datastoreItem xmlns:ds="http://schemas.openxmlformats.org/officeDocument/2006/customXml" ds:itemID="{182A85CA-4E58-49C8-8C48-758766C210A9}">
+  <ds:schemaRefs>
+    <ds:schemaRef ds:uri="http://schemas.microsoft.com/VisualStudio/2011/storyboarding/control"/>
+  </ds:schemaRefs>
+</ds:datastoreItem>
+</file>
+
+<file path=customXml/itemProps13.xml><?xml version="1.0" encoding="utf-8"?>
+<ds:datastoreItem xmlns:ds="http://schemas.openxmlformats.org/officeDocument/2006/customXml" ds:itemID="{F7BFCA9F-A0B1-4AC1-AD74-CE9E4213160F}">
+  <ds:schemaRefs>
+    <ds:schemaRef ds:uri="http://schemas.microsoft.com/VisualStudio/2011/storyboarding/control"/>
+  </ds:schemaRefs>
+</ds:datastoreItem>
+</file>
+
+<file path=customXml/itemProps14.xml><?xml version="1.0" encoding="utf-8"?>
+<ds:datastoreItem xmlns:ds="http://schemas.openxmlformats.org/officeDocument/2006/customXml" ds:itemID="{10C4D8A6-492F-4C3D-BAAD-8273F297A317}">
+  <ds:schemaRefs>
+    <ds:schemaRef ds:uri="http://schemas.microsoft.com/VisualStudio/2011/storyboarding/control"/>
+  </ds:schemaRefs>
+</ds:datastoreItem>
+</file>
+
+<file path=customXml/itemProps15.xml><?xml version="1.0" encoding="utf-8"?>
+<ds:datastoreItem xmlns:ds="http://schemas.openxmlformats.org/officeDocument/2006/customXml" ds:itemID="{FF1022A0-DAA8-4910-B054-25E1EE26A5AC}">
+  <ds:schemaRefs>
+    <ds:schemaRef ds:uri="http://schemas.microsoft.com/VisualStudio/2011/storyboarding/control"/>
+  </ds:schemaRefs>
+</ds:datastoreItem>
+</file>
+
+<file path=customXml/itemProps16.xml><?xml version="1.0" encoding="utf-8"?>
+<ds:datastoreItem xmlns:ds="http://schemas.openxmlformats.org/officeDocument/2006/customXml" ds:itemID="{B24B058A-7394-4884-87AB-3D162B4AF263}">
+  <ds:schemaRefs>
+    <ds:schemaRef ds:uri="http://schemas.microsoft.com/VisualStudio/2011/storyboarding/control"/>
+  </ds:schemaRefs>
+</ds:datastoreItem>
+</file>
+
+<file path=customXml/itemProps17.xml><?xml version="1.0" encoding="utf-8"?>
+<ds:datastoreItem xmlns:ds="http://schemas.openxmlformats.org/officeDocument/2006/customXml" ds:itemID="{D8EE4C6F-B1D4-4AC9-928F-40B58F8389AA}">
+  <ds:schemaRefs>
+    <ds:schemaRef ds:uri="http://schemas.microsoft.com/VisualStudio/2011/storyboarding/control"/>
+  </ds:schemaRefs>
+</ds:datastoreItem>
+</file>
+
+<file path=customXml/itemProps18.xml><?xml version="1.0" encoding="utf-8"?>
+<ds:datastoreItem xmlns:ds="http://schemas.openxmlformats.org/officeDocument/2006/customXml" ds:itemID="{96BD8081-566A-4B7A-9794-537613F8A560}">
+  <ds:schemaRefs>
+    <ds:schemaRef ds:uri="http://schemas.microsoft.com/VisualStudio/2011/storyboarding/control"/>
+  </ds:schemaRefs>
+</ds:datastoreItem>
+</file>
+
+<file path=customXml/itemProps19.xml><?xml version="1.0" encoding="utf-8"?>
+<ds:datastoreItem xmlns:ds="http://schemas.openxmlformats.org/officeDocument/2006/customXml" ds:itemID="{AEE75C41-50A0-4E2E-8E71-75152E4221D1}">
+  <ds:schemaRefs>
+    <ds:schemaRef ds:uri="http://schemas.microsoft.com/VisualStudio/2011/storyboarding/control"/>
+  </ds:schemaRefs>
+</ds:datastoreItem>
+</file>
+
+<file path=customXml/itemProps2.xml><?xml version="1.0" encoding="utf-8"?>
+<ds:datastoreItem xmlns:ds="http://schemas.openxmlformats.org/officeDocument/2006/customXml" ds:itemID="{2D4E3CDC-752C-421E-817A-A9D2344595DE}">
+  <ds:schemaRefs>
+    <ds:schemaRef ds:uri="http://schemas.microsoft.com/VisualStudio/2011/storyboarding/control"/>
+  </ds:schemaRefs>
+</ds:datastoreItem>
+</file>
+
+<file path=customXml/itemProps20.xml><?xml version="1.0" encoding="utf-8"?>
+<ds:datastoreItem xmlns:ds="http://schemas.openxmlformats.org/officeDocument/2006/customXml" ds:itemID="{BC2C5481-5539-4A2E-88CE-EE6972284F48}">
+  <ds:schemaRefs>
+    <ds:schemaRef ds:uri="http://schemas.microsoft.com/VisualStudio/2011/storyboarding/control"/>
+  </ds:schemaRefs>
+</ds:datastoreItem>
+</file>
+
+<file path=customXml/itemProps21.xml><?xml version="1.0" encoding="utf-8"?>
+<ds:datastoreItem xmlns:ds="http://schemas.openxmlformats.org/officeDocument/2006/customXml" ds:itemID="{E3E34527-CBA0-4787-B0F7-C2B934B5B4C4}">
+  <ds:schemaRefs>
+    <ds:schemaRef ds:uri="http://schemas.microsoft.com/VisualStudio/2011/storyboarding/control"/>
+  </ds:schemaRefs>
+</ds:datastoreItem>
+</file>
+
+<file path=customXml/itemProps22.xml><?xml version="1.0" encoding="utf-8"?>
+<ds:datastoreItem xmlns:ds="http://schemas.openxmlformats.org/officeDocument/2006/customXml" ds:itemID="{6E845879-650B-4022-A35E-856E74320ACC}">
+  <ds:schemaRefs>
+    <ds:schemaRef ds:uri="http://schemas.microsoft.com/VisualStudio/2011/storyboarding/control"/>
+  </ds:schemaRefs>
+</ds:datastoreItem>
+</file>
+
+<file path=customXml/itemProps23.xml><?xml version="1.0" encoding="utf-8"?>
+<ds:datastoreItem xmlns:ds="http://schemas.openxmlformats.org/officeDocument/2006/customXml" ds:itemID="{FB9740A1-8F0C-4AA2-A2C9-15A377DC91A6}">
+  <ds:schemaRefs>
+    <ds:schemaRef ds:uri="http://schemas.microsoft.com/VisualStudio/2011/storyboarding/control"/>
+  </ds:schemaRefs>
+</ds:datastoreItem>
+</file>
+
+<file path=customXml/itemProps24.xml><?xml version="1.0" encoding="utf-8"?>
+<ds:datastoreItem xmlns:ds="http://schemas.openxmlformats.org/officeDocument/2006/customXml" ds:itemID="{7C81862B-608B-4E4F-9DB1-7DBCFE9F2139}">
+  <ds:schemaRefs>
+    <ds:schemaRef ds:uri="http://schemas.microsoft.com/VisualStudio/2011/storyboarding/control"/>
+  </ds:schemaRefs>
+</ds:datastoreItem>
+</file>
+
+<file path=customXml/itemProps25.xml><?xml version="1.0" encoding="utf-8"?>
+<ds:datastoreItem xmlns:ds="http://schemas.openxmlformats.org/officeDocument/2006/customXml" ds:itemID="{34422DFF-D2BE-4305-8DA3-E0E99CFA01F4}">
+  <ds:schemaRefs>
+    <ds:schemaRef ds:uri="http://schemas.microsoft.com/VisualStudio/2011/storyboarding/control"/>
+  </ds:schemaRefs>
+</ds:datastoreItem>
+</file>
+
+<file path=customXml/itemProps26.xml><?xml version="1.0" encoding="utf-8"?>
+<ds:datastoreItem xmlns:ds="http://schemas.openxmlformats.org/officeDocument/2006/customXml" ds:itemID="{A822EFA2-5211-415D-91B1-1D2F11D7CBDF}">
+  <ds:schemaRefs>
+    <ds:schemaRef ds:uri="http://schemas.microsoft.com/VisualStudio/2011/storyboarding/control"/>
+  </ds:schemaRefs>
+</ds:datastoreItem>
+</file>
+
+<file path=customXml/itemProps27.xml><?xml version="1.0" encoding="utf-8"?>
+<ds:datastoreItem xmlns:ds="http://schemas.openxmlformats.org/officeDocument/2006/customXml" ds:itemID="{ECEE1C58-60D6-4BE6-B599-4F7E9AB9E035}">
+  <ds:schemaRefs>
+    <ds:schemaRef ds:uri="http://schemas.microsoft.com/VisualStudio/2011/storyboarding/control"/>
+  </ds:schemaRefs>
+</ds:datastoreItem>
+</file>
+
+<file path=customXml/itemProps28.xml><?xml version="1.0" encoding="utf-8"?>
+<ds:datastoreItem xmlns:ds="http://schemas.openxmlformats.org/officeDocument/2006/customXml" ds:itemID="{A76A203E-9FD7-42C2-8FEF-B018DFF7E4D1}">
+  <ds:schemaRefs>
+    <ds:schemaRef ds:uri="http://schemas.microsoft.com/VisualStudio/2011/storyboarding/control"/>
+  </ds:schemaRefs>
+</ds:datastoreItem>
+</file>
+
+<file path=customXml/itemProps29.xml><?xml version="1.0" encoding="utf-8"?>
+<ds:datastoreItem xmlns:ds="http://schemas.openxmlformats.org/officeDocument/2006/customXml" ds:itemID="{FDB8CFE8-3808-4247-A2FD-35E246A153DC}">
+  <ds:schemaRefs>
+    <ds:schemaRef ds:uri="http://schemas.microsoft.com/VisualStudio/2011/storyboarding/control"/>
+  </ds:schemaRefs>
+</ds:datastoreItem>
+</file>
+
+<file path=customXml/itemProps3.xml><?xml version="1.0" encoding="utf-8"?>
+<ds:datastoreItem xmlns:ds="http://schemas.openxmlformats.org/officeDocument/2006/customXml" ds:itemID="{0CAA02FD-32C9-42E8-98BE-0EAAD29173F4}">
+  <ds:schemaRefs>
+    <ds:schemaRef ds:uri="http://schemas.microsoft.com/VisualStudio/2011/storyboarding/control"/>
+  </ds:schemaRefs>
+</ds:datastoreItem>
+</file>
+
+<file path=customXml/itemProps30.xml><?xml version="1.0" encoding="utf-8"?>
+<ds:datastoreItem xmlns:ds="http://schemas.openxmlformats.org/officeDocument/2006/customXml" ds:itemID="{80A2EE3F-8E5E-4E02-8371-075F75881CC2}">
+  <ds:schemaRefs>
+    <ds:schemaRef ds:uri="http://schemas.microsoft.com/VisualStudio/2011/storyboarding/control"/>
+  </ds:schemaRefs>
+</ds:datastoreItem>
+</file>
+
+<file path=customXml/itemProps31.xml><?xml version="1.0" encoding="utf-8"?>
+<ds:datastoreItem xmlns:ds="http://schemas.openxmlformats.org/officeDocument/2006/customXml" ds:itemID="{43B5ED86-0060-4D69-806F-5CA89175AE14}">
+  <ds:schemaRefs>
+    <ds:schemaRef ds:uri="http://schemas.microsoft.com/VisualStudio/2011/storyboarding/control"/>
+  </ds:schemaRefs>
+</ds:datastoreItem>
+</file>
+
+<file path=customXml/itemProps32.xml><?xml version="1.0" encoding="utf-8"?>
 <ds:datastoreItem xmlns:ds="http://schemas.openxmlformats.org/officeDocument/2006/customXml" ds:itemID="{CC557381-0DF9-4AE0-A746-74A48780A5BE}">
   <ds:schemaRefs>
     <ds:schemaRef ds:uri="http://schemas.microsoft.com/VisualStudio/2011/storyboarding/control"/>
@@ -13467,7 +13706,71 @@
 </ds:datastoreItem>
 </file>
 
-<file path=customXml/itemProps10.xml><?xml version="1.0" encoding="utf-8"?>
+<file path=customXml/itemProps33.xml><?xml version="1.0" encoding="utf-8"?>
+<ds:datastoreItem xmlns:ds="http://schemas.openxmlformats.org/officeDocument/2006/customXml" ds:itemID="{896AE23B-403F-4EEC-900F-6E95A60A4CC1}">
+  <ds:schemaRefs>
+    <ds:schemaRef ds:uri="http://schemas.microsoft.com/VisualStudio/2011/storyboarding/control"/>
+  </ds:schemaRefs>
+</ds:datastoreItem>
+</file>
+
+<file path=customXml/itemProps34.xml><?xml version="1.0" encoding="utf-8"?>
+<ds:datastoreItem xmlns:ds="http://schemas.openxmlformats.org/officeDocument/2006/customXml" ds:itemID="{2693F098-32A1-41BE-97F8-CEDAE063F99E}">
+  <ds:schemaRefs>
+    <ds:schemaRef ds:uri="http://schemas.microsoft.com/VisualStudio/2011/storyboarding/control"/>
+  </ds:schemaRefs>
+</ds:datastoreItem>
+</file>
+
+<file path=customXml/itemProps35.xml><?xml version="1.0" encoding="utf-8"?>
+<ds:datastoreItem xmlns:ds="http://schemas.openxmlformats.org/officeDocument/2006/customXml" ds:itemID="{F50EEE5E-70AE-4092-8CFF-7CEEF7A1A3DA}">
+  <ds:schemaRefs>
+    <ds:schemaRef ds:uri="http://schemas.microsoft.com/VisualStudio/2011/storyboarding/control"/>
+  </ds:schemaRefs>
+</ds:datastoreItem>
+</file>
+
+<file path=customXml/itemProps36.xml><?xml version="1.0" encoding="utf-8"?>
+<ds:datastoreItem xmlns:ds="http://schemas.openxmlformats.org/officeDocument/2006/customXml" ds:itemID="{A4C33EEA-7075-4651-97E3-4829E38E21EA}">
+  <ds:schemaRefs>
+    <ds:schemaRef ds:uri="http://schemas.microsoft.com/VisualStudio/2011/storyboarding/control"/>
+  </ds:schemaRefs>
+</ds:datastoreItem>
+</file>
+
+<file path=customXml/itemProps37.xml><?xml version="1.0" encoding="utf-8"?>
+<ds:datastoreItem xmlns:ds="http://schemas.openxmlformats.org/officeDocument/2006/customXml" ds:itemID="{04504D90-2CEB-4E3A-A555-86C532BE774F}">
+  <ds:schemaRefs>
+    <ds:schemaRef ds:uri="http://schemas.microsoft.com/VisualStudio/2011/storyboarding/control"/>
+  </ds:schemaRefs>
+</ds:datastoreItem>
+</file>
+
+<file path=customXml/itemProps38.xml><?xml version="1.0" encoding="utf-8"?>
+<ds:datastoreItem xmlns:ds="http://schemas.openxmlformats.org/officeDocument/2006/customXml" ds:itemID="{61361C12-AEB1-4243-8694-E22DB7BB0B58}">
+  <ds:schemaRefs>
+    <ds:schemaRef ds:uri="http://schemas.microsoft.com/VisualStudio/2011/storyboarding/control"/>
+  </ds:schemaRefs>
+</ds:datastoreItem>
+</file>
+
+<file path=customXml/itemProps39.xml><?xml version="1.0" encoding="utf-8"?>
+<ds:datastoreItem xmlns:ds="http://schemas.openxmlformats.org/officeDocument/2006/customXml" ds:itemID="{4B90C7DA-FFAF-434B-A961-A1A1B575F753}">
+  <ds:schemaRefs>
+    <ds:schemaRef ds:uri="http://schemas.microsoft.com/VisualStudio/2011/storyboarding/control"/>
+  </ds:schemaRefs>
+</ds:datastoreItem>
+</file>
+
+<file path=customXml/itemProps4.xml><?xml version="1.0" encoding="utf-8"?>
+<ds:datastoreItem xmlns:ds="http://schemas.openxmlformats.org/officeDocument/2006/customXml" ds:itemID="{4F1F443E-6774-443F-BAD5-FCCC4103B164}">
+  <ds:schemaRefs>
+    <ds:schemaRef ds:uri="http://schemas.microsoft.com/VisualStudio/2011/storyboarding/control"/>
+  </ds:schemaRefs>
+</ds:datastoreItem>
+</file>
+
+<file path=customXml/itemProps40.xml><?xml version="1.0" encoding="utf-8"?>
 <ds:datastoreItem xmlns:ds="http://schemas.openxmlformats.org/officeDocument/2006/customXml" ds:itemID="{290B1F0A-87D8-47BA-9898-8D500A95812B}">
   <ds:schemaRefs>
     <ds:schemaRef ds:uri="http://schemas.microsoft.com/VisualStudio/2011/storyboarding/control"/>
@@ -13475,23 +13778,63 @@
 </ds:datastoreItem>
 </file>
 
-<file path=customXml/itemProps11.xml><?xml version="1.0" encoding="utf-8"?>
-<ds:datastoreItem xmlns:ds="http://schemas.openxmlformats.org/officeDocument/2006/customXml" ds:itemID="{541D200C-886D-4393-A468-D257F7CE4C2E}">
+<file path=customXml/itemProps41.xml><?xml version="1.0" encoding="utf-8"?>
+<ds:datastoreItem xmlns:ds="http://schemas.openxmlformats.org/officeDocument/2006/customXml" ds:itemID="{5B8607FE-59BB-43C3-BBC9-D002A93B2860}">
   <ds:schemaRefs>
     <ds:schemaRef ds:uri="http://schemas.microsoft.com/VisualStudio/2011/storyboarding/control"/>
   </ds:schemaRefs>
 </ds:datastoreItem>
 </file>
 
-<file path=customXml/itemProps12.xml><?xml version="1.0" encoding="utf-8"?>
-<ds:datastoreItem xmlns:ds="http://schemas.openxmlformats.org/officeDocument/2006/customXml" ds:itemID="{BC2C5481-5539-4A2E-88CE-EE6972284F48}">
+<file path=customXml/itemProps42.xml><?xml version="1.0" encoding="utf-8"?>
+<ds:datastoreItem xmlns:ds="http://schemas.openxmlformats.org/officeDocument/2006/customXml" ds:itemID="{0F4FBE72-4778-4A80-9A59-1EAA7879E88B}">
   <ds:schemaRefs>
     <ds:schemaRef ds:uri="http://schemas.microsoft.com/VisualStudio/2011/storyboarding/control"/>
   </ds:schemaRefs>
 </ds:datastoreItem>
 </file>
 
-<file path=customXml/itemProps13.xml><?xml version="1.0" encoding="utf-8"?>
+<file path=customXml/itemProps43.xml><?xml version="1.0" encoding="utf-8"?>
+<ds:datastoreItem xmlns:ds="http://schemas.openxmlformats.org/officeDocument/2006/customXml" ds:itemID="{91ED1748-2ACC-4580-9DD0-53AE211F1DA7}">
+  <ds:schemaRefs>
+    <ds:schemaRef ds:uri="http://schemas.microsoft.com/VisualStudio/2011/storyboarding/control"/>
+  </ds:schemaRefs>
+</ds:datastoreItem>
+</file>
+
+<file path=customXml/itemProps44.xml><?xml version="1.0" encoding="utf-8"?>
+<ds:datastoreItem xmlns:ds="http://schemas.openxmlformats.org/officeDocument/2006/customXml" ds:itemID="{09AAF7D3-4D9D-47F0-9621-CB53A66318C0}">
+  <ds:schemaRefs>
+    <ds:schemaRef ds:uri="http://schemas.microsoft.com/VisualStudio/2011/storyboarding/control"/>
+  </ds:schemaRefs>
+</ds:datastoreItem>
+</file>
+
+<file path=customXml/itemProps45.xml><?xml version="1.0" encoding="utf-8"?>
+<ds:datastoreItem xmlns:ds="http://schemas.openxmlformats.org/officeDocument/2006/customXml" ds:itemID="{540C3353-3E36-4F77-9C4A-0DB4A5D7CCD1}">
+  <ds:schemaRefs>
+    <ds:schemaRef ds:uri="http://schemas.microsoft.com/VisualStudio/2011/storyboarding/control"/>
+  </ds:schemaRefs>
+</ds:datastoreItem>
+</file>
+
+<file path=customXml/itemProps46.xml><?xml version="1.0" encoding="utf-8"?>
+<ds:datastoreItem xmlns:ds="http://schemas.openxmlformats.org/officeDocument/2006/customXml" ds:itemID="{66C429A6-A1FB-4A44-9868-139AEFE376E0}">
+  <ds:schemaRefs>
+    <ds:schemaRef ds:uri="http://schemas.microsoft.com/VisualStudio/2011/storyboarding/control"/>
+  </ds:schemaRefs>
+</ds:datastoreItem>
+</file>
+
+<file path=customXml/itemProps47.xml><?xml version="1.0" encoding="utf-8"?>
+<ds:datastoreItem xmlns:ds="http://schemas.openxmlformats.org/officeDocument/2006/customXml" ds:itemID="{6BD8AD1D-48A9-4F6D-9433-F36CBEB3125F}">
+  <ds:schemaRefs>
+    <ds:schemaRef ds:uri="http://schemas.microsoft.com/VisualStudio/2011/storyboarding/control"/>
+  </ds:schemaRefs>
+</ds:datastoreItem>
+</file>
+
+<file path=customXml/itemProps48.xml><?xml version="1.0" encoding="utf-8"?>
 <ds:datastoreItem xmlns:ds="http://schemas.openxmlformats.org/officeDocument/2006/customXml" ds:itemID="{5D95BE6E-D5AB-409A-85E4-CE7D6FA00509}">
   <ds:schemaRefs>
     <ds:schemaRef ds:uri="http://schemas.microsoft.com/VisualStudio/2011/storyboarding/control"/>
@@ -13499,39 +13842,7 @@
 </ds:datastoreItem>
 </file>
 
-<file path=customXml/itemProps14.xml><?xml version="1.0" encoding="utf-8"?>
-<ds:datastoreItem xmlns:ds="http://schemas.openxmlformats.org/officeDocument/2006/customXml" ds:itemID="{A6484AF2-F055-4C78-982B-D2156684306A}">
-  <ds:schemaRefs>
-    <ds:schemaRef ds:uri="http://schemas.microsoft.com/VisualStudio/2011/storyboarding/control"/>
-  </ds:schemaRefs>
-</ds:datastoreItem>
-</file>
-
-<file path=customXml/itemProps15.xml><?xml version="1.0" encoding="utf-8"?>
-<ds:datastoreItem xmlns:ds="http://schemas.openxmlformats.org/officeDocument/2006/customXml" ds:itemID="{2693F098-32A1-41BE-97F8-CEDAE063F99E}">
-  <ds:schemaRefs>
-    <ds:schemaRef ds:uri="http://schemas.microsoft.com/VisualStudio/2011/storyboarding/control"/>
-  </ds:schemaRefs>
-</ds:datastoreItem>
-</file>
-
-<file path=customXml/itemProps16.xml><?xml version="1.0" encoding="utf-8"?>
-<ds:datastoreItem xmlns:ds="http://schemas.openxmlformats.org/officeDocument/2006/customXml" ds:itemID="{6AC15D59-1985-4B02-A204-9FA5E328EF32}">
-  <ds:schemaRefs>
-    <ds:schemaRef ds:uri="http://schemas.microsoft.com/VisualStudio/2011/storyboarding/control"/>
-  </ds:schemaRefs>
-</ds:datastoreItem>
-</file>
-
-<file path=customXml/itemProps17.xml><?xml version="1.0" encoding="utf-8"?>
-<ds:datastoreItem xmlns:ds="http://schemas.openxmlformats.org/officeDocument/2006/customXml" ds:itemID="{E3E34527-CBA0-4787-B0F7-C2B934B5B4C4}">
-  <ds:schemaRefs>
-    <ds:schemaRef ds:uri="http://schemas.microsoft.com/VisualStudio/2011/storyboarding/control"/>
-  </ds:schemaRefs>
-</ds:datastoreItem>
-</file>
-
-<file path=customXml/itemProps18.xml><?xml version="1.0" encoding="utf-8"?>
+<file path=customXml/itemProps49.xml><?xml version="1.0" encoding="utf-8"?>
 <ds:datastoreItem xmlns:ds="http://schemas.openxmlformats.org/officeDocument/2006/customXml" ds:itemID="{EFA40575-6F4E-445E-9D80-B0CC775DC0E1}">
   <ds:schemaRefs>
     <ds:schemaRef ds:uri="http://schemas.microsoft.com/VisualStudio/2011/storyboarding/control"/>
@@ -13539,15 +13850,55 @@
 </ds:datastoreItem>
 </file>
 
-<file path=customXml/itemProps19.xml><?xml version="1.0" encoding="utf-8"?>
-<ds:datastoreItem xmlns:ds="http://schemas.openxmlformats.org/officeDocument/2006/customXml" ds:itemID="{EC8AFA28-5388-46A0-B0AF-CDC06E1AFD31}">
+<file path=customXml/itemProps5.xml><?xml version="1.0" encoding="utf-8"?>
+<ds:datastoreItem xmlns:ds="http://schemas.openxmlformats.org/officeDocument/2006/customXml" ds:itemID="{9176D73F-88EB-4204-941E-2ADCC7F101D3}">
   <ds:schemaRefs>
     <ds:schemaRef ds:uri="http://schemas.microsoft.com/VisualStudio/2011/storyboarding/control"/>
   </ds:schemaRefs>
 </ds:datastoreItem>
 </file>
 
-<file path=customXml/itemProps2.xml><?xml version="1.0" encoding="utf-8"?>
+<file path=customXml/itemProps50.xml><?xml version="1.0" encoding="utf-8"?>
+<ds:datastoreItem xmlns:ds="http://schemas.openxmlformats.org/officeDocument/2006/customXml" ds:itemID="{2C816A0A-85BC-4830-BAEE-1F53C8E67489}">
+  <ds:schemaRefs>
+    <ds:schemaRef ds:uri="http://schemas.microsoft.com/VisualStudio/2011/storyboarding/control"/>
+  </ds:schemaRefs>
+</ds:datastoreItem>
+</file>
+
+<file path=customXml/itemProps51.xml><?xml version="1.0" encoding="utf-8"?>
+<ds:datastoreItem xmlns:ds="http://schemas.openxmlformats.org/officeDocument/2006/customXml" ds:itemID="{8B4AE673-39D1-4921-A713-E0BD45B32E43}">
+  <ds:schemaRefs>
+    <ds:schemaRef ds:uri="http://schemas.microsoft.com/VisualStudio/2011/storyboarding/control"/>
+  </ds:schemaRefs>
+</ds:datastoreItem>
+</file>
+
+<file path=customXml/itemProps52.xml><?xml version="1.0" encoding="utf-8"?>
+<ds:datastoreItem xmlns:ds="http://schemas.openxmlformats.org/officeDocument/2006/customXml" ds:itemID="{7D8A3F15-58CA-4DA9-A6C9-5E4399E681CE}">
+  <ds:schemaRefs>
+    <ds:schemaRef ds:uri="http://schemas.microsoft.com/VisualStudio/2011/storyboarding/control"/>
+  </ds:schemaRefs>
+</ds:datastoreItem>
+</file>
+
+<file path=customXml/itemProps53.xml><?xml version="1.0" encoding="utf-8"?>
+<ds:datastoreItem xmlns:ds="http://schemas.openxmlformats.org/officeDocument/2006/customXml" ds:itemID="{35E8E4AC-13BF-495B-B0AA-5F07A0EB9441}">
+  <ds:schemaRefs>
+    <ds:schemaRef ds:uri="http://schemas.microsoft.com/VisualStudio/2011/storyboarding/control"/>
+  </ds:schemaRefs>
+</ds:datastoreItem>
+</file>
+
+<file path=customXml/itemProps54.xml><?xml version="1.0" encoding="utf-8"?>
+<ds:datastoreItem xmlns:ds="http://schemas.openxmlformats.org/officeDocument/2006/customXml" ds:itemID="{8B0AB7B0-1EE2-42BF-9C41-9C904E313494}">
+  <ds:schemaRefs>
+    <ds:schemaRef ds:uri="http://schemas.microsoft.com/VisualStudio/2011/storyboarding/control"/>
+  </ds:schemaRefs>
+</ds:datastoreItem>
+</file>
+
+<file path=customXml/itemProps55.xml><?xml version="1.0" encoding="utf-8"?>
 <ds:datastoreItem xmlns:ds="http://schemas.openxmlformats.org/officeDocument/2006/customXml" ds:itemID="{8A7670A8-5D8A-499C-9FEE-E0BBB4E6BEFF}">
   <ds:schemaRefs>
     <ds:schemaRef ds:uri="http://schemas.microsoft.com/VisualStudio/2011/storyboarding/control"/>
@@ -13555,39 +13906,15 @@
 </ds:datastoreItem>
 </file>
 
-<file path=customXml/itemProps20.xml><?xml version="1.0" encoding="utf-8"?>
-<ds:datastoreItem xmlns:ds="http://schemas.openxmlformats.org/officeDocument/2006/customXml" ds:itemID="{A76A203E-9FD7-42C2-8FEF-B018DFF7E4D1}">
+<file path=customXml/itemProps56.xml><?xml version="1.0" encoding="utf-8"?>
+<ds:datastoreItem xmlns:ds="http://schemas.openxmlformats.org/officeDocument/2006/customXml" ds:itemID="{B0DD2967-9B1E-4AF4-9E22-1FB363BF21A1}">
   <ds:schemaRefs>
     <ds:schemaRef ds:uri="http://schemas.microsoft.com/VisualStudio/2011/storyboarding/control"/>
   </ds:schemaRefs>
 </ds:datastoreItem>
 </file>
 
-<file path=customXml/itemProps21.xml><?xml version="1.0" encoding="utf-8"?>
-<ds:datastoreItem xmlns:ds="http://schemas.openxmlformats.org/officeDocument/2006/customXml" ds:itemID="{FBDB9D4B-5D23-4316-AE7E-E386D2E702D4}">
-  <ds:schemaRefs>
-    <ds:schemaRef ds:uri="http://schemas.microsoft.com/VisualStudio/2011/storyboarding/control"/>
-  </ds:schemaRefs>
-</ds:datastoreItem>
-</file>
-
-<file path=customXml/itemProps22.xml><?xml version="1.0" encoding="utf-8"?>
-<ds:datastoreItem xmlns:ds="http://schemas.openxmlformats.org/officeDocument/2006/customXml" ds:itemID="{DE740E6A-43E5-497F-8F78-B904C61CB614}">
-  <ds:schemaRefs>
-    <ds:schemaRef ds:uri="http://schemas.microsoft.com/VisualStudio/2011/storyboarding/control"/>
-  </ds:schemaRefs>
-</ds:datastoreItem>
-</file>
-
-<file path=customXml/itemProps23.xml><?xml version="1.0" encoding="utf-8"?>
-<ds:datastoreItem xmlns:ds="http://schemas.openxmlformats.org/officeDocument/2006/customXml" ds:itemID="{F50EEE5E-70AE-4092-8CFF-7CEEF7A1A3DA}">
-  <ds:schemaRefs>
-    <ds:schemaRef ds:uri="http://schemas.microsoft.com/VisualStudio/2011/storyboarding/control"/>
-  </ds:schemaRefs>
-</ds:datastoreItem>
-</file>
-
-<file path=customXml/itemProps24.xml><?xml version="1.0" encoding="utf-8"?>
+<file path=customXml/itemProps57.xml><?xml version="1.0" encoding="utf-8"?>
 <ds:datastoreItem xmlns:ds="http://schemas.openxmlformats.org/officeDocument/2006/customXml" ds:itemID="{CB538EC4-2D5D-4BC6-AFD7-AF4FD42C21A7}">
   <ds:schemaRefs>
     <ds:schemaRef ds:uri="http://schemas.microsoft.com/VisualStudio/2011/storyboarding/control"/>
@@ -13595,143 +13922,7 @@
 </ds:datastoreItem>
 </file>
 
-<file path=customXml/itemProps25.xml><?xml version="1.0" encoding="utf-8"?>
-<ds:datastoreItem xmlns:ds="http://schemas.openxmlformats.org/officeDocument/2006/customXml" ds:itemID="{6E845879-650B-4022-A35E-856E74320ACC}">
-  <ds:schemaRefs>
-    <ds:schemaRef ds:uri="http://schemas.microsoft.com/VisualStudio/2011/storyboarding/control"/>
-  </ds:schemaRefs>
-</ds:datastoreItem>
-</file>
-
-<file path=customXml/itemProps26.xml><?xml version="1.0" encoding="utf-8"?>
-<ds:datastoreItem xmlns:ds="http://schemas.openxmlformats.org/officeDocument/2006/customXml" ds:itemID="{6CC874DE-6D79-4EBA-A0F5-DB01923D7AE0}">
-  <ds:schemaRefs>
-    <ds:schemaRef ds:uri="http://schemas.microsoft.com/VisualStudio/2011/storyboarding/control"/>
-  </ds:schemaRefs>
-</ds:datastoreItem>
-</file>
-
-<file path=customXml/itemProps27.xml><?xml version="1.0" encoding="utf-8"?>
-<ds:datastoreItem xmlns:ds="http://schemas.openxmlformats.org/officeDocument/2006/customXml" ds:itemID="{1D5DC517-E715-4F56-B43C-13839AE337F0}">
-  <ds:schemaRefs>
-    <ds:schemaRef ds:uri="http://schemas.microsoft.com/VisualStudio/2011/storyboarding/control"/>
-  </ds:schemaRefs>
-</ds:datastoreItem>
-</file>
-
-<file path=customXml/itemProps28.xml><?xml version="1.0" encoding="utf-8"?>
-<ds:datastoreItem xmlns:ds="http://schemas.openxmlformats.org/officeDocument/2006/customXml" ds:itemID="{A4C33EEA-7075-4651-97E3-4829E38E21EA}">
-  <ds:schemaRefs>
-    <ds:schemaRef ds:uri="http://schemas.microsoft.com/VisualStudio/2011/storyboarding/control"/>
-  </ds:schemaRefs>
-</ds:datastoreItem>
-</file>
-
-<file path=customXml/itemProps29.xml><?xml version="1.0" encoding="utf-8"?>
-<ds:datastoreItem xmlns:ds="http://schemas.openxmlformats.org/officeDocument/2006/customXml" ds:itemID="{B0DD2967-9B1E-4AF4-9E22-1FB363BF21A1}">
-  <ds:schemaRefs>
-    <ds:schemaRef ds:uri="http://schemas.microsoft.com/VisualStudio/2011/storyboarding/control"/>
-  </ds:schemaRefs>
-</ds:datastoreItem>
-</file>
-
-<file path=customXml/itemProps3.xml><?xml version="1.0" encoding="utf-8"?>
-<ds:datastoreItem xmlns:ds="http://schemas.openxmlformats.org/officeDocument/2006/customXml" ds:itemID="{AEE75C41-50A0-4E2E-8E71-75152E4221D1}">
-  <ds:schemaRefs>
-    <ds:schemaRef ds:uri="http://schemas.microsoft.com/VisualStudio/2011/storyboarding/control"/>
-  </ds:schemaRefs>
-</ds:datastoreItem>
-</file>
-
-<file path=customXml/itemProps30.xml><?xml version="1.0" encoding="utf-8"?>
-<ds:datastoreItem xmlns:ds="http://schemas.openxmlformats.org/officeDocument/2006/customXml" ds:itemID="{69819B4B-C652-4029-9D6F-1F30F2207B1C}">
-  <ds:schemaRefs>
-    <ds:schemaRef ds:uri="http://schemas.microsoft.com/VisualStudio/2011/storyboarding/control"/>
-  </ds:schemaRefs>
-</ds:datastoreItem>
-</file>
-
-<file path=customXml/itemProps31.xml><?xml version="1.0" encoding="utf-8"?>
-<ds:datastoreItem xmlns:ds="http://schemas.openxmlformats.org/officeDocument/2006/customXml" ds:itemID="{5B8607FE-59BB-43C3-BBC9-D002A93B2860}">
-  <ds:schemaRefs>
-    <ds:schemaRef ds:uri="http://schemas.microsoft.com/VisualStudio/2011/storyboarding/control"/>
-  </ds:schemaRefs>
-</ds:datastoreItem>
-</file>
-
-<file path=customXml/itemProps32.xml><?xml version="1.0" encoding="utf-8"?>
-<ds:datastoreItem xmlns:ds="http://schemas.openxmlformats.org/officeDocument/2006/customXml" ds:itemID="{2D4E3CDC-752C-421E-817A-A9D2344595DE}">
-  <ds:schemaRefs>
-    <ds:schemaRef ds:uri="http://schemas.microsoft.com/VisualStudio/2011/storyboarding/control"/>
-  </ds:schemaRefs>
-</ds:datastoreItem>
-</file>
-
-<file path=customXml/itemProps33.xml><?xml version="1.0" encoding="utf-8"?>
-<ds:datastoreItem xmlns:ds="http://schemas.openxmlformats.org/officeDocument/2006/customXml" ds:itemID="{FB9740A1-8F0C-4AA2-A2C9-15A377DC91A6}">
-  <ds:schemaRefs>
-    <ds:schemaRef ds:uri="http://schemas.microsoft.com/VisualStudio/2011/storyboarding/control"/>
-  </ds:schemaRefs>
-</ds:datastoreItem>
-</file>
-
-<file path=customXml/itemProps34.xml><?xml version="1.0" encoding="utf-8"?>
-<ds:datastoreItem xmlns:ds="http://schemas.openxmlformats.org/officeDocument/2006/customXml" ds:itemID="{8B4AE673-39D1-4921-A713-E0BD45B32E43}">
-  <ds:schemaRefs>
-    <ds:schemaRef ds:uri="http://schemas.microsoft.com/VisualStudio/2011/storyboarding/control"/>
-  </ds:schemaRefs>
-</ds:datastoreItem>
-</file>
-
-<file path=customXml/itemProps35.xml><?xml version="1.0" encoding="utf-8"?>
-<ds:datastoreItem xmlns:ds="http://schemas.openxmlformats.org/officeDocument/2006/customXml" ds:itemID="{182A85CA-4E58-49C8-8C48-758766C210A9}">
-  <ds:schemaRefs>
-    <ds:schemaRef ds:uri="http://schemas.microsoft.com/VisualStudio/2011/storyboarding/control"/>
-  </ds:schemaRefs>
-</ds:datastoreItem>
-</file>
-
-<file path=customXml/itemProps36.xml><?xml version="1.0" encoding="utf-8"?>
-<ds:datastoreItem xmlns:ds="http://schemas.openxmlformats.org/officeDocument/2006/customXml" ds:itemID="{04504D90-2CEB-4E3A-A555-86C532BE774F}">
-  <ds:schemaRefs>
-    <ds:schemaRef ds:uri="http://schemas.microsoft.com/VisualStudio/2011/storyboarding/control"/>
-  </ds:schemaRefs>
-</ds:datastoreItem>
-</file>
-
-<file path=customXml/itemProps37.xml><?xml version="1.0" encoding="utf-8"?>
-<ds:datastoreItem xmlns:ds="http://schemas.openxmlformats.org/officeDocument/2006/customXml" ds:itemID="{0CAA02FD-32C9-42E8-98BE-0EAAD29173F4}">
-  <ds:schemaRefs>
-    <ds:schemaRef ds:uri="http://schemas.microsoft.com/VisualStudio/2011/storyboarding/control"/>
-  </ds:schemaRefs>
-</ds:datastoreItem>
-</file>
-
-<file path=customXml/itemProps38.xml><?xml version="1.0" encoding="utf-8"?>
-<ds:datastoreItem xmlns:ds="http://schemas.openxmlformats.org/officeDocument/2006/customXml" ds:itemID="{7C81862B-608B-4E4F-9DB1-7DBCFE9F2139}">
-  <ds:schemaRefs>
-    <ds:schemaRef ds:uri="http://schemas.microsoft.com/VisualStudio/2011/storyboarding/control"/>
-  </ds:schemaRefs>
-</ds:datastoreItem>
-</file>
-
-<file path=customXml/itemProps39.xml><?xml version="1.0" encoding="utf-8"?>
-<ds:datastoreItem xmlns:ds="http://schemas.openxmlformats.org/officeDocument/2006/customXml" ds:itemID="{2C816A0A-85BC-4830-BAEE-1F53C8E67489}">
-  <ds:schemaRefs>
-    <ds:schemaRef ds:uri="http://schemas.microsoft.com/VisualStudio/2011/storyboarding/control"/>
-  </ds:schemaRefs>
-</ds:datastoreItem>
-</file>
-
-<file path=customXml/itemProps4.xml><?xml version="1.0" encoding="utf-8"?>
-<ds:datastoreItem xmlns:ds="http://schemas.openxmlformats.org/officeDocument/2006/customXml" ds:itemID="{66C429A6-A1FB-4A44-9868-139AEFE376E0}">
-  <ds:schemaRefs>
-    <ds:schemaRef ds:uri="http://schemas.microsoft.com/VisualStudio/2011/storyboarding/control"/>
-  </ds:schemaRefs>
-</ds:datastoreItem>
-</file>
-
-<file path=customXml/itemProps40.xml><?xml version="1.0" encoding="utf-8"?>
+<file path=customXml/itemProps58.xml><?xml version="1.0" encoding="utf-8"?>
 <ds:datastoreItem xmlns:ds="http://schemas.openxmlformats.org/officeDocument/2006/customXml" ds:itemID="{F8E474D2-D249-494A-827C-6C0C85F35C5A}">
   <ds:schemaRefs>
     <ds:schemaRef ds:uri="http://schemas.microsoft.com/VisualStudio/2011/storyboarding/control"/>
@@ -13739,39 +13930,7 @@
 </ds:datastoreItem>
 </file>
 
-<file path=customXml/itemProps41.xml><?xml version="1.0" encoding="utf-8"?>
-<ds:datastoreItem xmlns:ds="http://schemas.openxmlformats.org/officeDocument/2006/customXml" ds:itemID="{FDB8CFE8-3808-4247-A2FD-35E246A153DC}">
-  <ds:schemaRefs>
-    <ds:schemaRef ds:uri="http://schemas.microsoft.com/VisualStudio/2011/storyboarding/control"/>
-  </ds:schemaRefs>
-</ds:datastoreItem>
-</file>
-
-<file path=customXml/itemProps42.xml><?xml version="1.0" encoding="utf-8"?>
-<ds:datastoreItem xmlns:ds="http://schemas.openxmlformats.org/officeDocument/2006/customXml" ds:itemID="{855315B8-2A4D-4E8D-AAC1-C0281182FD5B}">
-  <ds:schemaRefs>
-    <ds:schemaRef ds:uri="http://schemas.microsoft.com/VisualStudio/2011/storyboarding/control"/>
-  </ds:schemaRefs>
-</ds:datastoreItem>
-</file>
-
-<file path=customXml/itemProps43.xml><?xml version="1.0" encoding="utf-8"?>
-<ds:datastoreItem xmlns:ds="http://schemas.openxmlformats.org/officeDocument/2006/customXml" ds:itemID="{F7BFCA9F-A0B1-4AC1-AD74-CE9E4213160F}">
-  <ds:schemaRefs>
-    <ds:schemaRef ds:uri="http://schemas.microsoft.com/VisualStudio/2011/storyboarding/control"/>
-  </ds:schemaRefs>
-</ds:datastoreItem>
-</file>
-
-<file path=customXml/itemProps44.xml><?xml version="1.0" encoding="utf-8"?>
-<ds:datastoreItem xmlns:ds="http://schemas.openxmlformats.org/officeDocument/2006/customXml" ds:itemID="{0F4FBE72-4778-4A80-9A59-1EAA7879E88B}">
-  <ds:schemaRefs>
-    <ds:schemaRef ds:uri="http://schemas.microsoft.com/VisualStudio/2011/storyboarding/control"/>
-  </ds:schemaRefs>
-</ds:datastoreItem>
-</file>
-
-<file path=customXml/itemProps45.xml><?xml version="1.0" encoding="utf-8"?>
+<file path=customXml/itemProps59.xml><?xml version="1.0" encoding="utf-8"?>
 <ds:datastoreItem xmlns:ds="http://schemas.openxmlformats.org/officeDocument/2006/customXml" ds:itemID="{11BD6915-90EA-4F41-8AE8-401B6A2355DB}">
   <ds:schemaRefs>
     <ds:schemaRef ds:uri="http://schemas.microsoft.com/VisualStudio/2011/storyboarding/control"/>
@@ -13779,39 +13938,7 @@
 </ds:datastoreItem>
 </file>
 
-<file path=customXml/itemProps46.xml><?xml version="1.0" encoding="utf-8"?>
-<ds:datastoreItem xmlns:ds="http://schemas.openxmlformats.org/officeDocument/2006/customXml" ds:itemID="{34422DFF-D2BE-4305-8DA3-E0E99CFA01F4}">
-  <ds:schemaRefs>
-    <ds:schemaRef ds:uri="http://schemas.microsoft.com/VisualStudio/2011/storyboarding/control"/>
-  </ds:schemaRefs>
-</ds:datastoreItem>
-</file>
-
-<file path=customXml/itemProps47.xml><?xml version="1.0" encoding="utf-8"?>
-<ds:datastoreItem xmlns:ds="http://schemas.openxmlformats.org/officeDocument/2006/customXml" ds:itemID="{8C16C620-F89C-496A-ABC2-EBAA770A5D2B}">
-  <ds:schemaRefs>
-    <ds:schemaRef ds:uri="http://schemas.microsoft.com/VisualStudio/2011/storyboarding/control"/>
-  </ds:schemaRefs>
-</ds:datastoreItem>
-</file>
-
-<file path=customXml/itemProps48.xml><?xml version="1.0" encoding="utf-8"?>
-<ds:datastoreItem xmlns:ds="http://schemas.openxmlformats.org/officeDocument/2006/customXml" ds:itemID="{10C4D8A6-492F-4C3D-BAAD-8273F297A317}">
-  <ds:schemaRefs>
-    <ds:schemaRef ds:uri="http://schemas.microsoft.com/VisualStudio/2011/storyboarding/control"/>
-  </ds:schemaRefs>
-</ds:datastoreItem>
-</file>
-
-<file path=customXml/itemProps49.xml><?xml version="1.0" encoding="utf-8"?>
-<ds:datastoreItem xmlns:ds="http://schemas.openxmlformats.org/officeDocument/2006/customXml" ds:itemID="{61361C12-AEB1-4243-8694-E22DB7BB0B58}">
-  <ds:schemaRefs>
-    <ds:schemaRef ds:uri="http://schemas.microsoft.com/VisualStudio/2011/storyboarding/control"/>
-  </ds:schemaRefs>
-</ds:datastoreItem>
-</file>
-
-<file path=customXml/itemProps5.xml><?xml version="1.0" encoding="utf-8"?>
+<file path=customXml/itemProps6.xml><?xml version="1.0" encoding="utf-8"?>
 <ds:datastoreItem xmlns:ds="http://schemas.openxmlformats.org/officeDocument/2006/customXml" ds:itemID="{F9BC2D1E-7C73-45D1-9E4F-E6345E51DF2D}">
   <ds:schemaRefs>
     <ds:schemaRef ds:uri="http://schemas.microsoft.com/VisualStudio/2011/storyboarding/control"/>
@@ -13819,96 +13946,8 @@
 </ds:datastoreItem>
 </file>
 
-<file path=customXml/itemProps50.xml><?xml version="1.0" encoding="utf-8"?>
-<ds:datastoreItem xmlns:ds="http://schemas.openxmlformats.org/officeDocument/2006/customXml" ds:itemID="{7D8A3F15-58CA-4DA9-A6C9-5E4399E681CE}">
-  <ds:schemaRefs>
-    <ds:schemaRef ds:uri="http://schemas.microsoft.com/VisualStudio/2011/storyboarding/control"/>
-  </ds:schemaRefs>
-</ds:datastoreItem>
-</file>
-
-<file path=customXml/itemProps51.xml><?xml version="1.0" encoding="utf-8"?>
-<ds:datastoreItem xmlns:ds="http://schemas.openxmlformats.org/officeDocument/2006/customXml" ds:itemID="{96BD8081-566A-4B7A-9794-537613F8A560}">
-  <ds:schemaRefs>
-    <ds:schemaRef ds:uri="http://schemas.microsoft.com/VisualStudio/2011/storyboarding/control"/>
-  </ds:schemaRefs>
-</ds:datastoreItem>
-</file>
-
-<file path=customXml/itemProps52.xml><?xml version="1.0" encoding="utf-8"?>
-<ds:datastoreItem xmlns:ds="http://schemas.openxmlformats.org/officeDocument/2006/customXml" ds:itemID="{91ED1748-2ACC-4580-9DD0-53AE211F1DA7}">
-  <ds:schemaRefs>
-    <ds:schemaRef ds:uri="http://schemas.microsoft.com/VisualStudio/2011/storyboarding/control"/>
-  </ds:schemaRefs>
-</ds:datastoreItem>
-</file>
-
-<file path=customXml/itemProps53.xml><?xml version="1.0" encoding="utf-8"?>
-<ds:datastoreItem xmlns:ds="http://schemas.openxmlformats.org/officeDocument/2006/customXml" ds:itemID="{4F1F443E-6774-443F-BAD5-FCCC4103B164}">
-  <ds:schemaRefs>
-    <ds:schemaRef ds:uri="http://schemas.microsoft.com/VisualStudio/2011/storyboarding/control"/>
-  </ds:schemaRefs>
-</ds:datastoreItem>
-</file>
-
-<file path=customXml/itemProps54.xml><?xml version="1.0" encoding="utf-8"?>
-<ds:datastoreItem xmlns:ds="http://schemas.openxmlformats.org/officeDocument/2006/customXml" ds:itemID="{80A2EE3F-8E5E-4E02-8371-075F75881CC2}">
-  <ds:schemaRefs>
-    <ds:schemaRef ds:uri="http://schemas.microsoft.com/VisualStudio/2011/storyboarding/control"/>
-  </ds:schemaRefs>
-</ds:datastoreItem>
-</file>
-
-<file path=customXml/itemProps55.xml><?xml version="1.0" encoding="utf-8"?>
-<ds:datastoreItem xmlns:ds="http://schemas.openxmlformats.org/officeDocument/2006/customXml" ds:itemID="{35E8E4AC-13BF-495B-B0AA-5F07A0EB9441}">
-  <ds:schemaRefs>
-    <ds:schemaRef ds:uri="http://schemas.microsoft.com/VisualStudio/2011/storyboarding/control"/>
-  </ds:schemaRefs>
-</ds:datastoreItem>
-</file>
-
-<file path=customXml/itemProps56.xml><?xml version="1.0" encoding="utf-8"?>
-<ds:datastoreItem xmlns:ds="http://schemas.openxmlformats.org/officeDocument/2006/customXml" ds:itemID="{FF1022A0-DAA8-4910-B054-25E1EE26A5AC}">
-  <ds:schemaRefs>
-    <ds:schemaRef ds:uri="http://schemas.microsoft.com/VisualStudio/2011/storyboarding/control"/>
-  </ds:schemaRefs>
-</ds:datastoreItem>
-</file>
-
-<file path=customXml/itemProps57.xml><?xml version="1.0" encoding="utf-8"?>
-<ds:datastoreItem xmlns:ds="http://schemas.openxmlformats.org/officeDocument/2006/customXml" ds:itemID="{4B90C7DA-FFAF-434B-A961-A1A1B575F753}">
-  <ds:schemaRefs>
-    <ds:schemaRef ds:uri="http://schemas.microsoft.com/VisualStudio/2011/storyboarding/control"/>
-  </ds:schemaRefs>
-</ds:datastoreItem>
-</file>
-
-<file path=customXml/itemProps58.xml><?xml version="1.0" encoding="utf-8"?>
-<ds:datastoreItem xmlns:ds="http://schemas.openxmlformats.org/officeDocument/2006/customXml" ds:itemID="{9176D73F-88EB-4204-941E-2ADCC7F101D3}">
-  <ds:schemaRefs>
-    <ds:schemaRef ds:uri="http://schemas.microsoft.com/VisualStudio/2011/storyboarding/control"/>
-  </ds:schemaRefs>
-</ds:datastoreItem>
-</file>
-
-<file path=customXml/itemProps59.xml><?xml version="1.0" encoding="utf-8"?>
-<ds:datastoreItem xmlns:ds="http://schemas.openxmlformats.org/officeDocument/2006/customXml" ds:itemID="{A822EFA2-5211-415D-91B1-1D2F11D7CBDF}">
-  <ds:schemaRefs>
-    <ds:schemaRef ds:uri="http://schemas.microsoft.com/VisualStudio/2011/storyboarding/control"/>
-  </ds:schemaRefs>
-</ds:datastoreItem>
-</file>
-
-<file path=customXml/itemProps6.xml><?xml version="1.0" encoding="utf-8"?>
-<ds:datastoreItem xmlns:ds="http://schemas.openxmlformats.org/officeDocument/2006/customXml" ds:itemID="{896AE23B-403F-4EEC-900F-6E95A60A4CC1}">
-  <ds:schemaRefs>
-    <ds:schemaRef ds:uri="http://schemas.microsoft.com/VisualStudio/2011/storyboarding/control"/>
-  </ds:schemaRefs>
-</ds:datastoreItem>
-</file>
-
 <file path=customXml/itemProps60.xml><?xml version="1.0" encoding="utf-8"?>
-<ds:datastoreItem xmlns:ds="http://schemas.openxmlformats.org/officeDocument/2006/customXml" ds:itemID="{09AAF7D3-4D9D-47F0-9621-CB53A66318C0}">
+<ds:datastoreItem xmlns:ds="http://schemas.openxmlformats.org/officeDocument/2006/customXml" ds:itemID="{99E258B9-636D-4FC3-A18B-5731CC1F850C}">
   <ds:schemaRefs>
     <ds:schemaRef ds:uri="http://schemas.microsoft.com/VisualStudio/2011/storyboarding/control"/>
   </ds:schemaRefs>
@@ -13924,7 +13963,7 @@
 </file>
 
 <file path=customXml/itemProps62.xml><?xml version="1.0" encoding="utf-8"?>
-<ds:datastoreItem xmlns:ds="http://schemas.openxmlformats.org/officeDocument/2006/customXml" ds:itemID="{43B5ED86-0060-4D69-806F-5CA89175AE14}">
+<ds:datastoreItem xmlns:ds="http://schemas.openxmlformats.org/officeDocument/2006/customXml" ds:itemID="{6CC874DE-6D79-4EBA-A0F5-DB01923D7AE0}">
   <ds:schemaRefs>
     <ds:schemaRef ds:uri="http://schemas.microsoft.com/VisualStudio/2011/storyboarding/control"/>
   </ds:schemaRefs>
@@ -13932,6 +13971,30 @@
 </file>
 
 <file path=customXml/itemProps63.xml><?xml version="1.0" encoding="utf-8"?>
+<ds:datastoreItem xmlns:ds="http://schemas.openxmlformats.org/officeDocument/2006/customXml" ds:itemID="{FBDB9D4B-5D23-4316-AE7E-E386D2E702D4}">
+  <ds:schemaRefs>
+    <ds:schemaRef ds:uri="http://schemas.microsoft.com/VisualStudio/2011/storyboarding/control"/>
+  </ds:schemaRefs>
+</ds:datastoreItem>
+</file>
+
+<file path=customXml/itemProps64.xml><?xml version="1.0" encoding="utf-8"?>
+<ds:datastoreItem xmlns:ds="http://schemas.openxmlformats.org/officeDocument/2006/customXml" ds:itemID="{855315B8-2A4D-4E8D-AAC1-C0281182FD5B}">
+  <ds:schemaRefs>
+    <ds:schemaRef ds:uri="http://schemas.microsoft.com/VisualStudio/2011/storyboarding/control"/>
+  </ds:schemaRefs>
+</ds:datastoreItem>
+</file>
+
+<file path=customXml/itemProps65.xml><?xml version="1.0" encoding="utf-8"?>
+<ds:datastoreItem xmlns:ds="http://schemas.openxmlformats.org/officeDocument/2006/customXml" ds:itemID="{8C16C620-F89C-496A-ABC2-EBAA770A5D2B}">
+  <ds:schemaRefs>
+    <ds:schemaRef ds:uri="http://schemas.microsoft.com/VisualStudio/2011/storyboarding/control"/>
+  </ds:schemaRefs>
+</ds:datastoreItem>
+</file>
+
+<file path=customXml/itemProps66.xml><?xml version="1.0" encoding="utf-8"?>
 <ds:datastoreItem xmlns:ds="http://schemas.openxmlformats.org/officeDocument/2006/customXml" ds:itemID="{2DB54B02-095B-4767-A849-7F09D55BDBEC}">
   <ds:schemaRefs>
     <ds:schemaRef ds:uri="http://schemas.microsoft.com/VisualStudio/2011/storyboarding/control"/>
@@ -13939,39 +14002,7 @@
 </ds:datastoreItem>
 </file>
 
-<file path=customXml/itemProps64.xml><?xml version="1.0" encoding="utf-8"?>
-<ds:datastoreItem xmlns:ds="http://schemas.openxmlformats.org/officeDocument/2006/customXml" ds:itemID="{B24B058A-7394-4884-87AB-3D162B4AF263}">
-  <ds:schemaRefs>
-    <ds:schemaRef ds:uri="http://schemas.microsoft.com/VisualStudio/2011/storyboarding/control"/>
-  </ds:schemaRefs>
-</ds:datastoreItem>
-</file>
-
-<file path=customXml/itemProps65.xml><?xml version="1.0" encoding="utf-8"?>
-<ds:datastoreItem xmlns:ds="http://schemas.openxmlformats.org/officeDocument/2006/customXml" ds:itemID="{540C3353-3E36-4F77-9C4A-0DB4A5D7CCD1}">
-  <ds:schemaRefs>
-    <ds:schemaRef ds:uri="http://schemas.microsoft.com/VisualStudio/2011/storyboarding/control"/>
-  </ds:schemaRefs>
-</ds:datastoreItem>
-</file>
-
-<file path=customXml/itemProps66.xml><?xml version="1.0" encoding="utf-8"?>
-<ds:datastoreItem xmlns:ds="http://schemas.openxmlformats.org/officeDocument/2006/customXml" ds:itemID="{99E258B9-636D-4FC3-A18B-5731CC1F850C}">
-  <ds:schemaRefs>
-    <ds:schemaRef ds:uri="http://schemas.microsoft.com/VisualStudio/2011/storyboarding/control"/>
-  </ds:schemaRefs>
-</ds:datastoreItem>
-</file>
-
 <file path=customXml/itemProps67.xml><?xml version="1.0" encoding="utf-8"?>
-<ds:datastoreItem xmlns:ds="http://schemas.openxmlformats.org/officeDocument/2006/customXml" ds:itemID="{ECEE1C58-60D6-4BE6-B599-4F7E9AB9E035}">
-  <ds:schemaRefs>
-    <ds:schemaRef ds:uri="http://schemas.microsoft.com/VisualStudio/2011/storyboarding/control"/>
-  </ds:schemaRefs>
-</ds:datastoreItem>
-</file>
-
-<file path=customXml/itemProps68.xml><?xml version="1.0" encoding="utf-8"?>
 <ds:datastoreItem xmlns:ds="http://schemas.openxmlformats.org/officeDocument/2006/customXml" ds:itemID="{0DEE920A-6ADA-48DA-B23C-E869E21EA911}">
   <ds:schemaRefs>
     <ds:schemaRef ds:uri="http://schemas.microsoft.com/VisualStudio/2011/storyboarding/control"/>
@@ -13979,24 +14010,32 @@
 </ds:datastoreItem>
 </file>
 
-<file path=customXml/itemProps7.xml><?xml version="1.0" encoding="utf-8"?>
-<ds:datastoreItem xmlns:ds="http://schemas.openxmlformats.org/officeDocument/2006/customXml" ds:itemID="{8B0AB7B0-1EE2-42BF-9C41-9C904E313494}">
+<file path=customXml/itemProps68.xml><?xml version="1.0" encoding="utf-8"?>
+<ds:datastoreItem xmlns:ds="http://schemas.openxmlformats.org/officeDocument/2006/customXml" ds:itemID="{6AC15D59-1985-4B02-A204-9FA5E328EF32}">
   <ds:schemaRefs>
     <ds:schemaRef ds:uri="http://schemas.microsoft.com/VisualStudio/2011/storyboarding/control"/>
   </ds:schemaRefs>
 </ds:datastoreItem>
 </file>
 
-<file path=customXml/itemProps8.xml><?xml version="1.0" encoding="utf-8"?>
-<ds:datastoreItem xmlns:ds="http://schemas.openxmlformats.org/officeDocument/2006/customXml" ds:itemID="{D8EE4C6F-B1D4-4AC9-928F-40B58F8389AA}">
+<file path=customXml/itemProps7.xml><?xml version="1.0" encoding="utf-8"?>
+<ds:datastoreItem xmlns:ds="http://schemas.openxmlformats.org/officeDocument/2006/customXml" ds:itemID="{EC8AFA28-5388-46A0-B0AF-CDC06E1AFD31}">
   <ds:schemaRefs>
     <ds:schemaRef ds:uri="http://schemas.microsoft.com/VisualStudio/2011/storyboarding/control"/>
   </ds:schemaRefs>
 </ds:datastoreItem>
 </file>
 
+<file path=customXml/itemProps8.xml><?xml version="1.0" encoding="utf-8"?>
+<ds:datastoreItem xmlns:ds="http://schemas.openxmlformats.org/officeDocument/2006/customXml" ds:itemID="{A6484AF2-F055-4C78-982B-D2156684306A}">
+  <ds:schemaRefs>
+    <ds:schemaRef ds:uri="http://schemas.microsoft.com/VisualStudio/2011/storyboarding/control"/>
+  </ds:schemaRefs>
+</ds:datastoreItem>
+</file>
+
 <file path=customXml/itemProps9.xml><?xml version="1.0" encoding="utf-8"?>
-<ds:datastoreItem xmlns:ds="http://schemas.openxmlformats.org/officeDocument/2006/customXml" ds:itemID="{6BD8AD1D-48A9-4F6D-9433-F36CBEB3125F}">
+<ds:datastoreItem xmlns:ds="http://schemas.openxmlformats.org/officeDocument/2006/customXml" ds:itemID="{DE740E6A-43E5-497F-8F78-B904C61CB614}">
   <ds:schemaRefs>
     <ds:schemaRef ds:uri="http://schemas.microsoft.com/VisualStudio/2011/storyboarding/control"/>
   </ds:schemaRefs>

</xml_diff>

<commit_message>
Update icon files in ppt
</commit_message>
<xml_diff>
--- a/Prototype/Icon.pptx
+++ b/Prototype/Icon.pptx
@@ -271,7 +271,7 @@
           <a:p>
             <a:fld id="{245C2C28-0D12-4EC8-9616-6109F8E9BCEB}" type="datetimeFigureOut">
               <a:rPr lang="en-US" smtClean="0"/>
-              <a:t>4/26/2019</a:t>
+              <a:t>4/29/2019</a:t>
             </a:fld>
             <a:endParaRPr lang="en-US"/>
           </a:p>
@@ -469,7 +469,7 @@
           <a:p>
             <a:fld id="{245C2C28-0D12-4EC8-9616-6109F8E9BCEB}" type="datetimeFigureOut">
               <a:rPr lang="en-US" smtClean="0"/>
-              <a:t>4/26/2019</a:t>
+              <a:t>4/29/2019</a:t>
             </a:fld>
             <a:endParaRPr lang="en-US"/>
           </a:p>
@@ -677,7 +677,7 @@
           <a:p>
             <a:fld id="{245C2C28-0D12-4EC8-9616-6109F8E9BCEB}" type="datetimeFigureOut">
               <a:rPr lang="en-US" smtClean="0"/>
-              <a:t>4/26/2019</a:t>
+              <a:t>4/29/2019</a:t>
             </a:fld>
             <a:endParaRPr lang="en-US"/>
           </a:p>
@@ -875,7 +875,7 @@
           <a:p>
             <a:fld id="{245C2C28-0D12-4EC8-9616-6109F8E9BCEB}" type="datetimeFigureOut">
               <a:rPr lang="en-US" smtClean="0"/>
-              <a:t>4/26/2019</a:t>
+              <a:t>4/29/2019</a:t>
             </a:fld>
             <a:endParaRPr lang="en-US"/>
           </a:p>
@@ -1150,7 +1150,7 @@
           <a:p>
             <a:fld id="{245C2C28-0D12-4EC8-9616-6109F8E9BCEB}" type="datetimeFigureOut">
               <a:rPr lang="en-US" smtClean="0"/>
-              <a:t>4/26/2019</a:t>
+              <a:t>4/29/2019</a:t>
             </a:fld>
             <a:endParaRPr lang="en-US"/>
           </a:p>
@@ -1415,7 +1415,7 @@
           <a:p>
             <a:fld id="{245C2C28-0D12-4EC8-9616-6109F8E9BCEB}" type="datetimeFigureOut">
               <a:rPr lang="en-US" smtClean="0"/>
-              <a:t>4/26/2019</a:t>
+              <a:t>4/29/2019</a:t>
             </a:fld>
             <a:endParaRPr lang="en-US"/>
           </a:p>
@@ -1827,7 +1827,7 @@
           <a:p>
             <a:fld id="{245C2C28-0D12-4EC8-9616-6109F8E9BCEB}" type="datetimeFigureOut">
               <a:rPr lang="en-US" smtClean="0"/>
-              <a:t>4/26/2019</a:t>
+              <a:t>4/29/2019</a:t>
             </a:fld>
             <a:endParaRPr lang="en-US"/>
           </a:p>
@@ -1968,7 +1968,7 @@
           <a:p>
             <a:fld id="{245C2C28-0D12-4EC8-9616-6109F8E9BCEB}" type="datetimeFigureOut">
               <a:rPr lang="en-US" smtClean="0"/>
-              <a:t>4/26/2019</a:t>
+              <a:t>4/29/2019</a:t>
             </a:fld>
             <a:endParaRPr lang="en-US"/>
           </a:p>
@@ -2081,7 +2081,7 @@
           <a:p>
             <a:fld id="{245C2C28-0D12-4EC8-9616-6109F8E9BCEB}" type="datetimeFigureOut">
               <a:rPr lang="en-US" smtClean="0"/>
-              <a:t>4/26/2019</a:t>
+              <a:t>4/29/2019</a:t>
             </a:fld>
             <a:endParaRPr lang="en-US"/>
           </a:p>
@@ -2392,7 +2392,7 @@
           <a:p>
             <a:fld id="{245C2C28-0D12-4EC8-9616-6109F8E9BCEB}" type="datetimeFigureOut">
               <a:rPr lang="en-US" smtClean="0"/>
-              <a:t>4/26/2019</a:t>
+              <a:t>4/29/2019</a:t>
             </a:fld>
             <a:endParaRPr lang="en-US"/>
           </a:p>
@@ -2680,7 +2680,7 @@
           <a:p>
             <a:fld id="{245C2C28-0D12-4EC8-9616-6109F8E9BCEB}" type="datetimeFigureOut">
               <a:rPr lang="en-US" smtClean="0"/>
-              <a:t>4/26/2019</a:t>
+              <a:t>4/29/2019</a:t>
             </a:fld>
             <a:endParaRPr lang="en-US"/>
           </a:p>
@@ -2921,7 +2921,7 @@
           <a:p>
             <a:fld id="{245C2C28-0D12-4EC8-9616-6109F8E9BCEB}" type="datetimeFigureOut">
               <a:rPr lang="en-US" smtClean="0"/>
-              <a:t>4/26/2019</a:t>
+              <a:t>4/29/2019</a:t>
             </a:fld>
             <a:endParaRPr lang="en-US"/>
           </a:p>
@@ -9901,6 +9901,291 @@
           </a:prstGeom>
         </p:spPr>
       </p:pic>
+      <p:pic>
+        <p:nvPicPr>
+          <p:cNvPr id="20" name="Graphic 19" descr="Arrow: Vertical U-turn">
+            <a:extLst>
+              <a:ext uri="{FF2B5EF4-FFF2-40B4-BE49-F238E27FC236}">
+                <a16:creationId xmlns:a16="http://schemas.microsoft.com/office/drawing/2014/main" id="{99DA7650-894B-4A93-8F73-995316196DD4}"/>
+              </a:ext>
+            </a:extLst>
+          </p:cNvPr>
+          <p:cNvPicPr>
+            <a:picLocks noChangeAspect="1"/>
+          </p:cNvPicPr>
+          <p:nvPr/>
+        </p:nvPicPr>
+        <p:blipFill>
+          <a:blip r:embed="rId25">
+            <a:extLst>
+              <a:ext uri="{28A0092B-C50C-407E-A947-70E740481C1C}">
+                <a14:useLocalDpi xmlns:a14="http://schemas.microsoft.com/office/drawing/2010/main" val="0"/>
+              </a:ext>
+              <a:ext uri="{96DAC541-7B7A-43D3-8B79-37D633B846F1}">
+                <asvg:svgBlip xmlns:asvg="http://schemas.microsoft.com/office/drawing/2016/SVG/main" r:embed="rId26"/>
+              </a:ext>
+            </a:extLst>
+          </a:blip>
+          <a:stretch>
+            <a:fillRect/>
+          </a:stretch>
+        </p:blipFill>
+        <p:spPr>
+          <a:xfrm flipV="1">
+            <a:off x="945918" y="4540802"/>
+            <a:ext cx="376227" cy="376227"/>
+          </a:xfrm>
+          <a:prstGeom prst="rect">
+            <a:avLst/>
+          </a:prstGeom>
+        </p:spPr>
+      </p:pic>
+      <p:pic>
+        <p:nvPicPr>
+          <p:cNvPr id="24" name="Graphic 23" descr="Line arrow: Horizontal U-turn">
+            <a:extLst>
+              <a:ext uri="{FF2B5EF4-FFF2-40B4-BE49-F238E27FC236}">
+                <a16:creationId xmlns:a16="http://schemas.microsoft.com/office/drawing/2014/main" id="{AD7A3DFB-134A-480C-9FBA-3142BEAEE86F}"/>
+              </a:ext>
+            </a:extLst>
+          </p:cNvPr>
+          <p:cNvPicPr>
+            <a:picLocks noChangeAspect="1"/>
+          </p:cNvPicPr>
+          <p:nvPr/>
+        </p:nvPicPr>
+        <p:blipFill>
+          <a:blip r:embed="rId27">
+            <a:extLst>
+              <a:ext uri="{28A0092B-C50C-407E-A947-70E740481C1C}">
+                <a14:useLocalDpi xmlns:a14="http://schemas.microsoft.com/office/drawing/2010/main" val="0"/>
+              </a:ext>
+              <a:ext uri="{96DAC541-7B7A-43D3-8B79-37D633B846F1}">
+                <asvg:svgBlip xmlns:asvg="http://schemas.microsoft.com/office/drawing/2016/SVG/main" r:embed="rId28"/>
+              </a:ext>
+            </a:extLst>
+          </a:blip>
+          <a:stretch>
+            <a:fillRect/>
+          </a:stretch>
+        </p:blipFill>
+        <p:spPr>
+          <a:xfrm rot="5192154">
+            <a:off x="917970" y="5037374"/>
+            <a:ext cx="480938" cy="480938"/>
+          </a:xfrm>
+          <a:prstGeom prst="rect">
+            <a:avLst/>
+          </a:prstGeom>
+        </p:spPr>
+      </p:pic>
+      <p:pic>
+        <p:nvPicPr>
+          <p:cNvPr id="26" name="Graphic 25" descr="Music">
+            <a:extLst>
+              <a:ext uri="{FF2B5EF4-FFF2-40B4-BE49-F238E27FC236}">
+                <a16:creationId xmlns:a16="http://schemas.microsoft.com/office/drawing/2014/main" id="{3E0A4779-05CB-4F00-8434-D10507C1A2AC}"/>
+              </a:ext>
+            </a:extLst>
+          </p:cNvPr>
+          <p:cNvPicPr>
+            <a:picLocks noChangeAspect="1"/>
+          </p:cNvPicPr>
+          <p:nvPr/>
+        </p:nvPicPr>
+        <p:blipFill>
+          <a:blip r:embed="rId29">
+            <a:extLst>
+              <a:ext uri="{28A0092B-C50C-407E-A947-70E740481C1C}">
+                <a14:useLocalDpi xmlns:a14="http://schemas.microsoft.com/office/drawing/2010/main" val="0"/>
+              </a:ext>
+              <a:ext uri="{96DAC541-7B7A-43D3-8B79-37D633B846F1}">
+                <asvg:svgBlip xmlns:asvg="http://schemas.microsoft.com/office/drawing/2016/SVG/main" r:embed="rId30"/>
+              </a:ext>
+            </a:extLst>
+          </a:blip>
+          <a:stretch>
+            <a:fillRect/>
+          </a:stretch>
+        </p:blipFill>
+        <p:spPr>
+          <a:xfrm>
+            <a:off x="5638800" y="2971800"/>
+            <a:ext cx="914400" cy="914400"/>
+          </a:xfrm>
+          <a:prstGeom prst="rect">
+            <a:avLst/>
+          </a:prstGeom>
+        </p:spPr>
+      </p:pic>
+      <p:pic>
+        <p:nvPicPr>
+          <p:cNvPr id="28" name="Graphic 27" descr="Return">
+            <a:extLst>
+              <a:ext uri="{FF2B5EF4-FFF2-40B4-BE49-F238E27FC236}">
+                <a16:creationId xmlns:a16="http://schemas.microsoft.com/office/drawing/2014/main" id="{D78FD003-8303-4208-8444-55A87038F7A0}"/>
+              </a:ext>
+            </a:extLst>
+          </p:cNvPr>
+          <p:cNvPicPr>
+            <a:picLocks noChangeAspect="1"/>
+          </p:cNvPicPr>
+          <p:nvPr/>
+        </p:nvPicPr>
+        <p:blipFill>
+          <a:blip r:embed="rId31">
+            <a:extLst>
+              <a:ext uri="{28A0092B-C50C-407E-A947-70E740481C1C}">
+                <a14:useLocalDpi xmlns:a14="http://schemas.microsoft.com/office/drawing/2010/main" val="0"/>
+              </a:ext>
+              <a:ext uri="{96DAC541-7B7A-43D3-8B79-37D633B846F1}">
+                <asvg:svgBlip xmlns:asvg="http://schemas.microsoft.com/office/drawing/2016/SVG/main" r:embed="rId32"/>
+              </a:ext>
+            </a:extLst>
+          </a:blip>
+          <a:stretch>
+            <a:fillRect/>
+          </a:stretch>
+        </p:blipFill>
+        <p:spPr>
+          <a:xfrm>
+            <a:off x="933384" y="6032178"/>
+            <a:ext cx="345429" cy="345429"/>
+          </a:xfrm>
+          <a:prstGeom prst="rect">
+            <a:avLst/>
+          </a:prstGeom>
+        </p:spPr>
+      </p:pic>
+      <p:sp>
+        <p:nvSpPr>
+          <p:cNvPr id="29" name="Rectangle 28">
+            <a:extLst>
+              <a:ext uri="{FF2B5EF4-FFF2-40B4-BE49-F238E27FC236}">
+                <a16:creationId xmlns:a16="http://schemas.microsoft.com/office/drawing/2014/main" id="{562F668B-2ABF-4047-98EA-93BD2E128E01}"/>
+              </a:ext>
+            </a:extLst>
+          </p:cNvPr>
+          <p:cNvSpPr/>
+          <p:nvPr/>
+        </p:nvSpPr>
+        <p:spPr>
+          <a:xfrm>
+            <a:off x="7209571" y="1448256"/>
+            <a:ext cx="2091843" cy="2437944"/>
+          </a:xfrm>
+          <a:prstGeom prst="rect">
+            <a:avLst/>
+          </a:prstGeom>
+        </p:spPr>
+        <p:style>
+          <a:lnRef idx="2">
+            <a:schemeClr val="dk1">
+              <a:shade val="50000"/>
+            </a:schemeClr>
+          </a:lnRef>
+          <a:fillRef idx="1">
+            <a:schemeClr val="dk1"/>
+          </a:fillRef>
+          <a:effectRef idx="0">
+            <a:schemeClr val="dk1"/>
+          </a:effectRef>
+          <a:fontRef idx="minor">
+            <a:schemeClr val="lt1"/>
+          </a:fontRef>
+        </p:style>
+        <p:txBody>
+          <a:bodyPr rtlCol="0" anchor="ctr"/>
+          <a:lstStyle/>
+          <a:p>
+            <a:pPr algn="ctr"/>
+            <a:endParaRPr lang="en-US"/>
+          </a:p>
+        </p:txBody>
+      </p:sp>
+      <p:sp>
+        <p:nvSpPr>
+          <p:cNvPr id="30" name="Oval 29">
+            <a:extLst>
+              <a:ext uri="{FF2B5EF4-FFF2-40B4-BE49-F238E27FC236}">
+                <a16:creationId xmlns:a16="http://schemas.microsoft.com/office/drawing/2014/main" id="{AD23691E-6865-439E-BE18-48AB82DD0C2B}"/>
+              </a:ext>
+            </a:extLst>
+          </p:cNvPr>
+          <p:cNvSpPr/>
+          <p:nvPr/>
+        </p:nvSpPr>
+        <p:spPr>
+          <a:xfrm>
+            <a:off x="7723647" y="2171290"/>
+            <a:ext cx="1063689" cy="1041507"/>
+          </a:xfrm>
+          <a:prstGeom prst="ellipse">
+            <a:avLst/>
+          </a:prstGeom>
+        </p:spPr>
+        <p:style>
+          <a:lnRef idx="2">
+            <a:schemeClr val="dk1"/>
+          </a:lnRef>
+          <a:fillRef idx="1">
+            <a:schemeClr val="lt1"/>
+          </a:fillRef>
+          <a:effectRef idx="0">
+            <a:schemeClr val="dk1"/>
+          </a:effectRef>
+          <a:fontRef idx="minor">
+            <a:schemeClr val="dk1"/>
+          </a:fontRef>
+        </p:style>
+        <p:txBody>
+          <a:bodyPr rtlCol="0" anchor="ctr"/>
+          <a:lstStyle/>
+          <a:p>
+            <a:pPr algn="ctr"/>
+            <a:endParaRPr lang="en-US"/>
+          </a:p>
+        </p:txBody>
+      </p:sp>
+      <p:pic>
+        <p:nvPicPr>
+          <p:cNvPr id="22" name="Graphic 21" descr="Arrow: Clockwise curve">
+            <a:extLst>
+              <a:ext uri="{FF2B5EF4-FFF2-40B4-BE49-F238E27FC236}">
+                <a16:creationId xmlns:a16="http://schemas.microsoft.com/office/drawing/2014/main" id="{ADA03324-FA14-43A0-B04D-E9E7B8B6EFF2}"/>
+              </a:ext>
+            </a:extLst>
+          </p:cNvPr>
+          <p:cNvPicPr>
+            <a:picLocks noChangeAspect="1"/>
+          </p:cNvPicPr>
+          <p:nvPr/>
+        </p:nvPicPr>
+        <p:blipFill>
+          <a:blip r:embed="rId33">
+            <a:extLst>
+              <a:ext uri="{28A0092B-C50C-407E-A947-70E740481C1C}">
+                <a14:useLocalDpi xmlns:a14="http://schemas.microsoft.com/office/drawing/2010/main" val="0"/>
+              </a:ext>
+              <a:ext uri="{96DAC541-7B7A-43D3-8B79-37D633B846F1}">
+                <asvg:svgBlip xmlns:asvg="http://schemas.microsoft.com/office/drawing/2016/SVG/main" r:embed="rId34"/>
+              </a:ext>
+            </a:extLst>
+          </a:blip>
+          <a:stretch>
+            <a:fillRect/>
+          </a:stretch>
+        </p:blipFill>
+        <p:spPr>
+          <a:xfrm>
+            <a:off x="7807482" y="2295040"/>
+            <a:ext cx="850786" cy="850786"/>
+          </a:xfrm>
+          <a:prstGeom prst="rect">
+            <a:avLst/>
+          </a:prstGeom>
+        </p:spPr>
+      </p:pic>
     </p:spTree>
     <p:extLst>
       <p:ext uri="{BB962C8B-B14F-4D97-AF65-F5344CB8AC3E}">
@@ -13092,25 +13377,25 @@
 
 <file path=customXml/item1.xml><?xml version="1.0" encoding="utf-8"?>
 <Control xmlns="http://schemas.microsoft.com/VisualStudio/2011/storyboarding/control">
-  <Id Name="System.Storyboarding.WindowsPhoneIcons.Rewind" Revision="1" Stencil="System.Storyboarding.WindowsPhoneIcons" StencilVersion="0.1"/>
+  <Id Name="System.Storyboarding.WindowsAppIcons.Edit" Revision="1" Stencil="System.Storyboarding.WindowsAppIcons" StencilVersion="0.1"/>
 </Control>
 </file>
 
 <file path=customXml/item10.xml><?xml version="1.0" encoding="utf-8"?>
 <Control xmlns="http://schemas.microsoft.com/VisualStudio/2011/storyboarding/control">
-  <Id Name="System.Storyboarding.WindowsAppIcons.Play" Revision="1" Stencil="System.Storyboarding.WindowsAppIcons" StencilVersion="0.1"/>
+  <Id Name="System.Storyboarding.WindowsAppIcons.Edit" Revision="1" Stencil="System.Storyboarding.WindowsAppIcons" StencilVersion="0.1"/>
 </Control>
 </file>
 
 <file path=customXml/item11.xml><?xml version="1.0" encoding="utf-8"?>
 <Control xmlns="http://schemas.microsoft.com/VisualStudio/2011/storyboarding/control">
-  <Id Name="System.Storyboarding.WindowsPhoneIcons.Cancel" Revision="1" Stencil="System.Storyboarding.WindowsPhoneIcons" StencilVersion="0.1"/>
+  <Id Name="System.Storyboarding.WindowsPhoneIcons.Refresh" Revision="1" Stencil="System.Storyboarding.WindowsPhoneIcons" StencilVersion="0.1"/>
 </Control>
 </file>
 
 <file path=customXml/item12.xml><?xml version="1.0" encoding="utf-8"?>
 <Control xmlns="http://schemas.microsoft.com/VisualStudio/2011/storyboarding/control">
-  <Id Name="System.Storyboarding.WindowsPhoneIcons.Add" Revision="1" Stencil="System.Storyboarding.WindowsPhoneIcons" StencilVersion="0.1"/>
+  <Id Name="System.Storyboarding.WindowsAppIcons.Edit" Revision="1" Stencil="System.Storyboarding.WindowsAppIcons" StencilVersion="0.1"/>
 </Control>
 </file>
 
@@ -13122,61 +13407,61 @@
 
 <file path=customXml/item14.xml><?xml version="1.0" encoding="utf-8"?>
 <Control xmlns="http://schemas.microsoft.com/VisualStudio/2011/storyboarding/control">
-  <Id Name="System.Storyboarding.WindowsAppIcons.Donotwant" Revision="1" Stencil="System.Storyboarding.WindowsAppIcons" StencilVersion="0.1"/>
+  <Id Name="System.Storyboarding.WindowsAppIcons.Edit" Revision="1" Stencil="System.Storyboarding.WindowsAppIcons" StencilVersion="0.1"/>
 </Control>
 </file>
 
 <file path=customXml/item15.xml><?xml version="1.0" encoding="utf-8"?>
+<Control xmlns="http://schemas.microsoft.com/VisualStudio/2011/storyboarding/control">
+  <Id Name="System.Storyboarding.WindowsPhoneIcons.Cancel" Revision="1" Stencil="System.Storyboarding.WindowsPhoneIcons" StencilVersion="0.1"/>
+</Control>
+</file>
+
+<file path=customXml/item16.xml><?xml version="1.0" encoding="utf-8"?>
 <Control xmlns="http://schemas.microsoft.com/VisualStudio/2011/storyboarding/control">
   <Id Name="System.Storyboarding.WindowsAppIcons.Play" Revision="1" Stencil="System.Storyboarding.WindowsAppIcons" StencilVersion="0.1"/>
 </Control>
 </file>
 
-<file path=customXml/item16.xml><?xml version="1.0" encoding="utf-8"?>
+<file path=customXml/item17.xml><?xml version="1.0" encoding="utf-8"?>
 <Control xmlns="http://schemas.microsoft.com/VisualStudio/2011/storyboarding/control">
-  <Id Name="e75cd7fd-d454-43ac-a2bd-cf0ac4f48652" RevisionId="8831f7ae-9100-4ae6-a512-25e5a2ad6d46" Stencil="172d6d98-e5c9-42e9-a209-79f7a94bbd38" StencilRevisionId="00000000-0000-0000-0000-000000000000" StencilVersion="0.0"/>
+  <Id Name="System.Storyboarding.WindowsPhoneIcons.FastForward" Revision="1" Stencil="System.Storyboarding.WindowsPhoneIcons" StencilVersion="0.1"/>
 </Control>
 </file>
 
-<file path=customXml/item17.xml><?xml version="1.0" encoding="utf-8"?>
+<file path=customXml/item18.xml><?xml version="1.0" encoding="utf-8"?>
+<Control xmlns="http://schemas.microsoft.com/VisualStudio/2011/storyboarding/control">
+  <Id Name="System.Storyboarding.WindowsPhoneIcons.Minus" Revision="1" Stencil="System.Storyboarding.WindowsPhoneIcons" StencilVersion="0.1"/>
+</Control>
+</file>
+
+<file path=customXml/item19.xml><?xml version="1.0" encoding="utf-8"?>
+<Control xmlns="http://schemas.microsoft.com/VisualStudio/2011/storyboarding/control">
+  <Id Name="System.Storyboarding.WindowsPhoneIcons.Add" Revision="1" Stencil="System.Storyboarding.WindowsPhoneIcons" StencilVersion="0.1"/>
+</Control>
+</file>
+
+<file path=customXml/item2.xml><?xml version="1.0" encoding="utf-8"?>
+<Control xmlns="http://schemas.microsoft.com/VisualStudio/2011/storyboarding/control">
+  <Id Name="System.Storyboarding.WindowsAppIcons.Minus" Revision="1" Stencil="System.Storyboarding.WindowsAppIcons" StencilVersion="0.1"/>
+</Control>
+</file>
+
+<file path=customXml/item20.xml><?xml version="1.0" encoding="utf-8"?>
 <Control xmlns="http://schemas.microsoft.com/VisualStudio/2011/storyboarding/control">
   <Id Name="System.Storyboarding.WindowsPhoneIcons.Cancel" Revision="1" Stencil="System.Storyboarding.WindowsPhoneIcons" StencilVersion="0.1"/>
 </Control>
 </file>
 
-<file path=customXml/item18.xml><?xml version="1.0" encoding="utf-8"?>
-<Control xmlns="http://schemas.microsoft.com/VisualStudio/2011/storyboarding/control">
-  <Id Name="System.Storyboarding.WindowsAppIcons.Play" Revision="1" Stencil="System.Storyboarding.WindowsAppIcons" StencilVersion="0.1"/>
-</Control>
-</file>
-
-<file path=customXml/item19.xml><?xml version="1.0" encoding="utf-8"?>
-<Control xmlns="http://schemas.microsoft.com/VisualStudio/2011/storyboarding/control">
-  <Id Name="System.Storyboarding.WindowsAppIcons.Retweet" Revision="1" Stencil="System.Storyboarding.WindowsAppIcons" StencilVersion="0.1"/>
-</Control>
-</file>
-
-<file path=customXml/item2.xml><?xml version="1.0" encoding="utf-8"?>
-<Control xmlns="http://schemas.microsoft.com/VisualStudio/2011/storyboarding/control">
-  <Id Name="System.Storyboarding.WindowsPhoneIcons.Cancel" Revision="1" Stencil="System.Storyboarding.WindowsPhoneIcons" StencilVersion="0.1"/>
-</Control>
-</file>
-
-<file path=customXml/item20.xml><?xml version="1.0" encoding="utf-8"?>
-<Control xmlns="http://schemas.microsoft.com/VisualStudio/2011/storyboarding/control">
-  <Id Name="System.Storyboarding.WindowsAppIcons.Play" Revision="1" Stencil="System.Storyboarding.WindowsAppIcons" StencilVersion="0.1"/>
-</Control>
-</file>
-
 <file path=customXml/item21.xml><?xml version="1.0" encoding="utf-8"?>
 <Control xmlns="http://schemas.microsoft.com/VisualStudio/2011/storyboarding/control">
-  <Id Name="System.Storyboarding.WindowsAppIcons.Play" Revision="1" Stencil="System.Storyboarding.WindowsAppIcons" StencilVersion="0.1"/>
+  <Id Name="System.Storyboarding.WindowsAppIcons.Edit" Revision="1" Stencil="System.Storyboarding.WindowsAppIcons" StencilVersion="0.1"/>
 </Control>
 </file>
 
 <file path=customXml/item22.xml><?xml version="1.0" encoding="utf-8"?>
 <Control xmlns="http://schemas.microsoft.com/VisualStudio/2011/storyboarding/control">
-  <Id Name="4b4d62c4-0b58-49c3-9bd5-0f2c494cd34e" RevisionId="df283dbf-c6b0-49ce-bc2c-3341a4271bd3" Stencil="172d6d98-e5c9-42e9-a209-79f7a94bbd38" StencilRevisionId="00000000-0000-0000-0000-000000000000" StencilVersion="0.0"/>
+  <Id Name="32035d07-bc66-4a79-8001-2507012193e3" RevisionId="7f6cc906-8fab-4878-8f41-90bcdc4e860e" Stencil="172d6d98-e5c9-42e9-a209-79f7a94bbd38" StencilRevisionId="00000000-0000-0000-0000-000000000000" StencilVersion="0.0"/>
 </Control>
 </file>
 
@@ -13188,7 +13473,7 @@
 
 <file path=customXml/item24.xml><?xml version="1.0" encoding="utf-8"?>
 <Control xmlns="http://schemas.microsoft.com/VisualStudio/2011/storyboarding/control">
-  <Id Name="System.Storyboarding.WindowsAppIcons.Plus" Revision="1" Stencil="System.Storyboarding.WindowsAppIcons" StencilVersion="0.1"/>
+  <Id Name="System.Storyboarding.WindowsAppIcons.Play" Revision="1" Stencil="System.Storyboarding.WindowsAppIcons" StencilVersion="0.1"/>
 </Control>
 </file>
 
@@ -13200,67 +13485,67 @@
 
 <file path=customXml/item26.xml><?xml version="1.0" encoding="utf-8"?>
 <Control xmlns="http://schemas.microsoft.com/VisualStudio/2011/storyboarding/control">
+  <Id Name="System.Storyboarding.Icons.FolderOpen" Revision="1" Stencil="System.Storyboarding.Icons" StencilVersion="0.1"/>
+</Control>
+</file>
+
+<file path=customXml/item27.xml><?xml version="1.0" encoding="utf-8"?>
+<Control xmlns="http://schemas.microsoft.com/VisualStudio/2011/storyboarding/control">
+  <Id Name="System.Storyboarding.WindowsAppIcons.Play" Revision="1" Stencil="System.Storyboarding.WindowsAppIcons" StencilVersion="0.1"/>
+</Control>
+</file>
+
+<file path=customXml/item28.xml><?xml version="1.0" encoding="utf-8"?>
+<Control xmlns="http://schemas.microsoft.com/VisualStudio/2011/storyboarding/control">
+  <Id Name="System.Storyboarding.WindowsAppIcons.Play" Revision="1" Stencil="System.Storyboarding.WindowsAppIcons" StencilVersion="0.1"/>
+</Control>
+</file>
+
+<file path=customXml/item29.xml><?xml version="1.0" encoding="utf-8"?>
+<Control xmlns="http://schemas.microsoft.com/VisualStudio/2011/storyboarding/control">
+  <Id Name="System.Storyboarding.WindowsAppIcons.Clock" Revision="1" Stencil="System.Storyboarding.WindowsAppIcons" StencilVersion="0.1"/>
+</Control>
+</file>
+
+<file path=customXml/item3.xml><?xml version="1.0" encoding="utf-8"?>
+<Control xmlns="http://schemas.microsoft.com/VisualStudio/2011/storyboarding/control">
+  <Id Name="System.Storyboarding.WindowsPhoneIcons.Cancel" Revision="1" Stencil="System.Storyboarding.WindowsPhoneIcons" StencilVersion="0.1"/>
+</Control>
+</file>
+
+<file path=customXml/item30.xml><?xml version="1.0" encoding="utf-8"?>
+<Control xmlns="http://schemas.microsoft.com/VisualStudio/2011/storyboarding/control">
+  <Id Name="System.Storyboarding.WindowsPhoneIcons.Cancel" Revision="1" Stencil="System.Storyboarding.WindowsPhoneIcons" StencilVersion="0.1"/>
+</Control>
+</file>
+
+<file path=customXml/item31.xml><?xml version="1.0" encoding="utf-8"?>
+<Control xmlns="http://schemas.microsoft.com/VisualStudio/2011/storyboarding/control">
+  <Id Name="System.Storyboarding.WindowsPhoneIcons.Rewind" Revision="1" Stencil="System.Storyboarding.WindowsPhoneIcons" StencilVersion="0.1"/>
+</Control>
+</file>
+
+<file path=customXml/item32.xml><?xml version="1.0" encoding="utf-8"?>
+<Control xmlns="http://schemas.microsoft.com/VisualStudio/2011/storyboarding/control">
   <Id Name="System.Storyboarding.Icons.Volume" Revision="1" Stencil="System.Storyboarding.Icons" StencilVersion="0.1"/>
 </Control>
 </file>
 
-<file path=customXml/item27.xml><?xml version="1.0" encoding="utf-8"?>
+<file path=customXml/item33.xml><?xml version="1.0" encoding="utf-8"?>
 <Control xmlns="http://schemas.microsoft.com/VisualStudio/2011/storyboarding/control">
-  <Id Name="System.Storyboarding.WindowsPhoneIcons.Add" Revision="1" Stencil="System.Storyboarding.WindowsPhoneIcons" StencilVersion="0.1"/>
+  <Id Name="System.Storyboarding.WindowsAppIcons.Play" Revision="1" Stencil="System.Storyboarding.WindowsAppIcons" StencilVersion="0.1"/>
 </Control>
 </file>
 
-<file path=customXml/item28.xml><?xml version="1.0" encoding="utf-8"?>
+<file path=customXml/item34.xml><?xml version="1.0" encoding="utf-8"?>
 <Control xmlns="http://schemas.microsoft.com/VisualStudio/2011/storyboarding/control">
   <Id Name="System.Storyboarding.WindowsAppIcons.Edit" Revision="1" Stencil="System.Storyboarding.WindowsAppIcons" StencilVersion="0.1"/>
 </Control>
 </file>
 
-<file path=customXml/item29.xml><?xml version="1.0" encoding="utf-8"?>
-<Control xmlns="http://schemas.microsoft.com/VisualStudio/2011/storyboarding/control">
-  <Id Name="System.Storyboarding.WindowsPhoneIcons.Cancel" Revision="1" Stencil="System.Storyboarding.WindowsPhoneIcons" StencilVersion="0.1"/>
-</Control>
-</file>
-
-<file path=customXml/item3.xml><?xml version="1.0" encoding="utf-8"?>
-<Control xmlns="http://schemas.microsoft.com/VisualStudio/2011/storyboarding/control">
-  <Id Name="System.Storyboarding.WindowsPhoneIcons.Minus" Revision="1" Stencil="System.Storyboarding.WindowsPhoneIcons" StencilVersion="0.1"/>
-</Control>
-</file>
-
-<file path=customXml/item30.xml><?xml version="1.0" encoding="utf-8"?>
+<file path=customXml/item35.xml><?xml version="1.0" encoding="utf-8"?>
 <Control xmlns="http://schemas.microsoft.com/VisualStudio/2011/storyboarding/control">
   <Id Name="System.Storyboarding.WindowsAppIcons.Edit" Revision="1" Stencil="System.Storyboarding.WindowsAppIcons" StencilVersion="0.1"/>
-</Control>
-</file>
-
-<file path=customXml/item31.xml><?xml version="1.0" encoding="utf-8"?>
-<Control xmlns="http://schemas.microsoft.com/VisualStudio/2011/storyboarding/control">
-  <Id Name="System.Storyboarding.Icons.Volume" Revision="1" Stencil="System.Storyboarding.Icons" StencilVersion="0.1"/>
-</Control>
-</file>
-
-<file path=customXml/item32.xml><?xml version="1.0" encoding="utf-8"?>
-<Control xmlns="http://schemas.microsoft.com/VisualStudio/2011/storyboarding/control">
-  <Id Name="System.Storyboarding.WindowsAppIcons.Edit" Revision="1" Stencil="System.Storyboarding.WindowsAppIcons" StencilVersion="0.1"/>
-</Control>
-</file>
-
-<file path=customXml/item33.xml><?xml version="1.0" encoding="utf-8"?>
-<Control xmlns="http://schemas.microsoft.com/VisualStudio/2011/storyboarding/control">
-  <Id Name="32035d07-bc66-4a79-8001-2507012193e3" RevisionId="7f6cc906-8fab-4878-8f41-90bcdc4e860e" Stencil="172d6d98-e5c9-42e9-a209-79f7a94bbd38" StencilRevisionId="00000000-0000-0000-0000-000000000000" StencilVersion="0.0"/>
-</Control>
-</file>
-
-<file path=customXml/item34.xml><?xml version="1.0" encoding="utf-8"?>
-<Control xmlns="http://schemas.microsoft.com/VisualStudio/2011/storyboarding/control">
-  <Id Name="System.Storyboarding.WindowsAppIcons.Play" Revision="1" Stencil="System.Storyboarding.WindowsAppIcons" StencilVersion="0.1"/>
-</Control>
-</file>
-
-<file path=customXml/item35.xml><?xml version="1.0" encoding="utf-8"?>
-<Control xmlns="http://schemas.microsoft.com/VisualStudio/2011/storyboarding/control">
-  <Id Name="System.Storyboarding.WindowsPhoneIcons.Refresh" Revision="1" Stencil="System.Storyboarding.WindowsPhoneIcons" StencilVersion="0.1"/>
 </Control>
 </file>
 
@@ -13272,73 +13557,73 @@
 
 <file path=customXml/item37.xml><?xml version="1.0" encoding="utf-8"?>
 <Control xmlns="http://schemas.microsoft.com/VisualStudio/2011/storyboarding/control">
+  <Id Name="System.Storyboarding.WindowsPhoneIcons.Cancel" Revision="1" Stencil="System.Storyboarding.WindowsPhoneIcons" StencilVersion="0.1"/>
+</Control>
+</file>
+
+<file path=customXml/item38.xml><?xml version="1.0" encoding="utf-8"?>
+<Control xmlns="http://schemas.microsoft.com/VisualStudio/2011/storyboarding/control">
   <Id Name="System.Storyboarding.WindowsAppIcons.Minus" Revision="1" Stencil="System.Storyboarding.WindowsAppIcons" StencilVersion="0.1"/>
 </Control>
 </file>
 
-<file path=customXml/item38.xml><?xml version="1.0" encoding="utf-8"?>
+<file path=customXml/item39.xml><?xml version="1.0" encoding="utf-8"?>
+<Control xmlns="http://schemas.microsoft.com/VisualStudio/2011/storyboarding/control">
+  <Id Name="System.Storyboarding.WindowsAppIcons.Play" Revision="1" Stencil="System.Storyboarding.WindowsAppIcons" StencilVersion="0.1"/>
+</Control>
+</file>
+
+<file path=customXml/item4.xml><?xml version="1.0" encoding="utf-8"?>
+<Control xmlns="http://schemas.microsoft.com/VisualStudio/2011/storyboarding/control">
+  <Id Name="System.Storyboarding.WindowsPhoneIcons.Cancel" Revision="1" Stencil="System.Storyboarding.WindowsPhoneIcons" StencilVersion="0.1"/>
+</Control>
+</file>
+
+<file path=customXml/item40.xml><?xml version="1.0" encoding="utf-8"?>
+<Control xmlns="http://schemas.microsoft.com/VisualStudio/2011/storyboarding/control">
+  <Id Name="System.Storyboarding.Icons.Volume" Revision="1" Stencil="System.Storyboarding.Icons" StencilVersion="0.1"/>
+</Control>
+</file>
+
+<file path=customXml/item41.xml><?xml version="1.0" encoding="utf-8"?>
 <Control xmlns="http://schemas.microsoft.com/VisualStudio/2011/storyboarding/control">
   <Id Name="System.Storyboarding.WindowsAppIcons.Edit" Revision="1" Stencil="System.Storyboarding.WindowsAppIcons" StencilVersion="0.1"/>
 </Control>
 </file>
 
-<file path=customXml/item39.xml><?xml version="1.0" encoding="utf-8"?>
+<file path=customXml/item42.xml><?xml version="1.0" encoding="utf-8"?>
 <Control xmlns="http://schemas.microsoft.com/VisualStudio/2011/storyboarding/control">
-  <Id Name="System.Storyboarding.WindowsAppIcons.Plus" Revision="1" Stencil="System.Storyboarding.WindowsAppIcons" StencilVersion="0.1"/>
+  <Id Name="System.Storyboarding.WindowsAppIcons.Edit" Revision="1" Stencil="System.Storyboarding.WindowsAppIcons" StencilVersion="0.1"/>
 </Control>
 </file>
 
-<file path=customXml/item4.xml><?xml version="1.0" encoding="utf-8"?>
+<file path=customXml/item43.xml><?xml version="1.0" encoding="utf-8"?>
+<Control xmlns="http://schemas.microsoft.com/VisualStudio/2011/storyboarding/control">
+  <Id Name="System.Storyboarding.WindowsPhoneIcons.Add" Revision="1" Stencil="System.Storyboarding.WindowsPhoneIcons" StencilVersion="0.1"/>
+</Control>
+</file>
+
+<file path=customXml/item44.xml><?xml version="1.0" encoding="utf-8"?>
+<Control xmlns="http://schemas.microsoft.com/VisualStudio/2011/storyboarding/control">
+  <Id Name="System.Storyboarding.WindowsPhoneIcons.Rewind" Revision="1" Stencil="System.Storyboarding.WindowsPhoneIcons" StencilVersion="0.1"/>
+</Control>
+</file>
+
+<file path=customXml/item45.xml><?xml version="1.0" encoding="utf-8"?>
 <Control xmlns="http://schemas.microsoft.com/VisualStudio/2011/storyboarding/control">
   <Id Name="4b4d62c4-0b58-49c3-9bd5-0f2c494cd34e" RevisionId="df283dbf-c6b0-49ce-bc2c-3341a4271bd3" Stencil="172d6d98-e5c9-42e9-a209-79f7a94bbd38" StencilRevisionId="00000000-0000-0000-0000-000000000000" StencilVersion="0.0"/>
 </Control>
 </file>
 
-<file path=customXml/item40.xml><?xml version="1.0" encoding="utf-8"?>
-<Control xmlns="http://schemas.microsoft.com/VisualStudio/2011/storyboarding/control">
-  <Id Name="System.Storyboarding.WindowsAppIcons.Play" Revision="1" Stencil="System.Storyboarding.WindowsAppIcons" StencilVersion="0.1"/>
-</Control>
-</file>
-
-<file path=customXml/item41.xml><?xml version="1.0" encoding="utf-8"?>
-<Control xmlns="http://schemas.microsoft.com/VisualStudio/2011/storyboarding/control">
-  <Id Name="System.Storyboarding.WindowsAppIcons.Play" Revision="1" Stencil="System.Storyboarding.WindowsAppIcons" StencilVersion="0.1"/>
-</Control>
-</file>
-
-<file path=customXml/item42.xml><?xml version="1.0" encoding="utf-8"?>
+<file path=customXml/item46.xml><?xml version="1.0" encoding="utf-8"?>
 <Control xmlns="http://schemas.microsoft.com/VisualStudio/2011/storyboarding/control">
   <Id Name="System.Storyboarding.WindowsPhoneIcons.Cancel" Revision="1" Stencil="System.Storyboarding.WindowsPhoneIcons" StencilVersion="0.1"/>
 </Control>
 </file>
 
-<file path=customXml/item43.xml><?xml version="1.0" encoding="utf-8"?>
-<Control xmlns="http://schemas.microsoft.com/VisualStudio/2011/storyboarding/control">
-  <Id Name="System.Storyboarding.WindowsAppIcons.Edit" Revision="1" Stencil="System.Storyboarding.WindowsAppIcons" StencilVersion="0.1"/>
-</Control>
-</file>
-
-<file path=customXml/item44.xml><?xml version="1.0" encoding="utf-8"?>
-<Control xmlns="http://schemas.microsoft.com/VisualStudio/2011/storyboarding/control">
-  <Id Name="System.Storyboarding.WindowsAppIcons.Edit" Revision="1" Stencil="System.Storyboarding.WindowsAppIcons" StencilVersion="0.1"/>
-</Control>
-</file>
-
-<file path=customXml/item45.xml><?xml version="1.0" encoding="utf-8"?>
-<Control xmlns="http://schemas.microsoft.com/VisualStudio/2011/storyboarding/control">
-  <Id Name="System.Storyboarding.WindowsAppIcons.Down" Revision="1" Stencil="System.Storyboarding.WindowsAppIcons" StencilVersion="0.1"/>
-</Control>
-</file>
-
-<file path=customXml/item46.xml><?xml version="1.0" encoding="utf-8"?>
+<file path=customXml/item47.xml><?xml version="1.0" encoding="utf-8"?>
 <Control xmlns="http://schemas.microsoft.com/VisualStudio/2011/storyboarding/control">
   <Id Name="System.Storyboarding.WindowsAppIcons.Play" Revision="1" Stencil="System.Storyboarding.WindowsAppIcons" StencilVersion="0.1"/>
-</Control>
-</file>
-
-<file path=customXml/item47.xml><?xml version="1.0" encoding="utf-8"?>
-<Control xmlns="http://schemas.microsoft.com/VisualStudio/2011/storyboarding/control">
-  <Id Name="System.Storyboarding.WindowsAppIcons.Edit" Revision="1" Stencil="System.Storyboarding.WindowsAppIcons" StencilVersion="0.1"/>
 </Control>
 </file>
 
@@ -13350,7 +13635,7 @@
 
 <file path=customXml/item49.xml><?xml version="1.0" encoding="utf-8"?>
 <Control xmlns="http://schemas.microsoft.com/VisualStudio/2011/storyboarding/control">
-  <Id Name="System.Storyboarding.WindowsPhoneIcons.Cancel" Revision="1" Stencil="System.Storyboarding.WindowsPhoneIcons" StencilVersion="0.1"/>
+  <Id Name="System.Storyboarding.WindowsAppIcons.Plus" Revision="1" Stencil="System.Storyboarding.WindowsAppIcons" StencilVersion="0.1"/>
 </Control>
 </file>
 
@@ -13362,31 +13647,31 @@
 
 <file path=customXml/item50.xml><?xml version="1.0" encoding="utf-8"?>
 <Control xmlns="http://schemas.microsoft.com/VisualStudio/2011/storyboarding/control">
-  <Id Name="System.Storyboarding.WindowsAppIcons.Edit" Revision="1" Stencil="System.Storyboarding.WindowsAppIcons" StencilVersion="0.1"/>
+  <Id Name="System.Storyboarding.WindowsAppIcons.Play" Revision="1" Stencil="System.Storyboarding.WindowsAppIcons" StencilVersion="0.1"/>
 </Control>
 </file>
 
 <file path=customXml/item51.xml><?xml version="1.0" encoding="utf-8"?>
-<Control xmlns="http://schemas.microsoft.com/VisualStudio/2011/storyboarding/control">
-  <Id Name="System.Storyboarding.WindowsPhoneIcons.FastForward" Revision="1" Stencil="System.Storyboarding.WindowsPhoneIcons" StencilVersion="0.1"/>
-</Control>
-</file>
-
-<file path=customXml/item52.xml><?xml version="1.0" encoding="utf-8"?>
 <Control xmlns="http://schemas.microsoft.com/VisualStudio/2011/storyboarding/control">
   <Id Name="System.Storyboarding.WindowsAppIcons.Edit" Revision="1" Stencil="System.Storyboarding.WindowsAppIcons" StencilVersion="0.1"/>
 </Control>
 </file>
 
-<file path=customXml/item53.xml><?xml version="1.0" encoding="utf-8"?>
+<file path=customXml/item52.xml><?xml version="1.0" encoding="utf-8"?>
 <Control xmlns="http://schemas.microsoft.com/VisualStudio/2011/storyboarding/control">
   <Id Name="System.Storyboarding.WindowsPhoneIcons.Cancel" Revision="1" Stencil="System.Storyboarding.WindowsPhoneIcons" StencilVersion="0.1"/>
 </Control>
 </file>
 
+<file path=customXml/item53.xml><?xml version="1.0" encoding="utf-8"?>
+<Control xmlns="http://schemas.microsoft.com/VisualStudio/2011/storyboarding/control">
+  <Id Name="System.Storyboarding.WindowsAppIcons.Edit" Revision="1" Stencil="System.Storyboarding.WindowsAppIcons" StencilVersion="0.1"/>
+</Control>
+</file>
+
 <file path=customXml/item54.xml><?xml version="1.0" encoding="utf-8"?>
 <Control xmlns="http://schemas.microsoft.com/VisualStudio/2011/storyboarding/control">
-  <Id Name="System.Storyboarding.WindowsAppIcons.Clock" Revision="1" Stencil="System.Storyboarding.WindowsAppIcons" StencilVersion="0.1"/>
+  <Id Name="System.Storyboarding.WindowsPhoneIcons.Cancel" Revision="1" Stencil="System.Storyboarding.WindowsPhoneIcons" StencilVersion="0.1"/>
 </Control>
 </file>
 
@@ -13398,107 +13683,299 @@
 
 <file path=customXml/item56.xml><?xml version="1.0" encoding="utf-8"?>
 <Control xmlns="http://schemas.microsoft.com/VisualStudio/2011/storyboarding/control">
-  <Id Name="System.Storyboarding.WindowsAppIcons.Edit" Revision="1" Stencil="System.Storyboarding.WindowsAppIcons" StencilVersion="0.1"/>
+  <Id Name="System.Storyboarding.WindowsAppIcons.Plus" Revision="1" Stencil="System.Storyboarding.WindowsAppIcons" StencilVersion="0.1"/>
 </Control>
 </file>
 
 <file path=customXml/item57.xml><?xml version="1.0" encoding="utf-8"?>
 <Control xmlns="http://schemas.microsoft.com/VisualStudio/2011/storyboarding/control">
-  <Id Name="System.Storyboarding.WindowsAppIcons.Minus" Revision="1" Stencil="System.Storyboarding.WindowsAppIcons" StencilVersion="0.1"/>
+  <Id Name="System.Storyboarding.WindowsAppIcons.Play" Revision="1" Stencil="System.Storyboarding.WindowsAppIcons" StencilVersion="0.1"/>
 </Control>
 </file>
 
 <file path=customXml/item58.xml><?xml version="1.0" encoding="utf-8"?>
+<Control xmlns="http://schemas.microsoft.com/VisualStudio/2011/storyboarding/control">
+  <Id Name="System.Storyboarding.WindowsAppIcons.Down" Revision="1" Stencil="System.Storyboarding.WindowsAppIcons" StencilVersion="0.1"/>
+</Control>
+</file>
+
+<file path=customXml/item59.xml><?xml version="1.0" encoding="utf-8"?>
+<Control xmlns="http://schemas.microsoft.com/VisualStudio/2011/storyboarding/control">
+  <Id Name="System.Storyboarding.WindowsAppIcons.Play" Revision="1" Stencil="System.Storyboarding.WindowsAppIcons" StencilVersion="0.1"/>
+</Control>
+</file>
+
+<file path=customXml/item6.xml><?xml version="1.0" encoding="utf-8"?>
+<Control xmlns="http://schemas.microsoft.com/VisualStudio/2011/storyboarding/control">
+  <Id Name="System.Storyboarding.WindowsAppIcons.Retweet" Revision="1" Stencil="System.Storyboarding.WindowsAppIcons" StencilVersion="0.1"/>
+</Control>
+</file>
+
+<file path=customXml/item60.xml><?xml version="1.0" encoding="utf-8"?>
 <Control xmlns="http://schemas.microsoft.com/VisualStudio/2011/storyboarding/control">
   <Id Name="System.Storyboarding.WindowsPhoneIcons.Cancel" Revision="1" Stencil="System.Storyboarding.WindowsPhoneIcons" StencilVersion="0.1"/>
 </Control>
 </file>
 
-<file path=customXml/item59.xml><?xml version="1.0" encoding="utf-8"?>
+<file path=customXml/item61.xml><?xml version="1.0" encoding="utf-8"?>
+<Control xmlns="http://schemas.microsoft.com/VisualStudio/2011/storyboarding/control">
+  <Id Name="System.Storyboarding.Icons.Volume" Revision="1" Stencil="System.Storyboarding.Icons" StencilVersion="0.1"/>
+</Control>
+</file>
+
+<file path=customXml/item62.xml><?xml version="1.0" encoding="utf-8"?>
+<Control xmlns="http://schemas.microsoft.com/VisualStudio/2011/storyboarding/control">
+  <Id Name="System.Storyboarding.WindowsAppIcons.Play" Revision="1" Stencil="System.Storyboarding.WindowsAppIcons" StencilVersion="0.1"/>
+</Control>
+</file>
+
+<file path=customXml/item63.xml><?xml version="1.0" encoding="utf-8"?>
+<Control xmlns="http://schemas.microsoft.com/VisualStudio/2011/storyboarding/control">
+  <Id Name="System.Storyboarding.WindowsPhoneIcons.Cancel" Revision="1" Stencil="System.Storyboarding.WindowsPhoneIcons" StencilVersion="0.1"/>
+</Control>
+</file>
+
+<file path=customXml/item64.xml><?xml version="1.0" encoding="utf-8"?>
 <Control xmlns="http://schemas.microsoft.com/VisualStudio/2011/storyboarding/control">
   <Id Name="System.Storyboarding.WindowsAppIcons.Edit" Revision="1" Stencil="System.Storyboarding.WindowsAppIcons" StencilVersion="0.1"/>
 </Control>
 </file>
 
-<file path=customXml/item6.xml><?xml version="1.0" encoding="utf-8"?>
+<file path=customXml/item65.xml><?xml version="1.0" encoding="utf-8"?>
 <Control xmlns="http://schemas.microsoft.com/VisualStudio/2011/storyboarding/control">
-  <Id Name="System.Storyboarding.Icons.Volume" Revision="1" Stencil="System.Storyboarding.Icons" StencilVersion="0.1"/>
+  <Id Name="System.Storyboarding.WindowsAppIcons.Play" Revision="1" Stencil="System.Storyboarding.WindowsAppIcons" StencilVersion="0.1"/>
 </Control>
 </file>
 
-<file path=customXml/item60.xml><?xml version="1.0" encoding="utf-8"?>
+<file path=customXml/item66.xml><?xml version="1.0" encoding="utf-8"?>
+<Control xmlns="http://schemas.microsoft.com/VisualStudio/2011/storyboarding/control">
+  <Id Name="System.Storyboarding.WindowsAppIcons.Edit" Revision="1" Stencil="System.Storyboarding.WindowsAppIcons" StencilVersion="0.1"/>
+</Control>
+</file>
+
+<file path=customXml/item67.xml><?xml version="1.0" encoding="utf-8"?>
+<Control xmlns="http://schemas.microsoft.com/VisualStudio/2011/storyboarding/control">
+  <Id Name="e75cd7fd-d454-43ac-a2bd-cf0ac4f48652" RevisionId="8831f7ae-9100-4ae6-a512-25e5a2ad6d46" Stencil="172d6d98-e5c9-42e9-a209-79f7a94bbd38" StencilRevisionId="00000000-0000-0000-0000-000000000000" StencilVersion="0.0"/>
+</Control>
+</file>
+
+<file path=customXml/item68.xml><?xml version="1.0" encoding="utf-8"?>
+<Control xmlns="http://schemas.microsoft.com/VisualStudio/2011/storyboarding/control">
+  <Id Name="System.Storyboarding.WindowsPhoneIcons.Cancel" Revision="1" Stencil="System.Storyboarding.WindowsPhoneIcons" StencilVersion="0.1"/>
+</Control>
+</file>
+
+<file path=customXml/item7.xml><?xml version="1.0" encoding="utf-8"?>
+<Control xmlns="http://schemas.microsoft.com/VisualStudio/2011/storyboarding/control">
+  <Id Name="System.Storyboarding.WindowsAppIcons.Donotwant" Revision="1" Stencil="System.Storyboarding.WindowsAppIcons" StencilVersion="0.1"/>
+</Control>
+</file>
+
+<file path=customXml/item8.xml><?xml version="1.0" encoding="utf-8"?>
+<Control xmlns="http://schemas.microsoft.com/VisualStudio/2011/storyboarding/control">
+  <Id Name="4b4d62c4-0b58-49c3-9bd5-0f2c494cd34e" RevisionId="df283dbf-c6b0-49ce-bc2c-3341a4271bd3" Stencil="172d6d98-e5c9-42e9-a209-79f7a94bbd38" StencilRevisionId="00000000-0000-0000-0000-000000000000" StencilVersion="0.0"/>
+</Control>
+</file>
+
+<file path=customXml/item9.xml><?xml version="1.0" encoding="utf-8"?>
 <Control xmlns="http://schemas.microsoft.com/VisualStudio/2011/storyboarding/control">
   <Id Name="System.Storyboarding.WindowsPhoneIcons.Add" Revision="1" Stencil="System.Storyboarding.WindowsPhoneIcons" StencilVersion="0.1"/>
 </Control>
 </file>
 
-<file path=customXml/item61.xml><?xml version="1.0" encoding="utf-8"?>
-<Control xmlns="http://schemas.microsoft.com/VisualStudio/2011/storyboarding/control">
-  <Id Name="System.Storyboarding.WindowsPhoneIcons.Cancel" Revision="1" Stencil="System.Storyboarding.WindowsPhoneIcons" StencilVersion="0.1"/>
-</Control>
-</file>
-
-<file path=customXml/item62.xml><?xml version="1.0" encoding="utf-8"?>
-<Control xmlns="http://schemas.microsoft.com/VisualStudio/2011/storyboarding/control">
-  <Id Name="System.Storyboarding.WindowsPhoneIcons.Cancel" Revision="1" Stencil="System.Storyboarding.WindowsPhoneIcons" StencilVersion="0.1"/>
-</Control>
-</file>
-
-<file path=customXml/item63.xml><?xml version="1.0" encoding="utf-8"?>
-<Control xmlns="http://schemas.microsoft.com/VisualStudio/2011/storyboarding/control">
-  <Id Name="System.Storyboarding.WindowsAppIcons.Play" Revision="1" Stencil="System.Storyboarding.WindowsAppIcons" StencilVersion="0.1"/>
-</Control>
-</file>
-
-<file path=customXml/item64.xml><?xml version="1.0" encoding="utf-8"?>
-<Control xmlns="http://schemas.microsoft.com/VisualStudio/2011/storyboarding/control">
-  <Id Name="System.Storyboarding.WindowsPhoneIcons.Cancel" Revision="1" Stencil="System.Storyboarding.WindowsPhoneIcons" StencilVersion="0.1"/>
-</Control>
-</file>
-
-<file path=customXml/item65.xml><?xml version="1.0" encoding="utf-8"?>
-<Control xmlns="http://schemas.microsoft.com/VisualStudio/2011/storyboarding/control">
-  <Id Name="System.Storyboarding.WindowsPhoneIcons.Rewind" Revision="1" Stencil="System.Storyboarding.WindowsPhoneIcons" StencilVersion="0.1"/>
-</Control>
-</file>
-
-<file path=customXml/item66.xml><?xml version="1.0" encoding="utf-8"?>
-<Control xmlns="http://schemas.microsoft.com/VisualStudio/2011/storyboarding/control">
-  <Id Name="System.Storyboarding.WindowsAppIcons.Play" Revision="1" Stencil="System.Storyboarding.WindowsAppIcons" StencilVersion="0.1"/>
-</Control>
-</file>
-
-<file path=customXml/item67.xml><?xml version="1.0" encoding="utf-8"?>
-<Control xmlns="http://schemas.microsoft.com/VisualStudio/2011/storyboarding/control">
-  <Id Name="System.Storyboarding.Icons.FolderOpen" Revision="1" Stencil="System.Storyboarding.Icons" StencilVersion="0.1"/>
-</Control>
-</file>
-
-<file path=customXml/item68.xml><?xml version="1.0" encoding="utf-8"?>
-<Control xmlns="http://schemas.microsoft.com/VisualStudio/2011/storyboarding/control">
-  <Id Name="System.Storyboarding.WindowsAppIcons.Edit" Revision="1" Stencil="System.Storyboarding.WindowsAppIcons" StencilVersion="0.1"/>
-</Control>
-</file>
-
-<file path=customXml/item7.xml><?xml version="1.0" encoding="utf-8"?>
-<Control xmlns="http://schemas.microsoft.com/VisualStudio/2011/storyboarding/control">
-  <Id Name="System.Storyboarding.WindowsAppIcons.Edit" Revision="1" Stencil="System.Storyboarding.WindowsAppIcons" StencilVersion="0.1"/>
-</Control>
-</file>
-
-<file path=customXml/item8.xml><?xml version="1.0" encoding="utf-8"?>
-<Control xmlns="http://schemas.microsoft.com/VisualStudio/2011/storyboarding/control">
-  <Id Name="System.Storyboarding.WindowsAppIcons.Play" Revision="1" Stencil="System.Storyboarding.WindowsAppIcons" StencilVersion="0.1"/>
-</Control>
-</file>
-
-<file path=customXml/item9.xml><?xml version="1.0" encoding="utf-8"?>
-<Control xmlns="http://schemas.microsoft.com/VisualStudio/2011/storyboarding/control">
-  <Id Name="System.Storyboarding.WindowsPhoneIcons.Cancel" Revision="1" Stencil="System.Storyboarding.WindowsPhoneIcons" StencilVersion="0.1"/>
-</Control>
-</file>
-
 <file path=customXml/itemProps1.xml><?xml version="1.0" encoding="utf-8"?>
+<ds:datastoreItem xmlns:ds="http://schemas.openxmlformats.org/officeDocument/2006/customXml" ds:itemID="{CC557381-0DF9-4AE0-A746-74A48780A5BE}">
+  <ds:schemaRefs>
+    <ds:schemaRef ds:uri="http://schemas.microsoft.com/VisualStudio/2011/storyboarding/control"/>
+  </ds:schemaRefs>
+</ds:datastoreItem>
+</file>
+
+<file path=customXml/itemProps10.xml><?xml version="1.0" encoding="utf-8"?>
+<ds:datastoreItem xmlns:ds="http://schemas.openxmlformats.org/officeDocument/2006/customXml" ds:itemID="{80A2EE3F-8E5E-4E02-8371-075F75881CC2}">
+  <ds:schemaRefs>
+    <ds:schemaRef ds:uri="http://schemas.microsoft.com/VisualStudio/2011/storyboarding/control"/>
+  </ds:schemaRefs>
+</ds:datastoreItem>
+</file>
+
+<file path=customXml/itemProps11.xml><?xml version="1.0" encoding="utf-8"?>
+<ds:datastoreItem xmlns:ds="http://schemas.openxmlformats.org/officeDocument/2006/customXml" ds:itemID="{F50EEE5E-70AE-4092-8CFF-7CEEF7A1A3DA}">
+  <ds:schemaRefs>
+    <ds:schemaRef ds:uri="http://schemas.microsoft.com/VisualStudio/2011/storyboarding/control"/>
+  </ds:schemaRefs>
+</ds:datastoreItem>
+</file>
+
+<file path=customXml/itemProps12.xml><?xml version="1.0" encoding="utf-8"?>
+<ds:datastoreItem xmlns:ds="http://schemas.openxmlformats.org/officeDocument/2006/customXml" ds:itemID="{91ED1748-2ACC-4580-9DD0-53AE211F1DA7}">
+  <ds:schemaRefs>
+    <ds:schemaRef ds:uri="http://schemas.microsoft.com/VisualStudio/2011/storyboarding/control"/>
+  </ds:schemaRefs>
+</ds:datastoreItem>
+</file>
+
+<file path=customXml/itemProps13.xml><?xml version="1.0" encoding="utf-8"?>
+<ds:datastoreItem xmlns:ds="http://schemas.openxmlformats.org/officeDocument/2006/customXml" ds:itemID="{5D95BE6E-D5AB-409A-85E4-CE7D6FA00509}">
+  <ds:schemaRefs>
+    <ds:schemaRef ds:uri="http://schemas.microsoft.com/VisualStudio/2011/storyboarding/control"/>
+  </ds:schemaRefs>
+</ds:datastoreItem>
+</file>
+
+<file path=customXml/itemProps14.xml><?xml version="1.0" encoding="utf-8"?>
+<ds:datastoreItem xmlns:ds="http://schemas.openxmlformats.org/officeDocument/2006/customXml" ds:itemID="{B0DD2967-9B1E-4AF4-9E22-1FB363BF21A1}">
+  <ds:schemaRefs>
+    <ds:schemaRef ds:uri="http://schemas.microsoft.com/VisualStudio/2011/storyboarding/control"/>
+  </ds:schemaRefs>
+</ds:datastoreItem>
+</file>
+
+<file path=customXml/itemProps15.xml><?xml version="1.0" encoding="utf-8"?>
+<ds:datastoreItem xmlns:ds="http://schemas.openxmlformats.org/officeDocument/2006/customXml" ds:itemID="{855315B8-2A4D-4E8D-AAC1-C0281182FD5B}">
+  <ds:schemaRefs>
+    <ds:schemaRef ds:uri="http://schemas.microsoft.com/VisualStudio/2011/storyboarding/control"/>
+  </ds:schemaRefs>
+</ds:datastoreItem>
+</file>
+
+<file path=customXml/itemProps16.xml><?xml version="1.0" encoding="utf-8"?>
+<ds:datastoreItem xmlns:ds="http://schemas.openxmlformats.org/officeDocument/2006/customXml" ds:itemID="{A6484AF2-F055-4C78-982B-D2156684306A}">
+  <ds:schemaRefs>
+    <ds:schemaRef ds:uri="http://schemas.microsoft.com/VisualStudio/2011/storyboarding/control"/>
+  </ds:schemaRefs>
+</ds:datastoreItem>
+</file>
+
+<file path=customXml/itemProps17.xml><?xml version="1.0" encoding="utf-8"?>
+<ds:datastoreItem xmlns:ds="http://schemas.openxmlformats.org/officeDocument/2006/customXml" ds:itemID="{8B4AE673-39D1-4921-A713-E0BD45B32E43}">
+  <ds:schemaRefs>
+    <ds:schemaRef ds:uri="http://schemas.microsoft.com/VisualStudio/2011/storyboarding/control"/>
+  </ds:schemaRefs>
+</ds:datastoreItem>
+</file>
+
+<file path=customXml/itemProps18.xml><?xml version="1.0" encoding="utf-8"?>
+<ds:datastoreItem xmlns:ds="http://schemas.openxmlformats.org/officeDocument/2006/customXml" ds:itemID="{0CAA02FD-32C9-42E8-98BE-0EAAD29173F4}">
+  <ds:schemaRefs>
+    <ds:schemaRef ds:uri="http://schemas.microsoft.com/VisualStudio/2011/storyboarding/control"/>
+  </ds:schemaRefs>
+</ds:datastoreItem>
+</file>
+
+<file path=customXml/itemProps19.xml><?xml version="1.0" encoding="utf-8"?>
+<ds:datastoreItem xmlns:ds="http://schemas.openxmlformats.org/officeDocument/2006/customXml" ds:itemID="{182A85CA-4E58-49C8-8C48-758766C210A9}">
+  <ds:schemaRefs>
+    <ds:schemaRef ds:uri="http://schemas.microsoft.com/VisualStudio/2011/storyboarding/control"/>
+  </ds:schemaRefs>
+</ds:datastoreItem>
+</file>
+
+<file path=customXml/itemProps2.xml><?xml version="1.0" encoding="utf-8"?>
+<ds:datastoreItem xmlns:ds="http://schemas.openxmlformats.org/officeDocument/2006/customXml" ds:itemID="{04504D90-2CEB-4E3A-A555-86C532BE774F}">
+  <ds:schemaRefs>
+    <ds:schemaRef ds:uri="http://schemas.microsoft.com/VisualStudio/2011/storyboarding/control"/>
+  </ds:schemaRefs>
+</ds:datastoreItem>
+</file>
+
+<file path=customXml/itemProps20.xml><?xml version="1.0" encoding="utf-8"?>
+<ds:datastoreItem xmlns:ds="http://schemas.openxmlformats.org/officeDocument/2006/customXml" ds:itemID="{D8EE4C6F-B1D4-4AC9-928F-40B58F8389AA}">
+  <ds:schemaRefs>
+    <ds:schemaRef ds:uri="http://schemas.microsoft.com/VisualStudio/2011/storyboarding/control"/>
+  </ds:schemaRefs>
+</ds:datastoreItem>
+</file>
+
+<file path=customXml/itemProps21.xml><?xml version="1.0" encoding="utf-8"?>
+<ds:datastoreItem xmlns:ds="http://schemas.openxmlformats.org/officeDocument/2006/customXml" ds:itemID="{34422DFF-D2BE-4305-8DA3-E0E99CFA01F4}">
+  <ds:schemaRefs>
+    <ds:schemaRef ds:uri="http://schemas.microsoft.com/VisualStudio/2011/storyboarding/control"/>
+  </ds:schemaRefs>
+</ds:datastoreItem>
+</file>
+
+<file path=customXml/itemProps22.xml><?xml version="1.0" encoding="utf-8"?>
+<ds:datastoreItem xmlns:ds="http://schemas.openxmlformats.org/officeDocument/2006/customXml" ds:itemID="{896AE23B-403F-4EEC-900F-6E95A60A4CC1}">
+  <ds:schemaRefs>
+    <ds:schemaRef ds:uri="http://schemas.microsoft.com/VisualStudio/2011/storyboarding/control"/>
+  </ds:schemaRefs>
+</ds:datastoreItem>
+</file>
+
+<file path=customXml/itemProps23.xml><?xml version="1.0" encoding="utf-8"?>
+<ds:datastoreItem xmlns:ds="http://schemas.openxmlformats.org/officeDocument/2006/customXml" ds:itemID="{61361C12-AEB1-4243-8694-E22DB7BB0B58}">
+  <ds:schemaRefs>
+    <ds:schemaRef ds:uri="http://schemas.microsoft.com/VisualStudio/2011/storyboarding/control"/>
+  </ds:schemaRefs>
+</ds:datastoreItem>
+</file>
+
+<file path=customXml/itemProps24.xml><?xml version="1.0" encoding="utf-8"?>
+<ds:datastoreItem xmlns:ds="http://schemas.openxmlformats.org/officeDocument/2006/customXml" ds:itemID="{66C429A6-A1FB-4A44-9868-139AEFE376E0}">
+  <ds:schemaRefs>
+    <ds:schemaRef ds:uri="http://schemas.microsoft.com/VisualStudio/2011/storyboarding/control"/>
+  </ds:schemaRefs>
+</ds:datastoreItem>
+</file>
+
+<file path=customXml/itemProps25.xml><?xml version="1.0" encoding="utf-8"?>
+<ds:datastoreItem xmlns:ds="http://schemas.openxmlformats.org/officeDocument/2006/customXml" ds:itemID="{11BD6915-90EA-4F41-8AE8-401B6A2355DB}">
+  <ds:schemaRefs>
+    <ds:schemaRef ds:uri="http://schemas.microsoft.com/VisualStudio/2011/storyboarding/control"/>
+  </ds:schemaRefs>
+</ds:datastoreItem>
+</file>
+
+<file path=customXml/itemProps26.xml><?xml version="1.0" encoding="utf-8"?>
+<ds:datastoreItem xmlns:ds="http://schemas.openxmlformats.org/officeDocument/2006/customXml" ds:itemID="{0DEE920A-6ADA-48DA-B23C-E869E21EA911}">
+  <ds:schemaRefs>
+    <ds:schemaRef ds:uri="http://schemas.microsoft.com/VisualStudio/2011/storyboarding/control"/>
+  </ds:schemaRefs>
+</ds:datastoreItem>
+</file>
+
+<file path=customXml/itemProps27.xml><?xml version="1.0" encoding="utf-8"?>
+<ds:datastoreItem xmlns:ds="http://schemas.openxmlformats.org/officeDocument/2006/customXml" ds:itemID="{BC2C5481-5539-4A2E-88CE-EE6972284F48}">
+  <ds:schemaRefs>
+    <ds:schemaRef ds:uri="http://schemas.microsoft.com/VisualStudio/2011/storyboarding/control"/>
+  </ds:schemaRefs>
+</ds:datastoreItem>
+</file>
+
+<file path=customXml/itemProps28.xml><?xml version="1.0" encoding="utf-8"?>
+<ds:datastoreItem xmlns:ds="http://schemas.openxmlformats.org/officeDocument/2006/customXml" ds:itemID="{5B8607FE-59BB-43C3-BBC9-D002A93B2860}">
+  <ds:schemaRefs>
+    <ds:schemaRef ds:uri="http://schemas.microsoft.com/VisualStudio/2011/storyboarding/control"/>
+  </ds:schemaRefs>
+</ds:datastoreItem>
+</file>
+
+<file path=customXml/itemProps29.xml><?xml version="1.0" encoding="utf-8"?>
+<ds:datastoreItem xmlns:ds="http://schemas.openxmlformats.org/officeDocument/2006/customXml" ds:itemID="{8B0AB7B0-1EE2-42BF-9C41-9C904E313494}">
+  <ds:schemaRefs>
+    <ds:schemaRef ds:uri="http://schemas.microsoft.com/VisualStudio/2011/storyboarding/control"/>
+  </ds:schemaRefs>
+</ds:datastoreItem>
+</file>
+
+<file path=customXml/itemProps3.xml><?xml version="1.0" encoding="utf-8"?>
+<ds:datastoreItem xmlns:ds="http://schemas.openxmlformats.org/officeDocument/2006/customXml" ds:itemID="{35E8E4AC-13BF-495B-B0AA-5F07A0EB9441}">
+  <ds:schemaRefs>
+    <ds:schemaRef ds:uri="http://schemas.microsoft.com/VisualStudio/2011/storyboarding/control"/>
+  </ds:schemaRefs>
+</ds:datastoreItem>
+</file>
+
+<file path=customXml/itemProps30.xml><?xml version="1.0" encoding="utf-8"?>
+<ds:datastoreItem xmlns:ds="http://schemas.openxmlformats.org/officeDocument/2006/customXml" ds:itemID="{6CC874DE-6D79-4EBA-A0F5-DB01923D7AE0}">
+  <ds:schemaRefs>
+    <ds:schemaRef ds:uri="http://schemas.microsoft.com/VisualStudio/2011/storyboarding/control"/>
+  </ds:schemaRefs>
+</ds:datastoreItem>
+</file>
+
+<file path=customXml/itemProps31.xml><?xml version="1.0" encoding="utf-8"?>
 <ds:datastoreItem xmlns:ds="http://schemas.openxmlformats.org/officeDocument/2006/customXml" ds:itemID="{541D200C-886D-4393-A468-D257F7CE4C2E}">
   <ds:schemaRefs>
     <ds:schemaRef ds:uri="http://schemas.microsoft.com/VisualStudio/2011/storyboarding/control"/>
@@ -13506,47 +13983,15 @@
 </ds:datastoreItem>
 </file>
 
-<file path=customXml/itemProps10.xml><?xml version="1.0" encoding="utf-8"?>
-<ds:datastoreItem xmlns:ds="http://schemas.openxmlformats.org/officeDocument/2006/customXml" ds:itemID="{1D5DC517-E715-4F56-B43C-13839AE337F0}">
+<file path=customXml/itemProps32.xml><?xml version="1.0" encoding="utf-8"?>
+<ds:datastoreItem xmlns:ds="http://schemas.openxmlformats.org/officeDocument/2006/customXml" ds:itemID="{F9BC2D1E-7C73-45D1-9E4F-E6345E51DF2D}">
   <ds:schemaRefs>
     <ds:schemaRef ds:uri="http://schemas.microsoft.com/VisualStudio/2011/storyboarding/control"/>
   </ds:schemaRefs>
 </ds:datastoreItem>
 </file>
 
-<file path=customXml/itemProps11.xml><?xml version="1.0" encoding="utf-8"?>
-<ds:datastoreItem xmlns:ds="http://schemas.openxmlformats.org/officeDocument/2006/customXml" ds:itemID="{69819B4B-C652-4029-9D6F-1F30F2207B1C}">
-  <ds:schemaRefs>
-    <ds:schemaRef ds:uri="http://schemas.microsoft.com/VisualStudio/2011/storyboarding/control"/>
-  </ds:schemaRefs>
-</ds:datastoreItem>
-</file>
-
-<file path=customXml/itemProps12.xml><?xml version="1.0" encoding="utf-8"?>
-<ds:datastoreItem xmlns:ds="http://schemas.openxmlformats.org/officeDocument/2006/customXml" ds:itemID="{182A85CA-4E58-49C8-8C48-758766C210A9}">
-  <ds:schemaRefs>
-    <ds:schemaRef ds:uri="http://schemas.microsoft.com/VisualStudio/2011/storyboarding/control"/>
-  </ds:schemaRefs>
-</ds:datastoreItem>
-</file>
-
-<file path=customXml/itemProps13.xml><?xml version="1.0" encoding="utf-8"?>
-<ds:datastoreItem xmlns:ds="http://schemas.openxmlformats.org/officeDocument/2006/customXml" ds:itemID="{F7BFCA9F-A0B1-4AC1-AD74-CE9E4213160F}">
-  <ds:schemaRefs>
-    <ds:schemaRef ds:uri="http://schemas.microsoft.com/VisualStudio/2011/storyboarding/control"/>
-  </ds:schemaRefs>
-</ds:datastoreItem>
-</file>
-
-<file path=customXml/itemProps14.xml><?xml version="1.0" encoding="utf-8"?>
-<ds:datastoreItem xmlns:ds="http://schemas.openxmlformats.org/officeDocument/2006/customXml" ds:itemID="{10C4D8A6-492F-4C3D-BAAD-8273F297A317}">
-  <ds:schemaRefs>
-    <ds:schemaRef ds:uri="http://schemas.microsoft.com/VisualStudio/2011/storyboarding/control"/>
-  </ds:schemaRefs>
-</ds:datastoreItem>
-</file>
-
-<file path=customXml/itemProps15.xml><?xml version="1.0" encoding="utf-8"?>
+<file path=customXml/itemProps33.xml><?xml version="1.0" encoding="utf-8"?>
 <ds:datastoreItem xmlns:ds="http://schemas.openxmlformats.org/officeDocument/2006/customXml" ds:itemID="{FF1022A0-DAA8-4910-B054-25E1EE26A5AC}">
   <ds:schemaRefs>
     <ds:schemaRef ds:uri="http://schemas.microsoft.com/VisualStudio/2011/storyboarding/control"/>
@@ -13554,71 +13999,7 @@
 </ds:datastoreItem>
 </file>
 
-<file path=customXml/itemProps16.xml><?xml version="1.0" encoding="utf-8"?>
-<ds:datastoreItem xmlns:ds="http://schemas.openxmlformats.org/officeDocument/2006/customXml" ds:itemID="{B24B058A-7394-4884-87AB-3D162B4AF263}">
-  <ds:schemaRefs>
-    <ds:schemaRef ds:uri="http://schemas.microsoft.com/VisualStudio/2011/storyboarding/control"/>
-  </ds:schemaRefs>
-</ds:datastoreItem>
-</file>
-
-<file path=customXml/itemProps17.xml><?xml version="1.0" encoding="utf-8"?>
-<ds:datastoreItem xmlns:ds="http://schemas.openxmlformats.org/officeDocument/2006/customXml" ds:itemID="{D8EE4C6F-B1D4-4AC9-928F-40B58F8389AA}">
-  <ds:schemaRefs>
-    <ds:schemaRef ds:uri="http://schemas.microsoft.com/VisualStudio/2011/storyboarding/control"/>
-  </ds:schemaRefs>
-</ds:datastoreItem>
-</file>
-
-<file path=customXml/itemProps18.xml><?xml version="1.0" encoding="utf-8"?>
-<ds:datastoreItem xmlns:ds="http://schemas.openxmlformats.org/officeDocument/2006/customXml" ds:itemID="{96BD8081-566A-4B7A-9794-537613F8A560}">
-  <ds:schemaRefs>
-    <ds:schemaRef ds:uri="http://schemas.microsoft.com/VisualStudio/2011/storyboarding/control"/>
-  </ds:schemaRefs>
-</ds:datastoreItem>
-</file>
-
-<file path=customXml/itemProps19.xml><?xml version="1.0" encoding="utf-8"?>
-<ds:datastoreItem xmlns:ds="http://schemas.openxmlformats.org/officeDocument/2006/customXml" ds:itemID="{AEE75C41-50A0-4E2E-8E71-75152E4221D1}">
-  <ds:schemaRefs>
-    <ds:schemaRef ds:uri="http://schemas.microsoft.com/VisualStudio/2011/storyboarding/control"/>
-  </ds:schemaRefs>
-</ds:datastoreItem>
-</file>
-
-<file path=customXml/itemProps2.xml><?xml version="1.0" encoding="utf-8"?>
-<ds:datastoreItem xmlns:ds="http://schemas.openxmlformats.org/officeDocument/2006/customXml" ds:itemID="{2D4E3CDC-752C-421E-817A-A9D2344595DE}">
-  <ds:schemaRefs>
-    <ds:schemaRef ds:uri="http://schemas.microsoft.com/VisualStudio/2011/storyboarding/control"/>
-  </ds:schemaRefs>
-</ds:datastoreItem>
-</file>
-
-<file path=customXml/itemProps20.xml><?xml version="1.0" encoding="utf-8"?>
-<ds:datastoreItem xmlns:ds="http://schemas.openxmlformats.org/officeDocument/2006/customXml" ds:itemID="{BC2C5481-5539-4A2E-88CE-EE6972284F48}">
-  <ds:schemaRefs>
-    <ds:schemaRef ds:uri="http://schemas.microsoft.com/VisualStudio/2011/storyboarding/control"/>
-  </ds:schemaRefs>
-</ds:datastoreItem>
-</file>
-
-<file path=customXml/itemProps21.xml><?xml version="1.0" encoding="utf-8"?>
-<ds:datastoreItem xmlns:ds="http://schemas.openxmlformats.org/officeDocument/2006/customXml" ds:itemID="{E3E34527-CBA0-4787-B0F7-C2B934B5B4C4}">
-  <ds:schemaRefs>
-    <ds:schemaRef ds:uri="http://schemas.microsoft.com/VisualStudio/2011/storyboarding/control"/>
-  </ds:schemaRefs>
-</ds:datastoreItem>
-</file>
-
-<file path=customXml/itemProps22.xml><?xml version="1.0" encoding="utf-8"?>
-<ds:datastoreItem xmlns:ds="http://schemas.openxmlformats.org/officeDocument/2006/customXml" ds:itemID="{6E845879-650B-4022-A35E-856E74320ACC}">
-  <ds:schemaRefs>
-    <ds:schemaRef ds:uri="http://schemas.microsoft.com/VisualStudio/2011/storyboarding/control"/>
-  </ds:schemaRefs>
-</ds:datastoreItem>
-</file>
-
-<file path=customXml/itemProps23.xml><?xml version="1.0" encoding="utf-8"?>
+<file path=customXml/itemProps34.xml><?xml version="1.0" encoding="utf-8"?>
 <ds:datastoreItem xmlns:ds="http://schemas.openxmlformats.org/officeDocument/2006/customXml" ds:itemID="{FB9740A1-8F0C-4AA2-A2C9-15A377DC91A6}">
   <ds:schemaRefs>
     <ds:schemaRef ds:uri="http://schemas.microsoft.com/VisualStudio/2011/storyboarding/control"/>
@@ -13626,104 +14007,8 @@
 </ds:datastoreItem>
 </file>
 
-<file path=customXml/itemProps24.xml><?xml version="1.0" encoding="utf-8"?>
-<ds:datastoreItem xmlns:ds="http://schemas.openxmlformats.org/officeDocument/2006/customXml" ds:itemID="{7C81862B-608B-4E4F-9DB1-7DBCFE9F2139}">
-  <ds:schemaRefs>
-    <ds:schemaRef ds:uri="http://schemas.microsoft.com/VisualStudio/2011/storyboarding/control"/>
-  </ds:schemaRefs>
-</ds:datastoreItem>
-</file>
-
-<file path=customXml/itemProps25.xml><?xml version="1.0" encoding="utf-8"?>
-<ds:datastoreItem xmlns:ds="http://schemas.openxmlformats.org/officeDocument/2006/customXml" ds:itemID="{34422DFF-D2BE-4305-8DA3-E0E99CFA01F4}">
-  <ds:schemaRefs>
-    <ds:schemaRef ds:uri="http://schemas.microsoft.com/VisualStudio/2011/storyboarding/control"/>
-  </ds:schemaRefs>
-</ds:datastoreItem>
-</file>
-
-<file path=customXml/itemProps26.xml><?xml version="1.0" encoding="utf-8"?>
-<ds:datastoreItem xmlns:ds="http://schemas.openxmlformats.org/officeDocument/2006/customXml" ds:itemID="{A822EFA2-5211-415D-91B1-1D2F11D7CBDF}">
-  <ds:schemaRefs>
-    <ds:schemaRef ds:uri="http://schemas.microsoft.com/VisualStudio/2011/storyboarding/control"/>
-  </ds:schemaRefs>
-</ds:datastoreItem>
-</file>
-
-<file path=customXml/itemProps27.xml><?xml version="1.0" encoding="utf-8"?>
-<ds:datastoreItem xmlns:ds="http://schemas.openxmlformats.org/officeDocument/2006/customXml" ds:itemID="{ECEE1C58-60D6-4BE6-B599-4F7E9AB9E035}">
-  <ds:schemaRefs>
-    <ds:schemaRef ds:uri="http://schemas.microsoft.com/VisualStudio/2011/storyboarding/control"/>
-  </ds:schemaRefs>
-</ds:datastoreItem>
-</file>
-
-<file path=customXml/itemProps28.xml><?xml version="1.0" encoding="utf-8"?>
+<file path=customXml/itemProps35.xml><?xml version="1.0" encoding="utf-8"?>
 <ds:datastoreItem xmlns:ds="http://schemas.openxmlformats.org/officeDocument/2006/customXml" ds:itemID="{A76A203E-9FD7-42C2-8FEF-B018DFF7E4D1}">
-  <ds:schemaRefs>
-    <ds:schemaRef ds:uri="http://schemas.microsoft.com/VisualStudio/2011/storyboarding/control"/>
-  </ds:schemaRefs>
-</ds:datastoreItem>
-</file>
-
-<file path=customXml/itemProps29.xml><?xml version="1.0" encoding="utf-8"?>
-<ds:datastoreItem xmlns:ds="http://schemas.openxmlformats.org/officeDocument/2006/customXml" ds:itemID="{FDB8CFE8-3808-4247-A2FD-35E246A153DC}">
-  <ds:schemaRefs>
-    <ds:schemaRef ds:uri="http://schemas.microsoft.com/VisualStudio/2011/storyboarding/control"/>
-  </ds:schemaRefs>
-</ds:datastoreItem>
-</file>
-
-<file path=customXml/itemProps3.xml><?xml version="1.0" encoding="utf-8"?>
-<ds:datastoreItem xmlns:ds="http://schemas.openxmlformats.org/officeDocument/2006/customXml" ds:itemID="{0CAA02FD-32C9-42E8-98BE-0EAAD29173F4}">
-  <ds:schemaRefs>
-    <ds:schemaRef ds:uri="http://schemas.microsoft.com/VisualStudio/2011/storyboarding/control"/>
-  </ds:schemaRefs>
-</ds:datastoreItem>
-</file>
-
-<file path=customXml/itemProps30.xml><?xml version="1.0" encoding="utf-8"?>
-<ds:datastoreItem xmlns:ds="http://schemas.openxmlformats.org/officeDocument/2006/customXml" ds:itemID="{80A2EE3F-8E5E-4E02-8371-075F75881CC2}">
-  <ds:schemaRefs>
-    <ds:schemaRef ds:uri="http://schemas.microsoft.com/VisualStudio/2011/storyboarding/control"/>
-  </ds:schemaRefs>
-</ds:datastoreItem>
-</file>
-
-<file path=customXml/itemProps31.xml><?xml version="1.0" encoding="utf-8"?>
-<ds:datastoreItem xmlns:ds="http://schemas.openxmlformats.org/officeDocument/2006/customXml" ds:itemID="{43B5ED86-0060-4D69-806F-5CA89175AE14}">
-  <ds:schemaRefs>
-    <ds:schemaRef ds:uri="http://schemas.microsoft.com/VisualStudio/2011/storyboarding/control"/>
-  </ds:schemaRefs>
-</ds:datastoreItem>
-</file>
-
-<file path=customXml/itemProps32.xml><?xml version="1.0" encoding="utf-8"?>
-<ds:datastoreItem xmlns:ds="http://schemas.openxmlformats.org/officeDocument/2006/customXml" ds:itemID="{CC557381-0DF9-4AE0-A746-74A48780A5BE}">
-  <ds:schemaRefs>
-    <ds:schemaRef ds:uri="http://schemas.microsoft.com/VisualStudio/2011/storyboarding/control"/>
-  </ds:schemaRefs>
-</ds:datastoreItem>
-</file>
-
-<file path=customXml/itemProps33.xml><?xml version="1.0" encoding="utf-8"?>
-<ds:datastoreItem xmlns:ds="http://schemas.openxmlformats.org/officeDocument/2006/customXml" ds:itemID="{896AE23B-403F-4EEC-900F-6E95A60A4CC1}">
-  <ds:schemaRefs>
-    <ds:schemaRef ds:uri="http://schemas.microsoft.com/VisualStudio/2011/storyboarding/control"/>
-  </ds:schemaRefs>
-</ds:datastoreItem>
-</file>
-
-<file path=customXml/itemProps34.xml><?xml version="1.0" encoding="utf-8"?>
-<ds:datastoreItem xmlns:ds="http://schemas.openxmlformats.org/officeDocument/2006/customXml" ds:itemID="{2693F098-32A1-41BE-97F8-CEDAE063F99E}">
-  <ds:schemaRefs>
-    <ds:schemaRef ds:uri="http://schemas.microsoft.com/VisualStudio/2011/storyboarding/control"/>
-  </ds:schemaRefs>
-</ds:datastoreItem>
-</file>
-
-<file path=customXml/itemProps35.xml><?xml version="1.0" encoding="utf-8"?>
-<ds:datastoreItem xmlns:ds="http://schemas.openxmlformats.org/officeDocument/2006/customXml" ds:itemID="{F50EEE5E-70AE-4092-8CFF-7CEEF7A1A3DA}">
   <ds:schemaRefs>
     <ds:schemaRef ds:uri="http://schemas.microsoft.com/VisualStudio/2011/storyboarding/control"/>
   </ds:schemaRefs>
@@ -13739,7 +14024,7 @@
 </file>
 
 <file path=customXml/itemProps37.xml><?xml version="1.0" encoding="utf-8"?>
-<ds:datastoreItem xmlns:ds="http://schemas.openxmlformats.org/officeDocument/2006/customXml" ds:itemID="{04504D90-2CEB-4E3A-A555-86C532BE774F}">
+<ds:datastoreItem xmlns:ds="http://schemas.openxmlformats.org/officeDocument/2006/customXml" ds:itemID="{EFA40575-6F4E-445E-9D80-B0CC775DC0E1}">
   <ds:schemaRefs>
     <ds:schemaRef ds:uri="http://schemas.microsoft.com/VisualStudio/2011/storyboarding/control"/>
   </ds:schemaRefs>
@@ -13747,7 +14032,7 @@
 </file>
 
 <file path=customXml/itemProps38.xml><?xml version="1.0" encoding="utf-8"?>
-<ds:datastoreItem xmlns:ds="http://schemas.openxmlformats.org/officeDocument/2006/customXml" ds:itemID="{61361C12-AEB1-4243-8694-E22DB7BB0B58}">
+<ds:datastoreItem xmlns:ds="http://schemas.openxmlformats.org/officeDocument/2006/customXml" ds:itemID="{CB538EC4-2D5D-4BC6-AFD7-AF4FD42C21A7}">
   <ds:schemaRefs>
     <ds:schemaRef ds:uri="http://schemas.microsoft.com/VisualStudio/2011/storyboarding/control"/>
   </ds:schemaRefs>
@@ -13755,7 +14040,7 @@
 </file>
 
 <file path=customXml/itemProps39.xml><?xml version="1.0" encoding="utf-8"?>
-<ds:datastoreItem xmlns:ds="http://schemas.openxmlformats.org/officeDocument/2006/customXml" ds:itemID="{4B90C7DA-FFAF-434B-A961-A1A1B575F753}">
+<ds:datastoreItem xmlns:ds="http://schemas.openxmlformats.org/officeDocument/2006/customXml" ds:itemID="{1D5DC517-E715-4F56-B43C-13839AE337F0}">
   <ds:schemaRefs>
     <ds:schemaRef ds:uri="http://schemas.microsoft.com/VisualStudio/2011/storyboarding/control"/>
   </ds:schemaRefs>
@@ -13763,6 +14048,54 @@
 </file>
 
 <file path=customXml/itemProps4.xml><?xml version="1.0" encoding="utf-8"?>
+<ds:datastoreItem xmlns:ds="http://schemas.openxmlformats.org/officeDocument/2006/customXml" ds:itemID="{F8E474D2-D249-494A-827C-6C0C85F35C5A}">
+  <ds:schemaRefs>
+    <ds:schemaRef ds:uri="http://schemas.microsoft.com/VisualStudio/2011/storyboarding/control"/>
+  </ds:schemaRefs>
+</ds:datastoreItem>
+</file>
+
+<file path=customXml/itemProps40.xml><?xml version="1.0" encoding="utf-8"?>
+<ds:datastoreItem xmlns:ds="http://schemas.openxmlformats.org/officeDocument/2006/customXml" ds:itemID="{43B5ED86-0060-4D69-806F-5CA89175AE14}">
+  <ds:schemaRefs>
+    <ds:schemaRef ds:uri="http://schemas.microsoft.com/VisualStudio/2011/storyboarding/control"/>
+  </ds:schemaRefs>
+</ds:datastoreItem>
+</file>
+
+<file path=customXml/itemProps41.xml><?xml version="1.0" encoding="utf-8"?>
+<ds:datastoreItem xmlns:ds="http://schemas.openxmlformats.org/officeDocument/2006/customXml" ds:itemID="{09AAF7D3-4D9D-47F0-9621-CB53A66318C0}">
+  <ds:schemaRefs>
+    <ds:schemaRef ds:uri="http://schemas.microsoft.com/VisualStudio/2011/storyboarding/control"/>
+  </ds:schemaRefs>
+</ds:datastoreItem>
+</file>
+
+<file path=customXml/itemProps42.xml><?xml version="1.0" encoding="utf-8"?>
+<ds:datastoreItem xmlns:ds="http://schemas.openxmlformats.org/officeDocument/2006/customXml" ds:itemID="{7D8A3F15-58CA-4DA9-A6C9-5E4399E681CE}">
+  <ds:schemaRefs>
+    <ds:schemaRef ds:uri="http://schemas.microsoft.com/VisualStudio/2011/storyboarding/control"/>
+  </ds:schemaRefs>
+</ds:datastoreItem>
+</file>
+
+<file path=customXml/itemProps43.xml><?xml version="1.0" encoding="utf-8"?>
+<ds:datastoreItem xmlns:ds="http://schemas.openxmlformats.org/officeDocument/2006/customXml" ds:itemID="{99E258B9-636D-4FC3-A18B-5731CC1F850C}">
+  <ds:schemaRefs>
+    <ds:schemaRef ds:uri="http://schemas.microsoft.com/VisualStudio/2011/storyboarding/control"/>
+  </ds:schemaRefs>
+</ds:datastoreItem>
+</file>
+
+<file path=customXml/itemProps44.xml><?xml version="1.0" encoding="utf-8"?>
+<ds:datastoreItem xmlns:ds="http://schemas.openxmlformats.org/officeDocument/2006/customXml" ds:itemID="{8C16C620-F89C-496A-ABC2-EBAA770A5D2B}">
+  <ds:schemaRefs>
+    <ds:schemaRef ds:uri="http://schemas.microsoft.com/VisualStudio/2011/storyboarding/control"/>
+  </ds:schemaRefs>
+</ds:datastoreItem>
+</file>
+
+<file path=customXml/itemProps45.xml><?xml version="1.0" encoding="utf-8"?>
 <ds:datastoreItem xmlns:ds="http://schemas.openxmlformats.org/officeDocument/2006/customXml" ds:itemID="{4F1F443E-6774-443F-BAD5-FCCC4103B164}">
   <ds:schemaRefs>
     <ds:schemaRef ds:uri="http://schemas.microsoft.com/VisualStudio/2011/storyboarding/control"/>
@@ -13770,80 +14103,32 @@
 </ds:datastoreItem>
 </file>
 
-<file path=customXml/itemProps40.xml><?xml version="1.0" encoding="utf-8"?>
-<ds:datastoreItem xmlns:ds="http://schemas.openxmlformats.org/officeDocument/2006/customXml" ds:itemID="{290B1F0A-87D8-47BA-9898-8D500A95812B}">
+<file path=customXml/itemProps46.xml><?xml version="1.0" encoding="utf-8"?>
+<ds:datastoreItem xmlns:ds="http://schemas.openxmlformats.org/officeDocument/2006/customXml" ds:itemID="{DE740E6A-43E5-497F-8F78-B904C61CB614}">
   <ds:schemaRefs>
     <ds:schemaRef ds:uri="http://schemas.microsoft.com/VisualStudio/2011/storyboarding/control"/>
   </ds:schemaRefs>
 </ds:datastoreItem>
 </file>
 
-<file path=customXml/itemProps41.xml><?xml version="1.0" encoding="utf-8"?>
-<ds:datastoreItem xmlns:ds="http://schemas.openxmlformats.org/officeDocument/2006/customXml" ds:itemID="{5B8607FE-59BB-43C3-BBC9-D002A93B2860}">
+<file path=customXml/itemProps47.xml><?xml version="1.0" encoding="utf-8"?>
+<ds:datastoreItem xmlns:ds="http://schemas.openxmlformats.org/officeDocument/2006/customXml" ds:itemID="{F7BFCA9F-A0B1-4AC1-AD74-CE9E4213160F}">
   <ds:schemaRefs>
     <ds:schemaRef ds:uri="http://schemas.microsoft.com/VisualStudio/2011/storyboarding/control"/>
   </ds:schemaRefs>
 </ds:datastoreItem>
 </file>
 
-<file path=customXml/itemProps42.xml><?xml version="1.0" encoding="utf-8"?>
-<ds:datastoreItem xmlns:ds="http://schemas.openxmlformats.org/officeDocument/2006/customXml" ds:itemID="{0F4FBE72-4778-4A80-9A59-1EAA7879E88B}">
+<file path=customXml/itemProps48.xml><?xml version="1.0" encoding="utf-8"?>
+<ds:datastoreItem xmlns:ds="http://schemas.openxmlformats.org/officeDocument/2006/customXml" ds:itemID="{96BD8081-566A-4B7A-9794-537613F8A560}">
   <ds:schemaRefs>
     <ds:schemaRef ds:uri="http://schemas.microsoft.com/VisualStudio/2011/storyboarding/control"/>
   </ds:schemaRefs>
 </ds:datastoreItem>
 </file>
 
-<file path=customXml/itemProps43.xml><?xml version="1.0" encoding="utf-8"?>
-<ds:datastoreItem xmlns:ds="http://schemas.openxmlformats.org/officeDocument/2006/customXml" ds:itemID="{91ED1748-2ACC-4580-9DD0-53AE211F1DA7}">
-  <ds:schemaRefs>
-    <ds:schemaRef ds:uri="http://schemas.microsoft.com/VisualStudio/2011/storyboarding/control"/>
-  </ds:schemaRefs>
-</ds:datastoreItem>
-</file>
-
-<file path=customXml/itemProps44.xml><?xml version="1.0" encoding="utf-8"?>
-<ds:datastoreItem xmlns:ds="http://schemas.openxmlformats.org/officeDocument/2006/customXml" ds:itemID="{09AAF7D3-4D9D-47F0-9621-CB53A66318C0}">
-  <ds:schemaRefs>
-    <ds:schemaRef ds:uri="http://schemas.microsoft.com/VisualStudio/2011/storyboarding/control"/>
-  </ds:schemaRefs>
-</ds:datastoreItem>
-</file>
-
-<file path=customXml/itemProps45.xml><?xml version="1.0" encoding="utf-8"?>
-<ds:datastoreItem xmlns:ds="http://schemas.openxmlformats.org/officeDocument/2006/customXml" ds:itemID="{540C3353-3E36-4F77-9C4A-0DB4A5D7CCD1}">
-  <ds:schemaRefs>
-    <ds:schemaRef ds:uri="http://schemas.microsoft.com/VisualStudio/2011/storyboarding/control"/>
-  </ds:schemaRefs>
-</ds:datastoreItem>
-</file>
-
-<file path=customXml/itemProps46.xml><?xml version="1.0" encoding="utf-8"?>
-<ds:datastoreItem xmlns:ds="http://schemas.openxmlformats.org/officeDocument/2006/customXml" ds:itemID="{66C429A6-A1FB-4A44-9868-139AEFE376E0}">
-  <ds:schemaRefs>
-    <ds:schemaRef ds:uri="http://schemas.microsoft.com/VisualStudio/2011/storyboarding/control"/>
-  </ds:schemaRefs>
-</ds:datastoreItem>
-</file>
-
-<file path=customXml/itemProps47.xml><?xml version="1.0" encoding="utf-8"?>
-<ds:datastoreItem xmlns:ds="http://schemas.openxmlformats.org/officeDocument/2006/customXml" ds:itemID="{6BD8AD1D-48A9-4F6D-9433-F36CBEB3125F}">
-  <ds:schemaRefs>
-    <ds:schemaRef ds:uri="http://schemas.microsoft.com/VisualStudio/2011/storyboarding/control"/>
-  </ds:schemaRefs>
-</ds:datastoreItem>
-</file>
-
-<file path=customXml/itemProps48.xml><?xml version="1.0" encoding="utf-8"?>
-<ds:datastoreItem xmlns:ds="http://schemas.openxmlformats.org/officeDocument/2006/customXml" ds:itemID="{5D95BE6E-D5AB-409A-85E4-CE7D6FA00509}">
-  <ds:schemaRefs>
-    <ds:schemaRef ds:uri="http://schemas.microsoft.com/VisualStudio/2011/storyboarding/control"/>
-  </ds:schemaRefs>
-</ds:datastoreItem>
-</file>
-
 <file path=customXml/itemProps49.xml><?xml version="1.0" encoding="utf-8"?>
-<ds:datastoreItem xmlns:ds="http://schemas.openxmlformats.org/officeDocument/2006/customXml" ds:itemID="{EFA40575-6F4E-445E-9D80-B0CC775DC0E1}">
+<ds:datastoreItem xmlns:ds="http://schemas.openxmlformats.org/officeDocument/2006/customXml" ds:itemID="{4B90C7DA-FFAF-434B-A961-A1A1B575F753}">
   <ds:schemaRefs>
     <ds:schemaRef ds:uri="http://schemas.microsoft.com/VisualStudio/2011/storyboarding/control"/>
   </ds:schemaRefs>
@@ -13859,6 +14144,14 @@
 </file>
 
 <file path=customXml/itemProps50.xml><?xml version="1.0" encoding="utf-8"?>
+<ds:datastoreItem xmlns:ds="http://schemas.openxmlformats.org/officeDocument/2006/customXml" ds:itemID="{2693F098-32A1-41BE-97F8-CEDAE063F99E}">
+  <ds:schemaRefs>
+    <ds:schemaRef ds:uri="http://schemas.microsoft.com/VisualStudio/2011/storyboarding/control"/>
+  </ds:schemaRefs>
+</ds:datastoreItem>
+</file>
+
+<file path=customXml/itemProps51.xml><?xml version="1.0" encoding="utf-8"?>
 <ds:datastoreItem xmlns:ds="http://schemas.openxmlformats.org/officeDocument/2006/customXml" ds:itemID="{2C816A0A-85BC-4830-BAEE-1F53C8E67489}">
   <ds:schemaRefs>
     <ds:schemaRef ds:uri="http://schemas.microsoft.com/VisualStudio/2011/storyboarding/control"/>
@@ -13866,39 +14159,7 @@
 </ds:datastoreItem>
 </file>
 
-<file path=customXml/itemProps51.xml><?xml version="1.0" encoding="utf-8"?>
-<ds:datastoreItem xmlns:ds="http://schemas.openxmlformats.org/officeDocument/2006/customXml" ds:itemID="{8B4AE673-39D1-4921-A713-E0BD45B32E43}">
-  <ds:schemaRefs>
-    <ds:schemaRef ds:uri="http://schemas.microsoft.com/VisualStudio/2011/storyboarding/control"/>
-  </ds:schemaRefs>
-</ds:datastoreItem>
-</file>
-
 <file path=customXml/itemProps52.xml><?xml version="1.0" encoding="utf-8"?>
-<ds:datastoreItem xmlns:ds="http://schemas.openxmlformats.org/officeDocument/2006/customXml" ds:itemID="{7D8A3F15-58CA-4DA9-A6C9-5E4399E681CE}">
-  <ds:schemaRefs>
-    <ds:schemaRef ds:uri="http://schemas.microsoft.com/VisualStudio/2011/storyboarding/control"/>
-  </ds:schemaRefs>
-</ds:datastoreItem>
-</file>
-
-<file path=customXml/itemProps53.xml><?xml version="1.0" encoding="utf-8"?>
-<ds:datastoreItem xmlns:ds="http://schemas.openxmlformats.org/officeDocument/2006/customXml" ds:itemID="{35E8E4AC-13BF-495B-B0AA-5F07A0EB9441}">
-  <ds:schemaRefs>
-    <ds:schemaRef ds:uri="http://schemas.microsoft.com/VisualStudio/2011/storyboarding/control"/>
-  </ds:schemaRefs>
-</ds:datastoreItem>
-</file>
-
-<file path=customXml/itemProps54.xml><?xml version="1.0" encoding="utf-8"?>
-<ds:datastoreItem xmlns:ds="http://schemas.openxmlformats.org/officeDocument/2006/customXml" ds:itemID="{8B0AB7B0-1EE2-42BF-9C41-9C904E313494}">
-  <ds:schemaRefs>
-    <ds:schemaRef ds:uri="http://schemas.microsoft.com/VisualStudio/2011/storyboarding/control"/>
-  </ds:schemaRefs>
-</ds:datastoreItem>
-</file>
-
-<file path=customXml/itemProps55.xml><?xml version="1.0" encoding="utf-8"?>
 <ds:datastoreItem xmlns:ds="http://schemas.openxmlformats.org/officeDocument/2006/customXml" ds:itemID="{8A7670A8-5D8A-499C-9FEE-E0BBB4E6BEFF}">
   <ds:schemaRefs>
     <ds:schemaRef ds:uri="http://schemas.microsoft.com/VisualStudio/2011/storyboarding/control"/>
@@ -13906,55 +14167,71 @@
 </ds:datastoreItem>
 </file>
 
-<file path=customXml/itemProps56.xml><?xml version="1.0" encoding="utf-8"?>
-<ds:datastoreItem xmlns:ds="http://schemas.openxmlformats.org/officeDocument/2006/customXml" ds:itemID="{B0DD2967-9B1E-4AF4-9E22-1FB363BF21A1}">
+<file path=customXml/itemProps53.xml><?xml version="1.0" encoding="utf-8"?>
+<ds:datastoreItem xmlns:ds="http://schemas.openxmlformats.org/officeDocument/2006/customXml" ds:itemID="{EC8AFA28-5388-46A0-B0AF-CDC06E1AFD31}">
   <ds:schemaRefs>
     <ds:schemaRef ds:uri="http://schemas.microsoft.com/VisualStudio/2011/storyboarding/control"/>
   </ds:schemaRefs>
 </ds:datastoreItem>
 </file>
 
-<file path=customXml/itemProps57.xml><?xml version="1.0" encoding="utf-8"?>
-<ds:datastoreItem xmlns:ds="http://schemas.openxmlformats.org/officeDocument/2006/customXml" ds:itemID="{CB538EC4-2D5D-4BC6-AFD7-AF4FD42C21A7}">
+<file path=customXml/itemProps54.xml><?xml version="1.0" encoding="utf-8"?>
+<ds:datastoreItem xmlns:ds="http://schemas.openxmlformats.org/officeDocument/2006/customXml" ds:itemID="{2D4E3CDC-752C-421E-817A-A9D2344595DE}">
   <ds:schemaRefs>
     <ds:schemaRef ds:uri="http://schemas.microsoft.com/VisualStudio/2011/storyboarding/control"/>
   </ds:schemaRefs>
 </ds:datastoreItem>
 </file>
 
-<file path=customXml/itemProps58.xml><?xml version="1.0" encoding="utf-8"?>
-<ds:datastoreItem xmlns:ds="http://schemas.openxmlformats.org/officeDocument/2006/customXml" ds:itemID="{F8E474D2-D249-494A-827C-6C0C85F35C5A}">
+<file path=customXml/itemProps55.xml><?xml version="1.0" encoding="utf-8"?>
+<ds:datastoreItem xmlns:ds="http://schemas.openxmlformats.org/officeDocument/2006/customXml" ds:itemID="{FDB8CFE8-3808-4247-A2FD-35E246A153DC}">
   <ds:schemaRefs>
     <ds:schemaRef ds:uri="http://schemas.microsoft.com/VisualStudio/2011/storyboarding/control"/>
   </ds:schemaRefs>
 </ds:datastoreItem>
 </file>
 
-<file path=customXml/itemProps59.xml><?xml version="1.0" encoding="utf-8"?>
-<ds:datastoreItem xmlns:ds="http://schemas.openxmlformats.org/officeDocument/2006/customXml" ds:itemID="{11BD6915-90EA-4F41-8AE8-401B6A2355DB}">
+<file path=customXml/itemProps56.xml><?xml version="1.0" encoding="utf-8"?>
+<ds:datastoreItem xmlns:ds="http://schemas.openxmlformats.org/officeDocument/2006/customXml" ds:itemID="{7C81862B-608B-4E4F-9DB1-7DBCFE9F2139}">
   <ds:schemaRefs>
     <ds:schemaRef ds:uri="http://schemas.microsoft.com/VisualStudio/2011/storyboarding/control"/>
   </ds:schemaRefs>
 </ds:datastoreItem>
 </file>
 
-<file path=customXml/itemProps6.xml><?xml version="1.0" encoding="utf-8"?>
-<ds:datastoreItem xmlns:ds="http://schemas.openxmlformats.org/officeDocument/2006/customXml" ds:itemID="{F9BC2D1E-7C73-45D1-9E4F-E6345E51DF2D}">
+<file path=customXml/itemProps57.xml><?xml version="1.0" encoding="utf-8"?>
+<ds:datastoreItem xmlns:ds="http://schemas.openxmlformats.org/officeDocument/2006/customXml" ds:itemID="{290B1F0A-87D8-47BA-9898-8D500A95812B}">
   <ds:schemaRefs>
     <ds:schemaRef ds:uri="http://schemas.microsoft.com/VisualStudio/2011/storyboarding/control"/>
   </ds:schemaRefs>
 </ds:datastoreItem>
 </file>
 
-<file path=customXml/itemProps60.xml><?xml version="1.0" encoding="utf-8"?>
-<ds:datastoreItem xmlns:ds="http://schemas.openxmlformats.org/officeDocument/2006/customXml" ds:itemID="{99E258B9-636D-4FC3-A18B-5731CC1F850C}">
+<file path=customXml/itemProps58.xml><?xml version="1.0" encoding="utf-8"?>
+<ds:datastoreItem xmlns:ds="http://schemas.openxmlformats.org/officeDocument/2006/customXml" ds:itemID="{540C3353-3E36-4F77-9C4A-0DB4A5D7CCD1}">
   <ds:schemaRefs>
     <ds:schemaRef ds:uri="http://schemas.microsoft.com/VisualStudio/2011/storyboarding/control"/>
   </ds:schemaRefs>
 </ds:datastoreItem>
 </file>
 
-<file path=customXml/itemProps61.xml><?xml version="1.0" encoding="utf-8"?>
+<file path=customXml/itemProps59.xml><?xml version="1.0" encoding="utf-8"?>
+<ds:datastoreItem xmlns:ds="http://schemas.openxmlformats.org/officeDocument/2006/customXml" ds:itemID="{2DB54B02-095B-4767-A849-7F09D55BDBEC}">
+  <ds:schemaRefs>
+    <ds:schemaRef ds:uri="http://schemas.microsoft.com/VisualStudio/2011/storyboarding/control"/>
+  </ds:schemaRefs>
+</ds:datastoreItem>
+</file>
+
+<file path=customXml/itemProps6.xml><?xml version="1.0" encoding="utf-8"?>
+<ds:datastoreItem xmlns:ds="http://schemas.openxmlformats.org/officeDocument/2006/customXml" ds:itemID="{AEE75C41-50A0-4E2E-8E71-75152E4221D1}">
+  <ds:schemaRefs>
+    <ds:schemaRef ds:uri="http://schemas.microsoft.com/VisualStudio/2011/storyboarding/control"/>
+  </ds:schemaRefs>
+</ds:datastoreItem>
+</file>
+
+<file path=customXml/itemProps60.xml><?xml version="1.0" encoding="utf-8"?>
 <ds:datastoreItem xmlns:ds="http://schemas.openxmlformats.org/officeDocument/2006/customXml" ds:itemID="{27542DCB-8EFC-47CA-8570-0C93F332B27B}">
   <ds:schemaRefs>
     <ds:schemaRef ds:uri="http://schemas.microsoft.com/VisualStudio/2011/storyboarding/control"/>
@@ -13962,15 +14239,39 @@
 </ds:datastoreItem>
 </file>
 
-<file path=customXml/itemProps62.xml><?xml version="1.0" encoding="utf-8"?>
-<ds:datastoreItem xmlns:ds="http://schemas.openxmlformats.org/officeDocument/2006/customXml" ds:itemID="{6CC874DE-6D79-4EBA-A0F5-DB01923D7AE0}">
+<file path=customXml/itemProps61.xml><?xml version="1.0" encoding="utf-8"?>
+<ds:datastoreItem xmlns:ds="http://schemas.openxmlformats.org/officeDocument/2006/customXml" ds:itemID="{A822EFA2-5211-415D-91B1-1D2F11D7CBDF}">
   <ds:schemaRefs>
     <ds:schemaRef ds:uri="http://schemas.microsoft.com/VisualStudio/2011/storyboarding/control"/>
   </ds:schemaRefs>
 </ds:datastoreItem>
 </file>
 
+<file path=customXml/itemProps62.xml><?xml version="1.0" encoding="utf-8"?>
+<ds:datastoreItem xmlns:ds="http://schemas.openxmlformats.org/officeDocument/2006/customXml" ds:itemID="{E3E34527-CBA0-4787-B0F7-C2B934B5B4C4}">
+  <ds:schemaRefs>
+    <ds:schemaRef ds:uri="http://schemas.microsoft.com/VisualStudio/2011/storyboarding/control"/>
+  </ds:schemaRefs>
+</ds:datastoreItem>
+</file>
+
 <file path=customXml/itemProps63.xml><?xml version="1.0" encoding="utf-8"?>
+<ds:datastoreItem xmlns:ds="http://schemas.openxmlformats.org/officeDocument/2006/customXml" ds:itemID="{0F4FBE72-4778-4A80-9A59-1EAA7879E88B}">
+  <ds:schemaRefs>
+    <ds:schemaRef ds:uri="http://schemas.microsoft.com/VisualStudio/2011/storyboarding/control"/>
+  </ds:schemaRefs>
+</ds:datastoreItem>
+</file>
+
+<file path=customXml/itemProps64.xml><?xml version="1.0" encoding="utf-8"?>
+<ds:datastoreItem xmlns:ds="http://schemas.openxmlformats.org/officeDocument/2006/customXml" ds:itemID="{6BD8AD1D-48A9-4F6D-9433-F36CBEB3125F}">
+  <ds:schemaRefs>
+    <ds:schemaRef ds:uri="http://schemas.microsoft.com/VisualStudio/2011/storyboarding/control"/>
+  </ds:schemaRefs>
+</ds:datastoreItem>
+</file>
+
+<file path=customXml/itemProps65.xml><?xml version="1.0" encoding="utf-8"?>
 <ds:datastoreItem xmlns:ds="http://schemas.openxmlformats.org/officeDocument/2006/customXml" ds:itemID="{FBDB9D4B-5D23-4316-AE7E-E386D2E702D4}">
   <ds:schemaRefs>
     <ds:schemaRef ds:uri="http://schemas.microsoft.com/VisualStudio/2011/storyboarding/control"/>
@@ -13978,39 +14279,7 @@
 </ds:datastoreItem>
 </file>
 
-<file path=customXml/itemProps64.xml><?xml version="1.0" encoding="utf-8"?>
-<ds:datastoreItem xmlns:ds="http://schemas.openxmlformats.org/officeDocument/2006/customXml" ds:itemID="{855315B8-2A4D-4E8D-AAC1-C0281182FD5B}">
-  <ds:schemaRefs>
-    <ds:schemaRef ds:uri="http://schemas.microsoft.com/VisualStudio/2011/storyboarding/control"/>
-  </ds:schemaRefs>
-</ds:datastoreItem>
-</file>
-
-<file path=customXml/itemProps65.xml><?xml version="1.0" encoding="utf-8"?>
-<ds:datastoreItem xmlns:ds="http://schemas.openxmlformats.org/officeDocument/2006/customXml" ds:itemID="{8C16C620-F89C-496A-ABC2-EBAA770A5D2B}">
-  <ds:schemaRefs>
-    <ds:schemaRef ds:uri="http://schemas.microsoft.com/VisualStudio/2011/storyboarding/control"/>
-  </ds:schemaRefs>
-</ds:datastoreItem>
-</file>
-
 <file path=customXml/itemProps66.xml><?xml version="1.0" encoding="utf-8"?>
-<ds:datastoreItem xmlns:ds="http://schemas.openxmlformats.org/officeDocument/2006/customXml" ds:itemID="{2DB54B02-095B-4767-A849-7F09D55BDBEC}">
-  <ds:schemaRefs>
-    <ds:schemaRef ds:uri="http://schemas.microsoft.com/VisualStudio/2011/storyboarding/control"/>
-  </ds:schemaRefs>
-</ds:datastoreItem>
-</file>
-
-<file path=customXml/itemProps67.xml><?xml version="1.0" encoding="utf-8"?>
-<ds:datastoreItem xmlns:ds="http://schemas.openxmlformats.org/officeDocument/2006/customXml" ds:itemID="{0DEE920A-6ADA-48DA-B23C-E869E21EA911}">
-  <ds:schemaRefs>
-    <ds:schemaRef ds:uri="http://schemas.microsoft.com/VisualStudio/2011/storyboarding/control"/>
-  </ds:schemaRefs>
-</ds:datastoreItem>
-</file>
-
-<file path=customXml/itemProps68.xml><?xml version="1.0" encoding="utf-8"?>
 <ds:datastoreItem xmlns:ds="http://schemas.openxmlformats.org/officeDocument/2006/customXml" ds:itemID="{6AC15D59-1985-4B02-A204-9FA5E328EF32}">
   <ds:schemaRefs>
     <ds:schemaRef ds:uri="http://schemas.microsoft.com/VisualStudio/2011/storyboarding/control"/>
@@ -14018,24 +14287,40 @@
 </ds:datastoreItem>
 </file>
 
-<file path=customXml/itemProps7.xml><?xml version="1.0" encoding="utf-8"?>
-<ds:datastoreItem xmlns:ds="http://schemas.openxmlformats.org/officeDocument/2006/customXml" ds:itemID="{EC8AFA28-5388-46A0-B0AF-CDC06E1AFD31}">
+<file path=customXml/itemProps67.xml><?xml version="1.0" encoding="utf-8"?>
+<ds:datastoreItem xmlns:ds="http://schemas.openxmlformats.org/officeDocument/2006/customXml" ds:itemID="{B24B058A-7394-4884-87AB-3D162B4AF263}">
   <ds:schemaRefs>
     <ds:schemaRef ds:uri="http://schemas.microsoft.com/VisualStudio/2011/storyboarding/control"/>
   </ds:schemaRefs>
 </ds:datastoreItem>
 </file>
 
-<file path=customXml/itemProps8.xml><?xml version="1.0" encoding="utf-8"?>
-<ds:datastoreItem xmlns:ds="http://schemas.openxmlformats.org/officeDocument/2006/customXml" ds:itemID="{A6484AF2-F055-4C78-982B-D2156684306A}">
+<file path=customXml/itemProps68.xml><?xml version="1.0" encoding="utf-8"?>
+<ds:datastoreItem xmlns:ds="http://schemas.openxmlformats.org/officeDocument/2006/customXml" ds:itemID="{69819B4B-C652-4029-9D6F-1F30F2207B1C}">
   <ds:schemaRefs>
     <ds:schemaRef ds:uri="http://schemas.microsoft.com/VisualStudio/2011/storyboarding/control"/>
   </ds:schemaRefs>
 </ds:datastoreItem>
 </file>
 
+<file path=customXml/itemProps7.xml><?xml version="1.0" encoding="utf-8"?>
+<ds:datastoreItem xmlns:ds="http://schemas.openxmlformats.org/officeDocument/2006/customXml" ds:itemID="{10C4D8A6-492F-4C3D-BAAD-8273F297A317}">
+  <ds:schemaRefs>
+    <ds:schemaRef ds:uri="http://schemas.microsoft.com/VisualStudio/2011/storyboarding/control"/>
+  </ds:schemaRefs>
+</ds:datastoreItem>
+</file>
+
+<file path=customXml/itemProps8.xml><?xml version="1.0" encoding="utf-8"?>
+<ds:datastoreItem xmlns:ds="http://schemas.openxmlformats.org/officeDocument/2006/customXml" ds:itemID="{6E845879-650B-4022-A35E-856E74320ACC}">
+  <ds:schemaRefs>
+    <ds:schemaRef ds:uri="http://schemas.microsoft.com/VisualStudio/2011/storyboarding/control"/>
+  </ds:schemaRefs>
+</ds:datastoreItem>
+</file>
+
 <file path=customXml/itemProps9.xml><?xml version="1.0" encoding="utf-8"?>
-<ds:datastoreItem xmlns:ds="http://schemas.openxmlformats.org/officeDocument/2006/customXml" ds:itemID="{DE740E6A-43E5-497F-8F78-B904C61CB614}">
+<ds:datastoreItem xmlns:ds="http://schemas.openxmlformats.org/officeDocument/2006/customXml" ds:itemID="{ECEE1C58-60D6-4BE6-B599-4F7E9AB9E035}">
   <ds:schemaRefs>
     <ds:schemaRef ds:uri="http://schemas.microsoft.com/VisualStudio/2011/storyboarding/control"/>
   </ds:schemaRefs>

</xml_diff>